<commit_message>
add comment in presentation slide
</commit_message>
<xml_diff>
--- a/卒業研究発表スライド.pptx
+++ b/卒業研究発表スライド.pptx
@@ -5,7 +5,7 @@
     <p:sldMasterId id="2147483660" r:id="rId1"/>
   </p:sldMasterIdLst>
   <p:notesMasterIdLst>
-    <p:notesMasterId r:id="rId16"/>
+    <p:notesMasterId r:id="rId18"/>
   </p:notesMasterIdLst>
   <p:sldIdLst>
     <p:sldId id="256" r:id="rId2"/>
@@ -15,13 +15,15 @@
     <p:sldId id="263" r:id="rId6"/>
     <p:sldId id="264" r:id="rId7"/>
     <p:sldId id="267" r:id="rId8"/>
-    <p:sldId id="269" r:id="rId9"/>
-    <p:sldId id="268" r:id="rId10"/>
-    <p:sldId id="265" r:id="rId11"/>
-    <p:sldId id="266" r:id="rId12"/>
-    <p:sldId id="257" r:id="rId13"/>
-    <p:sldId id="258" r:id="rId14"/>
-    <p:sldId id="259" r:id="rId15"/>
+    <p:sldId id="270" r:id="rId9"/>
+    <p:sldId id="269" r:id="rId10"/>
+    <p:sldId id="271" r:id="rId11"/>
+    <p:sldId id="268" r:id="rId12"/>
+    <p:sldId id="265" r:id="rId13"/>
+    <p:sldId id="266" r:id="rId14"/>
+    <p:sldId id="257" r:id="rId15"/>
+    <p:sldId id="258" r:id="rId16"/>
+    <p:sldId id="259" r:id="rId17"/>
   </p:sldIdLst>
   <p:sldSz cx="9144000" cy="6858000" type="screen4x3"/>
   <p:notesSz cx="6858000" cy="9144000"/>
@@ -274,70 +276,70 @@
           <a:p>
             <a:pPr lvl="0"/>
             <a:r>
-              <a:rPr kumimoji="1" lang="ja-JP" altLang="en-US" smtClean="0"/>
+              <a:rPr kumimoji="1" lang="ja-JP" altLang="en-US" dirty="0" smtClean="0"/>
               <a:t>マスター テキストの書式設定</a:t>
             </a:r>
           </a:p>
           <a:p>
             <a:pPr lvl="1"/>
             <a:r>
-              <a:rPr kumimoji="1" lang="ja-JP" altLang="en-US" smtClean="0"/>
+              <a:rPr kumimoji="1" lang="ja-JP" altLang="en-US" dirty="0" smtClean="0"/>
               <a:t>第 </a:t>
             </a:r>
             <a:r>
-              <a:rPr kumimoji="1" lang="en-US" altLang="ja-JP" smtClean="0"/>
+              <a:rPr kumimoji="1" lang="en-US" altLang="ja-JP" dirty="0" smtClean="0"/>
               <a:t>2 </a:t>
             </a:r>
             <a:r>
-              <a:rPr kumimoji="1" lang="ja-JP" altLang="en-US" smtClean="0"/>
+              <a:rPr kumimoji="1" lang="ja-JP" altLang="en-US" dirty="0" smtClean="0"/>
               <a:t>レベル</a:t>
             </a:r>
           </a:p>
           <a:p>
             <a:pPr lvl="2"/>
             <a:r>
-              <a:rPr kumimoji="1" lang="ja-JP" altLang="en-US" smtClean="0"/>
+              <a:rPr kumimoji="1" lang="ja-JP" altLang="en-US" dirty="0" smtClean="0"/>
               <a:t>第 </a:t>
             </a:r>
             <a:r>
-              <a:rPr kumimoji="1" lang="en-US" altLang="ja-JP" smtClean="0"/>
+              <a:rPr kumimoji="1" lang="en-US" altLang="ja-JP" dirty="0" smtClean="0"/>
               <a:t>3 </a:t>
             </a:r>
             <a:r>
-              <a:rPr kumimoji="1" lang="ja-JP" altLang="en-US" smtClean="0"/>
+              <a:rPr kumimoji="1" lang="ja-JP" altLang="en-US" dirty="0" smtClean="0"/>
               <a:t>レベル</a:t>
             </a:r>
           </a:p>
           <a:p>
             <a:pPr lvl="3"/>
             <a:r>
-              <a:rPr kumimoji="1" lang="ja-JP" altLang="en-US" smtClean="0"/>
+              <a:rPr kumimoji="1" lang="ja-JP" altLang="en-US" dirty="0" smtClean="0"/>
               <a:t>第 </a:t>
             </a:r>
             <a:r>
-              <a:rPr kumimoji="1" lang="en-US" altLang="ja-JP" smtClean="0"/>
+              <a:rPr kumimoji="1" lang="en-US" altLang="ja-JP" dirty="0" smtClean="0"/>
               <a:t>4 </a:t>
             </a:r>
             <a:r>
-              <a:rPr kumimoji="1" lang="ja-JP" altLang="en-US" smtClean="0"/>
+              <a:rPr kumimoji="1" lang="ja-JP" altLang="en-US" dirty="0" smtClean="0"/>
               <a:t>レベル</a:t>
             </a:r>
           </a:p>
           <a:p>
             <a:pPr lvl="4"/>
             <a:r>
-              <a:rPr kumimoji="1" lang="ja-JP" altLang="en-US" smtClean="0"/>
+              <a:rPr kumimoji="1" lang="ja-JP" altLang="en-US" dirty="0" smtClean="0"/>
               <a:t>第 </a:t>
             </a:r>
             <a:r>
-              <a:rPr kumimoji="1" lang="en-US" altLang="ja-JP" smtClean="0"/>
+              <a:rPr kumimoji="1" lang="en-US" altLang="ja-JP" dirty="0" smtClean="0"/>
               <a:t>5 </a:t>
             </a:r>
             <a:r>
-              <a:rPr kumimoji="1" lang="ja-JP" altLang="en-US" smtClean="0"/>
+              <a:rPr kumimoji="1" lang="ja-JP" altLang="en-US" dirty="0" smtClean="0"/>
               <a:t>レベル</a:t>
             </a:r>
-            <a:endParaRPr kumimoji="1" lang="ja-JP" altLang="en-US"/>
+            <a:endParaRPr kumimoji="1" lang="ja-JP" altLang="en-US" dirty="0"/>
           </a:p>
         </p:txBody>
       </p:sp>
@@ -556,7 +558,23 @@
           <a:p>
             <a:r>
               <a:rPr kumimoji="1" lang="ja-JP" altLang="en-US" dirty="0" smtClean="0"/>
-              <a:t>最近注目されているのがシングルページウェブアプリケーション。</a:t>
+              <a:t>これから、</a:t>
+            </a:r>
+            <a:r>
+              <a:rPr kumimoji="1" lang="en-US" altLang="ja-JP" dirty="0" smtClean="0"/>
+              <a:t>web</a:t>
+            </a:r>
+            <a:r>
+              <a:rPr kumimoji="1" lang="ja-JP" altLang="en-US" dirty="0" smtClean="0"/>
+              <a:t>プログラミングを用いたアプリケーションの開発というテーマで</a:t>
+            </a:r>
+            <a:r>
+              <a:rPr kumimoji="1" lang="en-US" altLang="ja-JP" dirty="0" smtClean="0"/>
+              <a:t>5</a:t>
+            </a:r>
+            <a:r>
+              <a:rPr kumimoji="1" lang="ja-JP" altLang="en-US" dirty="0" smtClean="0"/>
+              <a:t>年電子制御工学科の溝が発表させていただきます</a:t>
             </a:r>
             <a:endParaRPr kumimoji="1" lang="ja-JP" altLang="en-US" dirty="0"/>
           </a:p>
@@ -579,7 +597,215 @@
           <a:p>
             <a:fld id="{DE4497FE-1A65-4799-B01D-44564FDEC19E}" type="slidenum">
               <a:rPr kumimoji="1" lang="ja-JP" altLang="en-US" smtClean="0"/>
-              <a:t>13</a:t>
+              <a:t>1</a:t>
+            </a:fld>
+            <a:endParaRPr kumimoji="1" lang="ja-JP" altLang="en-US"/>
+          </a:p>
+        </p:txBody>
+      </p:sp>
+    </p:spTree>
+    <p:extLst>
+      <p:ext uri="{BB962C8B-B14F-4D97-AF65-F5344CB8AC3E}">
+        <p14:creationId xmlns:p14="http://schemas.microsoft.com/office/powerpoint/2010/main" val="3935561210"/>
+      </p:ext>
+    </p:extLst>
+  </p:cSld>
+  <p:clrMapOvr>
+    <a:masterClrMapping/>
+  </p:clrMapOvr>
+</p:notes>
+</file>
+
+<file path=ppt/notesSlides/notesSlide10.xml><?xml version="1.0" encoding="utf-8"?>
+<p:notes xmlns:a="http://schemas.openxmlformats.org/drawingml/2006/main" xmlns:r="http://schemas.openxmlformats.org/officeDocument/2006/relationships" xmlns:p="http://schemas.openxmlformats.org/presentationml/2006/main">
+  <p:cSld>
+    <p:spTree>
+      <p:nvGrpSpPr>
+        <p:cNvPr id="1" name=""/>
+        <p:cNvGrpSpPr/>
+        <p:nvPr/>
+      </p:nvGrpSpPr>
+      <p:grpSpPr>
+        <a:xfrm>
+          <a:off x="0" y="0"/>
+          <a:ext cx="0" cy="0"/>
+          <a:chOff x="0" y="0"/>
+          <a:chExt cx="0" cy="0"/>
+        </a:xfrm>
+      </p:grpSpPr>
+      <p:sp>
+        <p:nvSpPr>
+          <p:cNvPr id="2" name="スライド イメージ プレースホルダー 1"/>
+          <p:cNvSpPr>
+            <a:spLocks noGrp="1" noRot="1" noChangeAspect="1"/>
+          </p:cNvSpPr>
+          <p:nvPr>
+            <p:ph type="sldImg"/>
+          </p:nvPr>
+        </p:nvSpPr>
+        <p:spPr/>
+      </p:sp>
+      <p:sp>
+        <p:nvSpPr>
+          <p:cNvPr id="3" name="ノート プレースホルダー 2"/>
+          <p:cNvSpPr>
+            <a:spLocks noGrp="1"/>
+          </p:cNvSpPr>
+          <p:nvPr>
+            <p:ph type="body" idx="1"/>
+          </p:nvPr>
+        </p:nvSpPr>
+        <p:spPr/>
+        <p:txBody>
+          <a:bodyPr/>
+          <a:lstStyle/>
+          <a:p>
+            <a:r>
+              <a:rPr kumimoji="1" lang="ja-JP" altLang="en-US" dirty="0" smtClean="0"/>
+              <a:t>では、まとめを述べたいと思います。</a:t>
+            </a:r>
+            <a:r>
+              <a:rPr lang="ja-JP" altLang="en-US" dirty="0" smtClean="0"/>
+              <a:t>本</a:t>
+            </a:r>
+            <a:r>
+              <a:rPr lang="ja-JP" altLang="en-US" dirty="0"/>
+              <a:t>研究</a:t>
+            </a:r>
+            <a:r>
+              <a:rPr lang="ja-JP" altLang="en-US" dirty="0" smtClean="0"/>
+              <a:t>では</a:t>
+            </a:r>
+            <a:r>
+              <a:rPr lang="en-US" altLang="ja-JP" dirty="0" smtClean="0"/>
+              <a:t>web</a:t>
+            </a:r>
+            <a:r>
+              <a:rPr lang="ja-JP" altLang="en-US" dirty="0" smtClean="0"/>
+              <a:t>プログラミングを用いて授業評価アンケートを作成しました。このアンケートは従来のマークシート方式に比べて</a:t>
+            </a:r>
+            <a:r>
+              <a:rPr lang="ja-JP" altLang="en-US" dirty="0"/>
+              <a:t>経済性</a:t>
+            </a:r>
+            <a:r>
+              <a:rPr lang="ja-JP" altLang="en-US" dirty="0" smtClean="0"/>
+              <a:t>の改善、教員の労力削減、ユーザ体験の</a:t>
+            </a:r>
+            <a:r>
+              <a:rPr lang="ja-JP" altLang="en-US" smtClean="0"/>
+              <a:t>向上が実現できました。今後の展望として、このプログラムに新機能を追加し、高専の授業のさらなる品質向上に貢献していきたいと考えています。</a:t>
+            </a:r>
+            <a:endParaRPr lang="en-US" altLang="ja-JP" dirty="0" smtClean="0"/>
+          </a:p>
+        </p:txBody>
+      </p:sp>
+      <p:sp>
+        <p:nvSpPr>
+          <p:cNvPr id="4" name="スライド番号プレースホルダー 3"/>
+          <p:cNvSpPr>
+            <a:spLocks noGrp="1"/>
+          </p:cNvSpPr>
+          <p:nvPr>
+            <p:ph type="sldNum" sz="quarter" idx="10"/>
+          </p:nvPr>
+        </p:nvSpPr>
+        <p:spPr/>
+        <p:txBody>
+          <a:bodyPr/>
+          <a:lstStyle/>
+          <a:p>
+            <a:fld id="{DE4497FE-1A65-4799-B01D-44564FDEC19E}" type="slidenum">
+              <a:rPr kumimoji="1" lang="ja-JP" altLang="en-US" smtClean="0"/>
+              <a:t>10</a:t>
+            </a:fld>
+            <a:endParaRPr kumimoji="1" lang="ja-JP" altLang="en-US"/>
+          </a:p>
+        </p:txBody>
+      </p:sp>
+    </p:spTree>
+    <p:extLst>
+      <p:ext uri="{BB962C8B-B14F-4D97-AF65-F5344CB8AC3E}">
+        <p14:creationId xmlns:p14="http://schemas.microsoft.com/office/powerpoint/2010/main" val="752795588"/>
+      </p:ext>
+    </p:extLst>
+  </p:cSld>
+  <p:clrMapOvr>
+    <a:masterClrMapping/>
+  </p:clrMapOvr>
+</p:notes>
+</file>
+
+<file path=ppt/notesSlides/notesSlide11.xml><?xml version="1.0" encoding="utf-8"?>
+<p:notes xmlns:a="http://schemas.openxmlformats.org/drawingml/2006/main" xmlns:r="http://schemas.openxmlformats.org/officeDocument/2006/relationships" xmlns:p="http://schemas.openxmlformats.org/presentationml/2006/main">
+  <p:cSld>
+    <p:spTree>
+      <p:nvGrpSpPr>
+        <p:cNvPr id="1" name=""/>
+        <p:cNvGrpSpPr/>
+        <p:nvPr/>
+      </p:nvGrpSpPr>
+      <p:grpSpPr>
+        <a:xfrm>
+          <a:off x="0" y="0"/>
+          <a:ext cx="0" cy="0"/>
+          <a:chOff x="0" y="0"/>
+          <a:chExt cx="0" cy="0"/>
+        </a:xfrm>
+      </p:grpSpPr>
+      <p:sp>
+        <p:nvSpPr>
+          <p:cNvPr id="2" name="スライド イメージ プレースホルダー 1"/>
+          <p:cNvSpPr>
+            <a:spLocks noGrp="1" noRot="1" noChangeAspect="1"/>
+          </p:cNvSpPr>
+          <p:nvPr>
+            <p:ph type="sldImg"/>
+          </p:nvPr>
+        </p:nvSpPr>
+        <p:spPr/>
+      </p:sp>
+      <p:sp>
+        <p:nvSpPr>
+          <p:cNvPr id="3" name="ノート プレースホルダー 2"/>
+          <p:cNvSpPr>
+            <a:spLocks noGrp="1"/>
+          </p:cNvSpPr>
+          <p:nvPr>
+            <p:ph type="body" idx="1"/>
+          </p:nvPr>
+        </p:nvSpPr>
+        <p:spPr/>
+        <p:txBody>
+          <a:bodyPr/>
+          <a:lstStyle/>
+          <a:p>
+            <a:r>
+              <a:rPr kumimoji="1" lang="ja-JP" altLang="en-US" dirty="0" smtClean="0"/>
+              <a:t>最近注目されているのがシングルページウェブアプリケーション。</a:t>
+            </a:r>
+            <a:endParaRPr kumimoji="1" lang="ja-JP" altLang="en-US" dirty="0"/>
+          </a:p>
+        </p:txBody>
+      </p:sp>
+      <p:sp>
+        <p:nvSpPr>
+          <p:cNvPr id="4" name="スライド番号プレースホルダー 3"/>
+          <p:cNvSpPr>
+            <a:spLocks noGrp="1"/>
+          </p:cNvSpPr>
+          <p:nvPr>
+            <p:ph type="sldNum" sz="quarter" idx="10"/>
+          </p:nvPr>
+        </p:nvSpPr>
+        <p:spPr/>
+        <p:txBody>
+          <a:bodyPr/>
+          <a:lstStyle/>
+          <a:p>
+            <a:fld id="{DE4497FE-1A65-4799-B01D-44564FDEC19E}" type="slidenum">
+              <a:rPr kumimoji="1" lang="ja-JP" altLang="en-US" smtClean="0"/>
+              <a:t>15</a:t>
             </a:fld>
             <a:endParaRPr kumimoji="1" lang="ja-JP" altLang="en-US"/>
           </a:p>
@@ -589,6 +815,921 @@
     <p:extLst>
       <p:ext uri="{BB962C8B-B14F-4D97-AF65-F5344CB8AC3E}">
         <p14:creationId xmlns:p14="http://schemas.microsoft.com/office/powerpoint/2010/main" val="2221868850"/>
+      </p:ext>
+    </p:extLst>
+  </p:cSld>
+  <p:clrMapOvr>
+    <a:masterClrMapping/>
+  </p:clrMapOvr>
+</p:notes>
+</file>
+
+<file path=ppt/notesSlides/notesSlide2.xml><?xml version="1.0" encoding="utf-8"?>
+<p:notes xmlns:a="http://schemas.openxmlformats.org/drawingml/2006/main" xmlns:r="http://schemas.openxmlformats.org/officeDocument/2006/relationships" xmlns:p="http://schemas.openxmlformats.org/presentationml/2006/main">
+  <p:cSld>
+    <p:spTree>
+      <p:nvGrpSpPr>
+        <p:cNvPr id="1" name=""/>
+        <p:cNvGrpSpPr/>
+        <p:nvPr/>
+      </p:nvGrpSpPr>
+      <p:grpSpPr>
+        <a:xfrm>
+          <a:off x="0" y="0"/>
+          <a:ext cx="0" cy="0"/>
+          <a:chOff x="0" y="0"/>
+          <a:chExt cx="0" cy="0"/>
+        </a:xfrm>
+      </p:grpSpPr>
+      <p:sp>
+        <p:nvSpPr>
+          <p:cNvPr id="2" name="スライド イメージ プレースホルダー 1"/>
+          <p:cNvSpPr>
+            <a:spLocks noGrp="1" noRot="1" noChangeAspect="1"/>
+          </p:cNvSpPr>
+          <p:nvPr>
+            <p:ph type="sldImg"/>
+          </p:nvPr>
+        </p:nvSpPr>
+        <p:spPr/>
+      </p:sp>
+      <p:sp>
+        <p:nvSpPr>
+          <p:cNvPr id="3" name="ノート プレースホルダー 2"/>
+          <p:cNvSpPr>
+            <a:spLocks noGrp="1"/>
+          </p:cNvSpPr>
+          <p:nvPr>
+            <p:ph type="body" idx="1"/>
+          </p:nvPr>
+        </p:nvSpPr>
+        <p:spPr/>
+        <p:txBody>
+          <a:bodyPr/>
+          <a:lstStyle/>
+          <a:p>
+            <a:r>
+              <a:rPr kumimoji="1" lang="ja-JP" altLang="en-US" dirty="0" smtClean="0"/>
+              <a:t>本研究</a:t>
+            </a:r>
+            <a:r>
+              <a:rPr lang="ja-JP" altLang="en-US" dirty="0" smtClean="0"/>
+              <a:t>の目的は、</a:t>
+            </a:r>
+            <a:r>
+              <a:rPr lang="en-US" altLang="ja-JP" dirty="0" smtClean="0"/>
+              <a:t>web</a:t>
+            </a:r>
+            <a:r>
+              <a:rPr lang="ja-JP" altLang="en-US" dirty="0" smtClean="0"/>
+              <a:t>上で授業評価</a:t>
+            </a:r>
+            <a:r>
+              <a:rPr lang="ja-JP" altLang="en-US" dirty="0"/>
+              <a:t>アンケート</a:t>
+            </a:r>
+            <a:r>
+              <a:rPr lang="ja-JP" altLang="en-US" dirty="0" smtClean="0"/>
+              <a:t>を実施することです。</a:t>
+            </a:r>
+            <a:endParaRPr kumimoji="1" lang="ja-JP" altLang="en-US" dirty="0"/>
+          </a:p>
+        </p:txBody>
+      </p:sp>
+      <p:sp>
+        <p:nvSpPr>
+          <p:cNvPr id="4" name="スライド番号プレースホルダー 3"/>
+          <p:cNvSpPr>
+            <a:spLocks noGrp="1"/>
+          </p:cNvSpPr>
+          <p:nvPr>
+            <p:ph type="sldNum" sz="quarter" idx="10"/>
+          </p:nvPr>
+        </p:nvSpPr>
+        <p:spPr/>
+        <p:txBody>
+          <a:bodyPr/>
+          <a:lstStyle/>
+          <a:p>
+            <a:fld id="{DE4497FE-1A65-4799-B01D-44564FDEC19E}" type="slidenum">
+              <a:rPr kumimoji="1" lang="ja-JP" altLang="en-US" smtClean="0"/>
+              <a:t>2</a:t>
+            </a:fld>
+            <a:endParaRPr kumimoji="1" lang="ja-JP" altLang="en-US"/>
+          </a:p>
+        </p:txBody>
+      </p:sp>
+    </p:spTree>
+    <p:extLst>
+      <p:ext uri="{BB962C8B-B14F-4D97-AF65-F5344CB8AC3E}">
+        <p14:creationId xmlns:p14="http://schemas.microsoft.com/office/powerpoint/2010/main" val="3792251010"/>
+      </p:ext>
+    </p:extLst>
+  </p:cSld>
+  <p:clrMapOvr>
+    <a:masterClrMapping/>
+  </p:clrMapOvr>
+</p:notes>
+</file>
+
+<file path=ppt/notesSlides/notesSlide3.xml><?xml version="1.0" encoding="utf-8"?>
+<p:notes xmlns:a="http://schemas.openxmlformats.org/drawingml/2006/main" xmlns:r="http://schemas.openxmlformats.org/officeDocument/2006/relationships" xmlns:p="http://schemas.openxmlformats.org/presentationml/2006/main">
+  <p:cSld>
+    <p:spTree>
+      <p:nvGrpSpPr>
+        <p:cNvPr id="1" name=""/>
+        <p:cNvGrpSpPr/>
+        <p:nvPr/>
+      </p:nvGrpSpPr>
+      <p:grpSpPr>
+        <a:xfrm>
+          <a:off x="0" y="0"/>
+          <a:ext cx="0" cy="0"/>
+          <a:chOff x="0" y="0"/>
+          <a:chExt cx="0" cy="0"/>
+        </a:xfrm>
+      </p:grpSpPr>
+      <p:sp>
+        <p:nvSpPr>
+          <p:cNvPr id="2" name="スライド イメージ プレースホルダー 1"/>
+          <p:cNvSpPr>
+            <a:spLocks noGrp="1" noRot="1" noChangeAspect="1"/>
+          </p:cNvSpPr>
+          <p:nvPr>
+            <p:ph type="sldImg"/>
+          </p:nvPr>
+        </p:nvSpPr>
+        <p:spPr/>
+      </p:sp>
+      <p:sp>
+        <p:nvSpPr>
+          <p:cNvPr id="3" name="ノート プレースホルダー 2"/>
+          <p:cNvSpPr>
+            <a:spLocks noGrp="1"/>
+          </p:cNvSpPr>
+          <p:nvPr>
+            <p:ph type="body" idx="1"/>
+          </p:nvPr>
+        </p:nvSpPr>
+        <p:spPr/>
+        <p:txBody>
+          <a:bodyPr/>
+          <a:lstStyle/>
+          <a:p>
+            <a:r>
+              <a:rPr lang="ja-JP" altLang="en-US" dirty="0" smtClean="0"/>
+              <a:t>鹿児島</a:t>
+            </a:r>
+            <a:r>
+              <a:rPr lang="ja-JP" altLang="en-US" dirty="0"/>
+              <a:t>高専</a:t>
+            </a:r>
+            <a:r>
+              <a:rPr lang="ja-JP" altLang="en-US" dirty="0" smtClean="0"/>
+              <a:t>では、以前マークシート</a:t>
+            </a:r>
+            <a:r>
+              <a:rPr lang="ja-JP" altLang="en-US" dirty="0"/>
+              <a:t>方式の授業評価アンケートを採用</a:t>
+            </a:r>
+            <a:r>
+              <a:rPr lang="ja-JP" altLang="en-US" dirty="0" smtClean="0"/>
+              <a:t>していました．</a:t>
+            </a:r>
+            <a:r>
+              <a:rPr lang="ja-JP" altLang="en-US" dirty="0"/>
+              <a:t>しかし，マークシート方式は多くの紙資源を消費するため経済的</a:t>
+            </a:r>
+            <a:r>
+              <a:rPr lang="ja-JP" altLang="en-US" dirty="0" smtClean="0"/>
+              <a:t>ではありません．また、マークシート</a:t>
+            </a:r>
+            <a:r>
+              <a:rPr lang="ja-JP" altLang="en-US" dirty="0"/>
+              <a:t>方式で</a:t>
+            </a:r>
+            <a:r>
+              <a:rPr lang="ja-JP" altLang="en-US" dirty="0" smtClean="0"/>
+              <a:t>はアンケート終了後に教員が回答</a:t>
+            </a:r>
+            <a:r>
+              <a:rPr lang="ja-JP" altLang="en-US" dirty="0"/>
+              <a:t>用紙</a:t>
+            </a:r>
+            <a:r>
+              <a:rPr lang="ja-JP" altLang="en-US" dirty="0" smtClean="0"/>
+              <a:t>をスキャンしてパソコンに取り込む作業などの</a:t>
+            </a:r>
+            <a:r>
+              <a:rPr lang="ja-JP" altLang="en-US" dirty="0"/>
+              <a:t>無駄</a:t>
+            </a:r>
+            <a:r>
+              <a:rPr lang="ja-JP" altLang="en-US" dirty="0" smtClean="0"/>
+              <a:t>な労力</a:t>
+            </a:r>
+            <a:r>
+              <a:rPr lang="ja-JP" altLang="en-US" dirty="0"/>
+              <a:t>を必要</a:t>
+            </a:r>
+            <a:r>
+              <a:rPr lang="ja-JP" altLang="en-US" dirty="0" smtClean="0"/>
+              <a:t>とします．これらの問題を解決するために</a:t>
+            </a:r>
+            <a:r>
+              <a:rPr lang="en-US" altLang="ja-JP" dirty="0" smtClean="0"/>
+              <a:t>web</a:t>
+            </a:r>
+            <a:r>
+              <a:rPr lang="ja-JP" altLang="en-US" dirty="0" smtClean="0"/>
+              <a:t>上でアンケートを実施しました。</a:t>
+            </a:r>
+            <a:endParaRPr kumimoji="1" lang="ja-JP" altLang="en-US" dirty="0"/>
+          </a:p>
+        </p:txBody>
+      </p:sp>
+      <p:sp>
+        <p:nvSpPr>
+          <p:cNvPr id="4" name="スライド番号プレースホルダー 3"/>
+          <p:cNvSpPr>
+            <a:spLocks noGrp="1"/>
+          </p:cNvSpPr>
+          <p:nvPr>
+            <p:ph type="sldNum" sz="quarter" idx="10"/>
+          </p:nvPr>
+        </p:nvSpPr>
+        <p:spPr/>
+        <p:txBody>
+          <a:bodyPr/>
+          <a:lstStyle/>
+          <a:p>
+            <a:fld id="{DE4497FE-1A65-4799-B01D-44564FDEC19E}" type="slidenum">
+              <a:rPr kumimoji="1" lang="ja-JP" altLang="en-US" smtClean="0"/>
+              <a:t>3</a:t>
+            </a:fld>
+            <a:endParaRPr kumimoji="1" lang="ja-JP" altLang="en-US"/>
+          </a:p>
+        </p:txBody>
+      </p:sp>
+    </p:spTree>
+    <p:extLst>
+      <p:ext uri="{BB962C8B-B14F-4D97-AF65-F5344CB8AC3E}">
+        <p14:creationId xmlns:p14="http://schemas.microsoft.com/office/powerpoint/2010/main" val="3705607181"/>
+      </p:ext>
+    </p:extLst>
+  </p:cSld>
+  <p:clrMapOvr>
+    <a:masterClrMapping/>
+  </p:clrMapOvr>
+</p:notes>
+</file>
+
+<file path=ppt/notesSlides/notesSlide4.xml><?xml version="1.0" encoding="utf-8"?>
+<p:notes xmlns:a="http://schemas.openxmlformats.org/drawingml/2006/main" xmlns:r="http://schemas.openxmlformats.org/officeDocument/2006/relationships" xmlns:p="http://schemas.openxmlformats.org/presentationml/2006/main">
+  <p:cSld>
+    <p:spTree>
+      <p:nvGrpSpPr>
+        <p:cNvPr id="1" name=""/>
+        <p:cNvGrpSpPr/>
+        <p:nvPr/>
+      </p:nvGrpSpPr>
+      <p:grpSpPr>
+        <a:xfrm>
+          <a:off x="0" y="0"/>
+          <a:ext cx="0" cy="0"/>
+          <a:chOff x="0" y="0"/>
+          <a:chExt cx="0" cy="0"/>
+        </a:xfrm>
+      </p:grpSpPr>
+      <p:sp>
+        <p:nvSpPr>
+          <p:cNvPr id="2" name="スライド イメージ プレースホルダー 1"/>
+          <p:cNvSpPr>
+            <a:spLocks noGrp="1" noRot="1" noChangeAspect="1"/>
+          </p:cNvSpPr>
+          <p:nvPr>
+            <p:ph type="sldImg"/>
+          </p:nvPr>
+        </p:nvSpPr>
+        <p:spPr/>
+      </p:sp>
+      <p:sp>
+        <p:nvSpPr>
+          <p:cNvPr id="3" name="ノート プレースホルダー 2"/>
+          <p:cNvSpPr>
+            <a:spLocks noGrp="1"/>
+          </p:cNvSpPr>
+          <p:nvPr>
+            <p:ph type="body" idx="1"/>
+          </p:nvPr>
+        </p:nvSpPr>
+        <p:spPr/>
+        <p:txBody>
+          <a:bodyPr/>
+          <a:lstStyle/>
+          <a:p>
+            <a:r>
+              <a:rPr kumimoji="1" lang="en-US" altLang="ja-JP" dirty="0" smtClean="0"/>
+              <a:t>Web</a:t>
+            </a:r>
+            <a:r>
+              <a:rPr kumimoji="1" lang="ja-JP" altLang="en-US" dirty="0" smtClean="0"/>
+              <a:t>上で実施する利点として次の</a:t>
+            </a:r>
+            <a:r>
+              <a:rPr kumimoji="1" lang="en-US" altLang="ja-JP" dirty="0" smtClean="0"/>
+              <a:t>3</a:t>
+            </a:r>
+            <a:r>
+              <a:rPr kumimoji="1" lang="ja-JP" altLang="en-US" dirty="0" smtClean="0"/>
+              <a:t>つが挙げられます。</a:t>
+            </a:r>
+            <a:endParaRPr kumimoji="1" lang="en-US" altLang="ja-JP" dirty="0" smtClean="0"/>
+          </a:p>
+          <a:p>
+            <a:endParaRPr lang="en-US" altLang="ja-JP" dirty="0"/>
+          </a:p>
+          <a:p>
+            <a:r>
+              <a:rPr kumimoji="1" lang="en-US" altLang="ja-JP" dirty="0" smtClean="0"/>
+              <a:t>1</a:t>
+            </a:r>
+            <a:r>
+              <a:rPr kumimoji="1" lang="ja-JP" altLang="en-US" dirty="0" smtClean="0"/>
+              <a:t>つめは経済性です。</a:t>
+            </a:r>
+            <a:r>
+              <a:rPr kumimoji="1" lang="en-US" altLang="ja-JP" dirty="0" smtClean="0"/>
+              <a:t>web</a:t>
+            </a:r>
+            <a:r>
+              <a:rPr kumimoji="1" lang="ja-JP" altLang="en-US" dirty="0" smtClean="0"/>
+              <a:t>上でアンケートを実施することで紙資源の消費を抑えられるため経済的です。</a:t>
+            </a:r>
+            <a:endParaRPr kumimoji="1" lang="en-US" altLang="ja-JP" dirty="0" smtClean="0"/>
+          </a:p>
+          <a:p>
+            <a:endParaRPr lang="en-US" altLang="ja-JP" dirty="0"/>
+          </a:p>
+          <a:p>
+            <a:r>
+              <a:rPr lang="en-US" altLang="ja-JP" dirty="0" smtClean="0"/>
+              <a:t>2</a:t>
+            </a:r>
+            <a:r>
+              <a:rPr lang="ja-JP" altLang="en-US" dirty="0" smtClean="0"/>
+              <a:t>つ目は教員の労力を削減できる点です。</a:t>
+            </a:r>
+            <a:r>
+              <a:rPr lang="en-US" altLang="ja-JP" dirty="0" smtClean="0"/>
+              <a:t>Web</a:t>
+            </a:r>
+            <a:r>
+              <a:rPr lang="ja-JP" altLang="en-US" dirty="0" smtClean="0"/>
+              <a:t>上でアンケートを実施すると学生が回答したデータは直接コンピュータに送信されるため、マークシート方式のように回答用紙をスキャンする必要がありません。また、回答データの自動集計機能を実装することで教員が</a:t>
+            </a:r>
+            <a:r>
+              <a:rPr lang="en-US" altLang="ja-JP" dirty="0" smtClean="0"/>
+              <a:t>excel</a:t>
+            </a:r>
+            <a:r>
+              <a:rPr lang="ja-JP" altLang="en-US" dirty="0" smtClean="0"/>
+              <a:t>などの表計算ソフトウェアで集計する必要がなくなります。それらの結果として、教員の授業評価アンケートに費やす労力が削減できます。</a:t>
+            </a:r>
+            <a:endParaRPr lang="en-US" altLang="ja-JP" dirty="0" smtClean="0"/>
+          </a:p>
+          <a:p>
+            <a:endParaRPr lang="en-US" altLang="ja-JP" dirty="0"/>
+          </a:p>
+          <a:p>
+            <a:r>
+              <a:rPr lang="en-US" altLang="ja-JP" dirty="0" smtClean="0"/>
+              <a:t>3</a:t>
+            </a:r>
+            <a:r>
+              <a:rPr lang="ja-JP" altLang="en-US" dirty="0" smtClean="0"/>
+              <a:t>つ目はユーザ体験の向上です。マークシート方式のアンケートに回答するには鉛筆を持ち、回答欄を塗りつぶす</a:t>
+            </a:r>
+            <a:r>
+              <a:rPr lang="ja-JP" altLang="en-US" dirty="0"/>
+              <a:t>作業</a:t>
+            </a:r>
+            <a:r>
+              <a:rPr lang="ja-JP" altLang="en-US" dirty="0" smtClean="0"/>
+              <a:t>をしなければなりません。このような単純作業は回答者の集中力の低下を招き冷静な判断を鈍らせます。しかし、</a:t>
+            </a:r>
+            <a:r>
+              <a:rPr lang="en-US" altLang="ja-JP" dirty="0" smtClean="0"/>
+              <a:t>web</a:t>
+            </a:r>
+            <a:r>
+              <a:rPr lang="ja-JP" altLang="en-US" dirty="0" smtClean="0"/>
+              <a:t>上でアンケートを実施することで動きのあるユーザインターフェースで楽しくアンケートに回答できます。</a:t>
+            </a:r>
+            <a:endParaRPr lang="en-US" altLang="ja-JP" dirty="0" smtClean="0"/>
+          </a:p>
+        </p:txBody>
+      </p:sp>
+      <p:sp>
+        <p:nvSpPr>
+          <p:cNvPr id="4" name="スライド番号プレースホルダー 3"/>
+          <p:cNvSpPr>
+            <a:spLocks noGrp="1"/>
+          </p:cNvSpPr>
+          <p:nvPr>
+            <p:ph type="sldNum" sz="quarter" idx="10"/>
+          </p:nvPr>
+        </p:nvSpPr>
+        <p:spPr/>
+        <p:txBody>
+          <a:bodyPr/>
+          <a:lstStyle/>
+          <a:p>
+            <a:fld id="{DE4497FE-1A65-4799-B01D-44564FDEC19E}" type="slidenum">
+              <a:rPr kumimoji="1" lang="ja-JP" altLang="en-US" smtClean="0"/>
+              <a:t>4</a:t>
+            </a:fld>
+            <a:endParaRPr kumimoji="1" lang="ja-JP" altLang="en-US"/>
+          </a:p>
+        </p:txBody>
+      </p:sp>
+    </p:spTree>
+    <p:extLst>
+      <p:ext uri="{BB962C8B-B14F-4D97-AF65-F5344CB8AC3E}">
+        <p14:creationId xmlns:p14="http://schemas.microsoft.com/office/powerpoint/2010/main" val="2217473931"/>
+      </p:ext>
+    </p:extLst>
+  </p:cSld>
+  <p:clrMapOvr>
+    <a:masterClrMapping/>
+  </p:clrMapOvr>
+</p:notes>
+</file>
+
+<file path=ppt/notesSlides/notesSlide5.xml><?xml version="1.0" encoding="utf-8"?>
+<p:notes xmlns:a="http://schemas.openxmlformats.org/drawingml/2006/main" xmlns:r="http://schemas.openxmlformats.org/officeDocument/2006/relationships" xmlns:p="http://schemas.openxmlformats.org/presentationml/2006/main">
+  <p:cSld>
+    <p:spTree>
+      <p:nvGrpSpPr>
+        <p:cNvPr id="1" name=""/>
+        <p:cNvGrpSpPr/>
+        <p:nvPr/>
+      </p:nvGrpSpPr>
+      <p:grpSpPr>
+        <a:xfrm>
+          <a:off x="0" y="0"/>
+          <a:ext cx="0" cy="0"/>
+          <a:chOff x="0" y="0"/>
+          <a:chExt cx="0" cy="0"/>
+        </a:xfrm>
+      </p:grpSpPr>
+      <p:sp>
+        <p:nvSpPr>
+          <p:cNvPr id="2" name="スライド イメージ プレースホルダー 1"/>
+          <p:cNvSpPr>
+            <a:spLocks noGrp="1" noRot="1" noChangeAspect="1"/>
+          </p:cNvSpPr>
+          <p:nvPr>
+            <p:ph type="sldImg"/>
+          </p:nvPr>
+        </p:nvSpPr>
+        <p:spPr/>
+      </p:sp>
+      <p:sp>
+        <p:nvSpPr>
+          <p:cNvPr id="3" name="ノート プレースホルダー 2"/>
+          <p:cNvSpPr>
+            <a:spLocks noGrp="1"/>
+          </p:cNvSpPr>
+          <p:nvPr>
+            <p:ph type="body" idx="1"/>
+          </p:nvPr>
+        </p:nvSpPr>
+        <p:spPr/>
+        <p:txBody>
+          <a:bodyPr/>
+          <a:lstStyle/>
+          <a:p>
+            <a:endParaRPr kumimoji="1" lang="ja-JP" altLang="en-US"/>
+          </a:p>
+        </p:txBody>
+      </p:sp>
+      <p:sp>
+        <p:nvSpPr>
+          <p:cNvPr id="4" name="スライド番号プレースホルダー 3"/>
+          <p:cNvSpPr>
+            <a:spLocks noGrp="1"/>
+          </p:cNvSpPr>
+          <p:nvPr>
+            <p:ph type="sldNum" sz="quarter" idx="10"/>
+          </p:nvPr>
+        </p:nvSpPr>
+        <p:spPr/>
+        <p:txBody>
+          <a:bodyPr/>
+          <a:lstStyle/>
+          <a:p>
+            <a:fld id="{DE4497FE-1A65-4799-B01D-44564FDEC19E}" type="slidenum">
+              <a:rPr kumimoji="1" lang="ja-JP" altLang="en-US" smtClean="0"/>
+              <a:t>5</a:t>
+            </a:fld>
+            <a:endParaRPr kumimoji="1" lang="ja-JP" altLang="en-US"/>
+          </a:p>
+        </p:txBody>
+      </p:sp>
+    </p:spTree>
+    <p:extLst>
+      <p:ext uri="{BB962C8B-B14F-4D97-AF65-F5344CB8AC3E}">
+        <p14:creationId xmlns:p14="http://schemas.microsoft.com/office/powerpoint/2010/main" val="1263298440"/>
+      </p:ext>
+    </p:extLst>
+  </p:cSld>
+  <p:clrMapOvr>
+    <a:masterClrMapping/>
+  </p:clrMapOvr>
+</p:notes>
+</file>
+
+<file path=ppt/notesSlides/notesSlide6.xml><?xml version="1.0" encoding="utf-8"?>
+<p:notes xmlns:a="http://schemas.openxmlformats.org/drawingml/2006/main" xmlns:r="http://schemas.openxmlformats.org/officeDocument/2006/relationships" xmlns:p="http://schemas.openxmlformats.org/presentationml/2006/main">
+  <p:cSld>
+    <p:spTree>
+      <p:nvGrpSpPr>
+        <p:cNvPr id="1" name=""/>
+        <p:cNvGrpSpPr/>
+        <p:nvPr/>
+      </p:nvGrpSpPr>
+      <p:grpSpPr>
+        <a:xfrm>
+          <a:off x="0" y="0"/>
+          <a:ext cx="0" cy="0"/>
+          <a:chOff x="0" y="0"/>
+          <a:chExt cx="0" cy="0"/>
+        </a:xfrm>
+      </p:grpSpPr>
+      <p:sp>
+        <p:nvSpPr>
+          <p:cNvPr id="2" name="スライド イメージ プレースホルダー 1"/>
+          <p:cNvSpPr>
+            <a:spLocks noGrp="1" noRot="1" noChangeAspect="1"/>
+          </p:cNvSpPr>
+          <p:nvPr>
+            <p:ph type="sldImg"/>
+          </p:nvPr>
+        </p:nvSpPr>
+        <p:spPr/>
+      </p:sp>
+      <p:sp>
+        <p:nvSpPr>
+          <p:cNvPr id="3" name="ノート プレースホルダー 2"/>
+          <p:cNvSpPr>
+            <a:spLocks noGrp="1"/>
+          </p:cNvSpPr>
+          <p:nvPr>
+            <p:ph type="body" idx="1"/>
+          </p:nvPr>
+        </p:nvSpPr>
+        <p:spPr/>
+        <p:txBody>
+          <a:bodyPr/>
+          <a:lstStyle/>
+          <a:p>
+            <a:r>
+              <a:rPr kumimoji="1" lang="ja-JP" altLang="en-US" dirty="0" smtClean="0"/>
+              <a:t>動画を見ていただいてわかるように</a:t>
+            </a:r>
+            <a:r>
+              <a:rPr lang="ja-JP" altLang="en-US" dirty="0" smtClean="0"/>
+              <a:t>本</a:t>
+            </a:r>
+            <a:r>
+              <a:rPr lang="ja-JP" altLang="en-US" dirty="0"/>
+              <a:t>アプリケーション</a:t>
+            </a:r>
+            <a:r>
+              <a:rPr lang="ja-JP" altLang="en-US" dirty="0" smtClean="0"/>
+              <a:t>では、紙資源を使わないことによる経済性が向上しました。また、スキャン不要でデータが取り込めることによって教員の労力を削減しました。さらに、動きあるユーザインターフェースによってユーザ体験を向上させました。</a:t>
+            </a:r>
+            <a:endParaRPr lang="en-US" altLang="ja-JP" dirty="0" smtClean="0"/>
+          </a:p>
+          <a:p>
+            <a:endParaRPr lang="en-US" altLang="ja-JP" dirty="0"/>
+          </a:p>
+          <a:p>
+            <a:r>
+              <a:rPr lang="ja-JP" altLang="en-US" dirty="0"/>
+              <a:t>動画を見ていただいてわかるよう</a:t>
+            </a:r>
+            <a:r>
+              <a:rPr lang="ja-JP" altLang="en-US" dirty="0" smtClean="0"/>
+              <a:t>に、本アプリケーションでは、経済的で教員と学生の両方にメリットのある授業評価アンケートを実現できました。</a:t>
+            </a:r>
+            <a:endParaRPr lang="en-US" altLang="ja-JP" dirty="0" smtClean="0"/>
+          </a:p>
+        </p:txBody>
+      </p:sp>
+      <p:sp>
+        <p:nvSpPr>
+          <p:cNvPr id="4" name="スライド番号プレースホルダー 3"/>
+          <p:cNvSpPr>
+            <a:spLocks noGrp="1"/>
+          </p:cNvSpPr>
+          <p:nvPr>
+            <p:ph type="sldNum" sz="quarter" idx="10"/>
+          </p:nvPr>
+        </p:nvSpPr>
+        <p:spPr/>
+        <p:txBody>
+          <a:bodyPr/>
+          <a:lstStyle/>
+          <a:p>
+            <a:fld id="{DE4497FE-1A65-4799-B01D-44564FDEC19E}" type="slidenum">
+              <a:rPr kumimoji="1" lang="ja-JP" altLang="en-US" smtClean="0"/>
+              <a:t>6</a:t>
+            </a:fld>
+            <a:endParaRPr kumimoji="1" lang="ja-JP" altLang="en-US"/>
+          </a:p>
+        </p:txBody>
+      </p:sp>
+    </p:spTree>
+    <p:extLst>
+      <p:ext uri="{BB962C8B-B14F-4D97-AF65-F5344CB8AC3E}">
+        <p14:creationId xmlns:p14="http://schemas.microsoft.com/office/powerpoint/2010/main" val="852255279"/>
+      </p:ext>
+    </p:extLst>
+  </p:cSld>
+  <p:clrMapOvr>
+    <a:masterClrMapping/>
+  </p:clrMapOvr>
+</p:notes>
+</file>
+
+<file path=ppt/notesSlides/notesSlide7.xml><?xml version="1.0" encoding="utf-8"?>
+<p:notes xmlns:a="http://schemas.openxmlformats.org/drawingml/2006/main" xmlns:r="http://schemas.openxmlformats.org/officeDocument/2006/relationships" xmlns:p="http://schemas.openxmlformats.org/presentationml/2006/main">
+  <p:cSld>
+    <p:spTree>
+      <p:nvGrpSpPr>
+        <p:cNvPr id="1" name=""/>
+        <p:cNvGrpSpPr/>
+        <p:nvPr/>
+      </p:nvGrpSpPr>
+      <p:grpSpPr>
+        <a:xfrm>
+          <a:off x="0" y="0"/>
+          <a:ext cx="0" cy="0"/>
+          <a:chOff x="0" y="0"/>
+          <a:chExt cx="0" cy="0"/>
+        </a:xfrm>
+      </p:grpSpPr>
+      <p:sp>
+        <p:nvSpPr>
+          <p:cNvPr id="2" name="スライド イメージ プレースホルダー 1"/>
+          <p:cNvSpPr>
+            <a:spLocks noGrp="1" noRot="1" noChangeAspect="1"/>
+          </p:cNvSpPr>
+          <p:nvPr>
+            <p:ph type="sldImg"/>
+          </p:nvPr>
+        </p:nvSpPr>
+        <p:spPr/>
+      </p:sp>
+      <p:sp>
+        <p:nvSpPr>
+          <p:cNvPr id="3" name="ノート プレースホルダー 2"/>
+          <p:cNvSpPr>
+            <a:spLocks noGrp="1"/>
+          </p:cNvSpPr>
+          <p:nvPr>
+            <p:ph type="body" idx="1"/>
+          </p:nvPr>
+        </p:nvSpPr>
+        <p:spPr/>
+        <p:txBody>
+          <a:bodyPr/>
+          <a:lstStyle/>
+          <a:p>
+            <a:r>
+              <a:rPr kumimoji="1" lang="ja-JP" altLang="en-US" dirty="0" smtClean="0"/>
+              <a:t>今後の展望として、鹿児島高専の授業のさらなる品質向上に貢献できるアプリケーションに成長させたいと考えています。</a:t>
+            </a:r>
+            <a:endParaRPr kumimoji="1" lang="ja-JP" altLang="en-US" dirty="0"/>
+          </a:p>
+        </p:txBody>
+      </p:sp>
+      <p:sp>
+        <p:nvSpPr>
+          <p:cNvPr id="4" name="スライド番号プレースホルダー 3"/>
+          <p:cNvSpPr>
+            <a:spLocks noGrp="1"/>
+          </p:cNvSpPr>
+          <p:nvPr>
+            <p:ph type="sldNum" sz="quarter" idx="10"/>
+          </p:nvPr>
+        </p:nvSpPr>
+        <p:spPr/>
+        <p:txBody>
+          <a:bodyPr/>
+          <a:lstStyle/>
+          <a:p>
+            <a:fld id="{DE4497FE-1A65-4799-B01D-44564FDEC19E}" type="slidenum">
+              <a:rPr kumimoji="1" lang="ja-JP" altLang="en-US" smtClean="0"/>
+              <a:t>7</a:t>
+            </a:fld>
+            <a:endParaRPr kumimoji="1" lang="ja-JP" altLang="en-US"/>
+          </a:p>
+        </p:txBody>
+      </p:sp>
+    </p:spTree>
+    <p:extLst>
+      <p:ext uri="{BB962C8B-B14F-4D97-AF65-F5344CB8AC3E}">
+        <p14:creationId xmlns:p14="http://schemas.microsoft.com/office/powerpoint/2010/main" val="2573633034"/>
+      </p:ext>
+    </p:extLst>
+  </p:cSld>
+  <p:clrMapOvr>
+    <a:masterClrMapping/>
+  </p:clrMapOvr>
+</p:notes>
+</file>
+
+<file path=ppt/notesSlides/notesSlide8.xml><?xml version="1.0" encoding="utf-8"?>
+<p:notes xmlns:a="http://schemas.openxmlformats.org/drawingml/2006/main" xmlns:r="http://schemas.openxmlformats.org/officeDocument/2006/relationships" xmlns:p="http://schemas.openxmlformats.org/presentationml/2006/main">
+  <p:cSld>
+    <p:spTree>
+      <p:nvGrpSpPr>
+        <p:cNvPr id="1" name=""/>
+        <p:cNvGrpSpPr/>
+        <p:nvPr/>
+      </p:nvGrpSpPr>
+      <p:grpSpPr>
+        <a:xfrm>
+          <a:off x="0" y="0"/>
+          <a:ext cx="0" cy="0"/>
+          <a:chOff x="0" y="0"/>
+          <a:chExt cx="0" cy="0"/>
+        </a:xfrm>
+      </p:grpSpPr>
+      <p:sp>
+        <p:nvSpPr>
+          <p:cNvPr id="2" name="スライド イメージ プレースホルダー 1"/>
+          <p:cNvSpPr>
+            <a:spLocks noGrp="1" noRot="1" noChangeAspect="1"/>
+          </p:cNvSpPr>
+          <p:nvPr>
+            <p:ph type="sldImg"/>
+          </p:nvPr>
+        </p:nvSpPr>
+        <p:spPr/>
+      </p:sp>
+      <p:sp>
+        <p:nvSpPr>
+          <p:cNvPr id="3" name="ノート プレースホルダー 2"/>
+          <p:cNvSpPr>
+            <a:spLocks noGrp="1"/>
+          </p:cNvSpPr>
+          <p:nvPr>
+            <p:ph type="body" idx="1"/>
+          </p:nvPr>
+        </p:nvSpPr>
+        <p:spPr/>
+        <p:txBody>
+          <a:bodyPr/>
+          <a:lstStyle/>
+          <a:p>
+            <a:r>
+              <a:rPr kumimoji="1" lang="ja-JP" altLang="en-US" dirty="0" smtClean="0"/>
+              <a:t>その具体的な方法として、アンケート結果の自動集計および自動配信機能を追加したいと考えています。</a:t>
+            </a:r>
+            <a:endParaRPr kumimoji="1" lang="ja-JP" altLang="en-US" dirty="0"/>
+          </a:p>
+        </p:txBody>
+      </p:sp>
+      <p:sp>
+        <p:nvSpPr>
+          <p:cNvPr id="4" name="スライド番号プレースホルダー 3"/>
+          <p:cNvSpPr>
+            <a:spLocks noGrp="1"/>
+          </p:cNvSpPr>
+          <p:nvPr>
+            <p:ph type="sldNum" sz="quarter" idx="10"/>
+          </p:nvPr>
+        </p:nvSpPr>
+        <p:spPr/>
+        <p:txBody>
+          <a:bodyPr/>
+          <a:lstStyle/>
+          <a:p>
+            <a:fld id="{DE4497FE-1A65-4799-B01D-44564FDEC19E}" type="slidenum">
+              <a:rPr kumimoji="1" lang="ja-JP" altLang="en-US" smtClean="0"/>
+              <a:t>8</a:t>
+            </a:fld>
+            <a:endParaRPr kumimoji="1" lang="ja-JP" altLang="en-US"/>
+          </a:p>
+        </p:txBody>
+      </p:sp>
+    </p:spTree>
+    <p:extLst>
+      <p:ext uri="{BB962C8B-B14F-4D97-AF65-F5344CB8AC3E}">
+        <p14:creationId xmlns:p14="http://schemas.microsoft.com/office/powerpoint/2010/main" val="962527338"/>
+      </p:ext>
+    </p:extLst>
+  </p:cSld>
+  <p:clrMapOvr>
+    <a:masterClrMapping/>
+  </p:clrMapOvr>
+</p:notes>
+</file>
+
+<file path=ppt/notesSlides/notesSlide9.xml><?xml version="1.0" encoding="utf-8"?>
+<p:notes xmlns:a="http://schemas.openxmlformats.org/drawingml/2006/main" xmlns:r="http://schemas.openxmlformats.org/officeDocument/2006/relationships" xmlns:p="http://schemas.openxmlformats.org/presentationml/2006/main">
+  <p:cSld>
+    <p:spTree>
+      <p:nvGrpSpPr>
+        <p:cNvPr id="1" name=""/>
+        <p:cNvGrpSpPr/>
+        <p:nvPr/>
+      </p:nvGrpSpPr>
+      <p:grpSpPr>
+        <a:xfrm>
+          <a:off x="0" y="0"/>
+          <a:ext cx="0" cy="0"/>
+          <a:chOff x="0" y="0"/>
+          <a:chExt cx="0" cy="0"/>
+        </a:xfrm>
+      </p:grpSpPr>
+      <p:sp>
+        <p:nvSpPr>
+          <p:cNvPr id="2" name="スライド イメージ プレースホルダー 1"/>
+          <p:cNvSpPr>
+            <a:spLocks noGrp="1" noRot="1" noChangeAspect="1"/>
+          </p:cNvSpPr>
+          <p:nvPr>
+            <p:ph type="sldImg"/>
+          </p:nvPr>
+        </p:nvSpPr>
+        <p:spPr/>
+      </p:sp>
+      <p:sp>
+        <p:nvSpPr>
+          <p:cNvPr id="3" name="ノート プレースホルダー 2"/>
+          <p:cNvSpPr>
+            <a:spLocks noGrp="1"/>
+          </p:cNvSpPr>
+          <p:nvPr>
+            <p:ph type="body" idx="1"/>
+          </p:nvPr>
+        </p:nvSpPr>
+        <p:spPr/>
+        <p:txBody>
+          <a:bodyPr/>
+          <a:lstStyle/>
+          <a:p>
+            <a:r>
+              <a:rPr kumimoji="1" lang="ja-JP" altLang="en-US" dirty="0" smtClean="0"/>
+              <a:t>これらの新機能を実装することで、授業終了後に学生がすぐに今回の授業を評価することができ、より正確な意見が収集できます。</a:t>
+            </a:r>
+          </a:p>
+          <a:p>
+            <a:r>
+              <a:rPr kumimoji="1" lang="ja-JP" altLang="en-US" dirty="0" smtClean="0"/>
+              <a:t>また、教員も授業の内容を覚えているうちに学生からのフィードバックを得られるので今までよりもさらに授業の品質が向上します。</a:t>
+            </a:r>
+          </a:p>
+          <a:p>
+            <a:endParaRPr kumimoji="1" lang="ja-JP" altLang="en-US" dirty="0" smtClean="0"/>
+          </a:p>
+          <a:p>
+            <a:endParaRPr kumimoji="1" lang="ja-JP" altLang="en-US" dirty="0"/>
+          </a:p>
+        </p:txBody>
+      </p:sp>
+      <p:sp>
+        <p:nvSpPr>
+          <p:cNvPr id="4" name="スライド番号プレースホルダー 3"/>
+          <p:cNvSpPr>
+            <a:spLocks noGrp="1"/>
+          </p:cNvSpPr>
+          <p:nvPr>
+            <p:ph type="sldNum" sz="quarter" idx="10"/>
+          </p:nvPr>
+        </p:nvSpPr>
+        <p:spPr/>
+        <p:txBody>
+          <a:bodyPr/>
+          <a:lstStyle/>
+          <a:p>
+            <a:fld id="{DE4497FE-1A65-4799-B01D-44564FDEC19E}" type="slidenum">
+              <a:rPr kumimoji="1" lang="ja-JP" altLang="en-US" smtClean="0"/>
+              <a:t>9</a:t>
+            </a:fld>
+            <a:endParaRPr kumimoji="1" lang="ja-JP" altLang="en-US"/>
+          </a:p>
+        </p:txBody>
+      </p:sp>
+    </p:spTree>
+    <p:extLst>
+      <p:ext uri="{BB962C8B-B14F-4D97-AF65-F5344CB8AC3E}">
+        <p14:creationId xmlns:p14="http://schemas.microsoft.com/office/powerpoint/2010/main" val="254944331"/>
       </p:ext>
     </p:extLst>
   </p:cSld>
@@ -3988,6 +5129,10 @@
           <a:bodyPr/>
           <a:lstStyle/>
           <a:p>
+            <a:r>
+              <a:rPr kumimoji="1" lang="ja-JP" altLang="en-US" dirty="0" smtClean="0"/>
+              <a:t>まとめ</a:t>
+            </a:r>
             <a:endParaRPr kumimoji="1" lang="ja-JP" altLang="en-US" dirty="0"/>
           </a:p>
         </p:txBody>
@@ -4004,35 +5149,59 @@
         </p:nvSpPr>
         <p:spPr/>
         <p:txBody>
-          <a:bodyPr>
-            <a:normAutofit/>
-          </a:bodyPr>
-          <a:lstStyle/>
-          <a:p>
-            <a:pPr marL="457200" lvl="1" indent="0">
-              <a:buNone/>
-            </a:pPr>
-            <a:endParaRPr lang="en-US" altLang="ja-JP" sz="3600" dirty="0" smtClean="0"/>
+          <a:bodyPr/>
+          <a:lstStyle/>
+          <a:p>
+            <a:r>
+              <a:rPr kumimoji="1" lang="en-US" altLang="ja-JP" dirty="0" smtClean="0"/>
+              <a:t>Web</a:t>
+            </a:r>
+            <a:r>
+              <a:rPr lang="ja-JP" altLang="en-US" dirty="0" smtClean="0"/>
+              <a:t>プログラミングで授業評価アンケートを作成した</a:t>
+            </a:r>
+            <a:endParaRPr lang="en-US" altLang="ja-JP" dirty="0" smtClean="0"/>
+          </a:p>
+          <a:p>
+            <a:endParaRPr kumimoji="1" lang="en-US" altLang="ja-JP" dirty="0"/>
+          </a:p>
+          <a:p>
+            <a:r>
+              <a:rPr lang="ja-JP" altLang="en-US" dirty="0" smtClean="0"/>
+              <a:t>経済性の改善、教員の労力削減、ユーザ体験の向上が実現した</a:t>
+            </a:r>
+            <a:endParaRPr lang="en-US" altLang="ja-JP" dirty="0" smtClean="0"/>
+          </a:p>
+          <a:p>
+            <a:endParaRPr kumimoji="1" lang="en-US" altLang="ja-JP" dirty="0"/>
+          </a:p>
+          <a:p>
+            <a:r>
+              <a:rPr lang="ja-JP" altLang="en-US" dirty="0" smtClean="0"/>
+              <a:t>新機能を</a:t>
+            </a:r>
+            <a:r>
+              <a:rPr lang="ja-JP" altLang="en-US" dirty="0"/>
+              <a:t>実装</a:t>
+            </a:r>
+            <a:r>
+              <a:rPr lang="ja-JP" altLang="en-US" dirty="0" smtClean="0"/>
+              <a:t>することで高専の授業のさらなる品質向上に貢献できる。</a:t>
+            </a:r>
+            <a:endParaRPr kumimoji="1" lang="ja-JP" altLang="en-US" dirty="0"/>
           </a:p>
         </p:txBody>
       </p:sp>
     </p:spTree>
     <p:extLst>
       <p:ext uri="{BB962C8B-B14F-4D97-AF65-F5344CB8AC3E}">
-        <p14:creationId xmlns:p14="http://schemas.microsoft.com/office/powerpoint/2010/main" val="3591337185"/>
+        <p14:creationId xmlns:p14="http://schemas.microsoft.com/office/powerpoint/2010/main" val="1114868748"/>
       </p:ext>
     </p:extLst>
   </p:cSld>
   <p:clrMapOvr>
     <a:masterClrMapping/>
   </p:clrMapOvr>
-  <p:timing>
-    <p:tnLst>
-      <p:par>
-        <p:cTn id="1" dur="indefinite" restart="never" nodeType="tmRoot"/>
-      </p:par>
-    </p:tnLst>
-  </p:timing>
 </p:sld>
 </file>
 
@@ -4094,7 +5263,7 @@
     </p:spTree>
     <p:extLst>
       <p:ext uri="{BB962C8B-B14F-4D97-AF65-F5344CB8AC3E}">
-        <p14:creationId xmlns:p14="http://schemas.microsoft.com/office/powerpoint/2010/main" val="1019220225"/>
+        <p14:creationId xmlns:p14="http://schemas.microsoft.com/office/powerpoint/2010/main" val="2117521921"/>
       </p:ext>
     </p:extLst>
   </p:cSld>
@@ -4143,14 +5312,6 @@
           <a:bodyPr/>
           <a:lstStyle/>
           <a:p>
-            <a:r>
-              <a:rPr kumimoji="1" lang="en-US" altLang="ja-JP" dirty="0" smtClean="0"/>
-              <a:t>WEB</a:t>
-            </a:r>
-            <a:r>
-              <a:rPr kumimoji="1" lang="ja-JP" altLang="en-US" dirty="0" smtClean="0"/>
-              <a:t>プログラミングの現状</a:t>
-            </a:r>
             <a:endParaRPr kumimoji="1" lang="ja-JP" altLang="en-US" dirty="0"/>
           </a:p>
         </p:txBody>
@@ -4172,101 +5333,9 @@
           </a:bodyPr>
           <a:lstStyle/>
           <a:p>
-            <a:r>
-              <a:rPr kumimoji="1" lang="ja-JP" altLang="en-US" dirty="0" smtClean="0"/>
-              <a:t>無料の学習環境</a:t>
-            </a:r>
-            <a:endParaRPr lang="en-US" altLang="ja-JP" dirty="0" smtClean="0"/>
-          </a:p>
-          <a:p>
-            <a:pPr lvl="1"/>
-            <a:r>
-              <a:rPr lang="ja-JP" altLang="en-US" dirty="0"/>
-              <a:t>ドット</a:t>
-            </a:r>
-            <a:r>
-              <a:rPr lang="ja-JP" altLang="en-US" dirty="0" smtClean="0"/>
-              <a:t>インストール</a:t>
-            </a:r>
-            <a:endParaRPr lang="en-US" altLang="ja-JP" dirty="0" smtClean="0"/>
-          </a:p>
-          <a:p>
-            <a:pPr lvl="1"/>
-            <a:r>
-              <a:rPr lang="en-US" altLang="ja-JP" dirty="0" err="1" smtClean="0"/>
-              <a:t>Qiita</a:t>
-            </a:r>
-            <a:endParaRPr lang="en-US" altLang="ja-JP" dirty="0" smtClean="0"/>
-          </a:p>
-          <a:p>
-            <a:endParaRPr lang="en-US" altLang="ja-JP" dirty="0"/>
-          </a:p>
-          <a:p>
-            <a:r>
-              <a:rPr lang="ja-JP" altLang="en-US" dirty="0" smtClean="0"/>
-              <a:t>外部ライブラリの充実</a:t>
-            </a:r>
-            <a:endParaRPr lang="en-US" altLang="ja-JP" dirty="0" smtClean="0"/>
-          </a:p>
-          <a:p>
-            <a:pPr lvl="1"/>
-            <a:r>
-              <a:rPr lang="ja-JP" altLang="en-US" dirty="0" smtClean="0"/>
-              <a:t>各種フレームワークなど</a:t>
-            </a:r>
-            <a:endParaRPr lang="en-US" altLang="ja-JP" dirty="0" smtClean="0"/>
-          </a:p>
-          <a:p>
-            <a:endParaRPr lang="en-US" altLang="ja-JP" dirty="0"/>
-          </a:p>
-          <a:p>
-            <a:endParaRPr kumimoji="1" lang="ja-JP" altLang="en-US" dirty="0"/>
-          </a:p>
-        </p:txBody>
-      </p:sp>
-      <p:sp>
-        <p:nvSpPr>
-          <p:cNvPr id="4" name="正方形/長方形 3"/>
-          <p:cNvSpPr/>
-          <p:nvPr/>
-        </p:nvSpPr>
-        <p:spPr>
-          <a:xfrm>
-            <a:off x="551792" y="5333507"/>
-            <a:ext cx="8261132" cy="756745"/>
-          </a:xfrm>
-          <a:prstGeom prst="rect">
-            <a:avLst/>
-          </a:prstGeom>
-        </p:spPr>
-        <p:style>
-          <a:lnRef idx="2">
-            <a:schemeClr val="accent1">
-              <a:shade val="50000"/>
-            </a:schemeClr>
-          </a:lnRef>
-          <a:fillRef idx="1">
-            <a:schemeClr val="accent1"/>
-          </a:fillRef>
-          <a:effectRef idx="0">
-            <a:schemeClr val="accent1"/>
-          </a:effectRef>
-          <a:fontRef idx="minor">
-            <a:schemeClr val="lt1"/>
-          </a:fontRef>
-        </p:style>
-        <p:txBody>
-          <a:bodyPr rtlCol="0" anchor="ctr"/>
-          <a:lstStyle/>
-          <a:p>
-            <a:r>
-              <a:rPr lang="en-US" altLang="ja-JP" sz="3600" dirty="0" smtClean="0"/>
-              <a:t>WEB</a:t>
-            </a:r>
-            <a:r>
-              <a:rPr lang="ja-JP" altLang="en-US" sz="3600" dirty="0" smtClean="0"/>
-              <a:t>プログラミングの敷居が下がっている</a:t>
-            </a:r>
+            <a:pPr marL="457200" lvl="1" indent="0">
+              <a:buNone/>
+            </a:pPr>
             <a:endParaRPr lang="en-US" altLang="ja-JP" sz="3600" dirty="0" smtClean="0"/>
           </a:p>
         </p:txBody>
@@ -4274,7 +5343,7 @@
     </p:spTree>
     <p:extLst>
       <p:ext uri="{BB962C8B-B14F-4D97-AF65-F5344CB8AC3E}">
-        <p14:creationId xmlns:p14="http://schemas.microsoft.com/office/powerpoint/2010/main" val="3565592007"/>
+        <p14:creationId xmlns:p14="http://schemas.microsoft.com/office/powerpoint/2010/main" val="3591337185"/>
       </p:ext>
     </p:extLst>
   </p:cSld>
@@ -4323,6 +5392,261 @@
           <a:bodyPr/>
           <a:lstStyle/>
           <a:p>
+            <a:endParaRPr kumimoji="1" lang="ja-JP" altLang="en-US"/>
+          </a:p>
+        </p:txBody>
+      </p:sp>
+      <p:sp>
+        <p:nvSpPr>
+          <p:cNvPr id="3" name="コンテンツ プレースホルダー 2"/>
+          <p:cNvSpPr>
+            <a:spLocks noGrp="1"/>
+          </p:cNvSpPr>
+          <p:nvPr>
+            <p:ph idx="1"/>
+          </p:nvPr>
+        </p:nvSpPr>
+        <p:spPr/>
+        <p:txBody>
+          <a:bodyPr/>
+          <a:lstStyle/>
+          <a:p>
+            <a:endParaRPr kumimoji="1" lang="ja-JP" altLang="en-US"/>
+          </a:p>
+        </p:txBody>
+      </p:sp>
+    </p:spTree>
+    <p:extLst>
+      <p:ext uri="{BB962C8B-B14F-4D97-AF65-F5344CB8AC3E}">
+        <p14:creationId xmlns:p14="http://schemas.microsoft.com/office/powerpoint/2010/main" val="1019220225"/>
+      </p:ext>
+    </p:extLst>
+  </p:cSld>
+  <p:clrMapOvr>
+    <a:masterClrMapping/>
+  </p:clrMapOvr>
+  <p:timing>
+    <p:tnLst>
+      <p:par>
+        <p:cTn id="1" dur="indefinite" restart="never" nodeType="tmRoot"/>
+      </p:par>
+    </p:tnLst>
+  </p:timing>
+</p:sld>
+</file>
+
+<file path=ppt/slides/slide14.xml><?xml version="1.0" encoding="utf-8"?>
+<p:sld xmlns:a="http://schemas.openxmlformats.org/drawingml/2006/main" xmlns:r="http://schemas.openxmlformats.org/officeDocument/2006/relationships" xmlns:p="http://schemas.openxmlformats.org/presentationml/2006/main">
+  <p:cSld>
+    <p:spTree>
+      <p:nvGrpSpPr>
+        <p:cNvPr id="1" name=""/>
+        <p:cNvGrpSpPr/>
+        <p:nvPr/>
+      </p:nvGrpSpPr>
+      <p:grpSpPr>
+        <a:xfrm>
+          <a:off x="0" y="0"/>
+          <a:ext cx="0" cy="0"/>
+          <a:chOff x="0" y="0"/>
+          <a:chExt cx="0" cy="0"/>
+        </a:xfrm>
+      </p:grpSpPr>
+      <p:sp>
+        <p:nvSpPr>
+          <p:cNvPr id="2" name="タイトル 1"/>
+          <p:cNvSpPr>
+            <a:spLocks noGrp="1"/>
+          </p:cNvSpPr>
+          <p:nvPr>
+            <p:ph type="title"/>
+          </p:nvPr>
+        </p:nvSpPr>
+        <p:spPr/>
+        <p:txBody>
+          <a:bodyPr/>
+          <a:lstStyle/>
+          <a:p>
+            <a:r>
+              <a:rPr kumimoji="1" lang="en-US" altLang="ja-JP" dirty="0" smtClean="0"/>
+              <a:t>WEB</a:t>
+            </a:r>
+            <a:r>
+              <a:rPr kumimoji="1" lang="ja-JP" altLang="en-US" dirty="0" smtClean="0"/>
+              <a:t>プログラミングの現状</a:t>
+            </a:r>
+            <a:endParaRPr kumimoji="1" lang="ja-JP" altLang="en-US" dirty="0"/>
+          </a:p>
+        </p:txBody>
+      </p:sp>
+      <p:sp>
+        <p:nvSpPr>
+          <p:cNvPr id="3" name="コンテンツ プレースホルダー 2"/>
+          <p:cNvSpPr>
+            <a:spLocks noGrp="1"/>
+          </p:cNvSpPr>
+          <p:nvPr>
+            <p:ph idx="1"/>
+          </p:nvPr>
+        </p:nvSpPr>
+        <p:spPr/>
+        <p:txBody>
+          <a:bodyPr>
+            <a:normAutofit/>
+          </a:bodyPr>
+          <a:lstStyle/>
+          <a:p>
+            <a:r>
+              <a:rPr kumimoji="1" lang="ja-JP" altLang="en-US" dirty="0" smtClean="0"/>
+              <a:t>無料の学習環境</a:t>
+            </a:r>
+            <a:endParaRPr lang="en-US" altLang="ja-JP" dirty="0" smtClean="0"/>
+          </a:p>
+          <a:p>
+            <a:pPr lvl="1"/>
+            <a:r>
+              <a:rPr lang="ja-JP" altLang="en-US" dirty="0"/>
+              <a:t>ドット</a:t>
+            </a:r>
+            <a:r>
+              <a:rPr lang="ja-JP" altLang="en-US" dirty="0" smtClean="0"/>
+              <a:t>インストール</a:t>
+            </a:r>
+            <a:endParaRPr lang="en-US" altLang="ja-JP" dirty="0" smtClean="0"/>
+          </a:p>
+          <a:p>
+            <a:pPr lvl="1"/>
+            <a:r>
+              <a:rPr lang="en-US" altLang="ja-JP" dirty="0" err="1" smtClean="0"/>
+              <a:t>Qiita</a:t>
+            </a:r>
+            <a:endParaRPr lang="en-US" altLang="ja-JP" dirty="0" smtClean="0"/>
+          </a:p>
+          <a:p>
+            <a:endParaRPr lang="en-US" altLang="ja-JP" dirty="0"/>
+          </a:p>
+          <a:p>
+            <a:r>
+              <a:rPr lang="ja-JP" altLang="en-US" dirty="0" smtClean="0"/>
+              <a:t>外部ライブラリの充実</a:t>
+            </a:r>
+            <a:endParaRPr lang="en-US" altLang="ja-JP" dirty="0" smtClean="0"/>
+          </a:p>
+          <a:p>
+            <a:pPr lvl="1"/>
+            <a:r>
+              <a:rPr lang="ja-JP" altLang="en-US" dirty="0" smtClean="0"/>
+              <a:t>各種フレームワークなど</a:t>
+            </a:r>
+            <a:endParaRPr lang="en-US" altLang="ja-JP" dirty="0" smtClean="0"/>
+          </a:p>
+          <a:p>
+            <a:endParaRPr lang="en-US" altLang="ja-JP" dirty="0"/>
+          </a:p>
+          <a:p>
+            <a:endParaRPr kumimoji="1" lang="ja-JP" altLang="en-US" dirty="0"/>
+          </a:p>
+        </p:txBody>
+      </p:sp>
+      <p:sp>
+        <p:nvSpPr>
+          <p:cNvPr id="4" name="正方形/長方形 3"/>
+          <p:cNvSpPr/>
+          <p:nvPr/>
+        </p:nvSpPr>
+        <p:spPr>
+          <a:xfrm>
+            <a:off x="551792" y="5333507"/>
+            <a:ext cx="8261132" cy="756745"/>
+          </a:xfrm>
+          <a:prstGeom prst="rect">
+            <a:avLst/>
+          </a:prstGeom>
+        </p:spPr>
+        <p:style>
+          <a:lnRef idx="2">
+            <a:schemeClr val="accent1">
+              <a:shade val="50000"/>
+            </a:schemeClr>
+          </a:lnRef>
+          <a:fillRef idx="1">
+            <a:schemeClr val="accent1"/>
+          </a:fillRef>
+          <a:effectRef idx="0">
+            <a:schemeClr val="accent1"/>
+          </a:effectRef>
+          <a:fontRef idx="minor">
+            <a:schemeClr val="lt1"/>
+          </a:fontRef>
+        </p:style>
+        <p:txBody>
+          <a:bodyPr rtlCol="0" anchor="ctr"/>
+          <a:lstStyle/>
+          <a:p>
+            <a:r>
+              <a:rPr lang="en-US" altLang="ja-JP" sz="3600" dirty="0" smtClean="0"/>
+              <a:t>WEB</a:t>
+            </a:r>
+            <a:r>
+              <a:rPr lang="ja-JP" altLang="en-US" sz="3600" dirty="0" smtClean="0"/>
+              <a:t>プログラミングの敷居が下がっている</a:t>
+            </a:r>
+            <a:endParaRPr lang="en-US" altLang="ja-JP" sz="3600" dirty="0" smtClean="0"/>
+          </a:p>
+        </p:txBody>
+      </p:sp>
+    </p:spTree>
+    <p:extLst>
+      <p:ext uri="{BB962C8B-B14F-4D97-AF65-F5344CB8AC3E}">
+        <p14:creationId xmlns:p14="http://schemas.microsoft.com/office/powerpoint/2010/main" val="3565592007"/>
+      </p:ext>
+    </p:extLst>
+  </p:cSld>
+  <p:clrMapOvr>
+    <a:masterClrMapping/>
+  </p:clrMapOvr>
+  <p:timing>
+    <p:tnLst>
+      <p:par>
+        <p:cTn id="1" dur="indefinite" restart="never" nodeType="tmRoot"/>
+      </p:par>
+    </p:tnLst>
+  </p:timing>
+</p:sld>
+</file>
+
+<file path=ppt/slides/slide15.xml><?xml version="1.0" encoding="utf-8"?>
+<p:sld xmlns:a="http://schemas.openxmlformats.org/drawingml/2006/main" xmlns:r="http://schemas.openxmlformats.org/officeDocument/2006/relationships" xmlns:p="http://schemas.openxmlformats.org/presentationml/2006/main">
+  <p:cSld>
+    <p:spTree>
+      <p:nvGrpSpPr>
+        <p:cNvPr id="1" name=""/>
+        <p:cNvGrpSpPr/>
+        <p:nvPr/>
+      </p:nvGrpSpPr>
+      <p:grpSpPr>
+        <a:xfrm>
+          <a:off x="0" y="0"/>
+          <a:ext cx="0" cy="0"/>
+          <a:chOff x="0" y="0"/>
+          <a:chExt cx="0" cy="0"/>
+        </a:xfrm>
+      </p:grpSpPr>
+      <p:sp>
+        <p:nvSpPr>
+          <p:cNvPr id="2" name="タイトル 1"/>
+          <p:cNvSpPr>
+            <a:spLocks noGrp="1"/>
+          </p:cNvSpPr>
+          <p:nvPr>
+            <p:ph type="title"/>
+          </p:nvPr>
+        </p:nvSpPr>
+        <p:spPr/>
+        <p:txBody>
+          <a:bodyPr/>
+          <a:lstStyle/>
+          <a:p>
             <a:r>
               <a:rPr lang="ja-JP" altLang="en-US" dirty="0" smtClean="0"/>
               <a:t>シングルページ</a:t>
@@ -4468,7 +5792,7 @@
 </p:sld>
 </file>
 
-<file path=ppt/slides/slide14.xml><?xml version="1.0" encoding="utf-8"?>
+<file path=ppt/slides/slide16.xml><?xml version="1.0" encoding="utf-8"?>
 <p:sld xmlns:a="http://schemas.openxmlformats.org/drawingml/2006/main" xmlns:r="http://schemas.openxmlformats.org/officeDocument/2006/relationships" xmlns:p="http://schemas.openxmlformats.org/presentationml/2006/main">
   <p:cSld>
     <p:spTree>
@@ -4673,12 +5997,28 @@
           <a:lstStyle/>
           <a:p>
             <a:r>
+              <a:rPr kumimoji="1" lang="ja-JP" altLang="en-US" dirty="0" smtClean="0"/>
+              <a:t>今までマークシート方式で行われていた授業評価アンケートを</a:t>
+            </a:r>
+            <a:r>
               <a:rPr kumimoji="1" lang="en-US" altLang="ja-JP" dirty="0" smtClean="0"/>
               <a:t>Web</a:t>
             </a:r>
             <a:r>
               <a:rPr kumimoji="1" lang="ja-JP" altLang="en-US" dirty="0" smtClean="0"/>
-              <a:t>上で授業評価アンケートを実施する</a:t>
+              <a:t>上</a:t>
+            </a:r>
+            <a:r>
+              <a:rPr lang="ja-JP" altLang="en-US" dirty="0"/>
+              <a:t>で</a:t>
+            </a:r>
+            <a:r>
+              <a:rPr kumimoji="1" lang="ja-JP" altLang="en-US" dirty="0" smtClean="0"/>
+              <a:t>実施</a:t>
+            </a:r>
+            <a:r>
+              <a:rPr kumimoji="1" lang="ja-JP" altLang="en-US" dirty="0" smtClean="0"/>
+              <a:t>する</a:t>
             </a:r>
             <a:endParaRPr kumimoji="1" lang="ja-JP" altLang="en-US" dirty="0"/>
           </a:p>
@@ -4761,44 +6101,26 @@
           <a:p>
             <a:r>
               <a:rPr kumimoji="1" lang="ja-JP" altLang="en-US" dirty="0" smtClean="0"/>
-              <a:t>従来の授業評価アンケート</a:t>
-            </a:r>
-            <a:endParaRPr kumimoji="1" lang="en-US" altLang="ja-JP" dirty="0" smtClean="0"/>
+              <a:t>マークシート方式の欠点</a:t>
+            </a:r>
+            <a:endParaRPr lang="en-US" altLang="ja-JP" dirty="0"/>
           </a:p>
           <a:p>
             <a:pPr lvl="1"/>
             <a:r>
-              <a:rPr kumimoji="1" lang="ja-JP" altLang="en-US" dirty="0" smtClean="0"/>
-              <a:t>マークシート方式が主流</a:t>
-            </a:r>
-            <a:endParaRPr kumimoji="1" lang="en-US" altLang="ja-JP" dirty="0" smtClean="0"/>
-          </a:p>
-          <a:p>
-            <a:pPr lvl="2"/>
-            <a:r>
-              <a:rPr lang="ja-JP" altLang="en-US" dirty="0" smtClean="0"/>
-              <a:t>紙</a:t>
-            </a:r>
-            <a:r>
               <a:rPr lang="ja-JP" altLang="en-US" dirty="0"/>
-              <a:t>資源</a:t>
-            </a:r>
-            <a:r>
-              <a:rPr lang="ja-JP" altLang="en-US" dirty="0" smtClean="0"/>
-              <a:t>の大量消費</a:t>
-            </a:r>
-            <a:endParaRPr lang="en-US" altLang="ja-JP" dirty="0" smtClean="0"/>
-          </a:p>
-          <a:p>
-            <a:pPr lvl="2"/>
-            <a:r>
-              <a:rPr kumimoji="1" lang="ja-JP" altLang="en-US" dirty="0" smtClean="0"/>
+              <a:t>紙資源の大量消費</a:t>
+            </a:r>
+          </a:p>
+          <a:p>
+            <a:pPr lvl="1"/>
+            <a:r>
+              <a:rPr lang="ja-JP" altLang="en-US" dirty="0"/>
               <a:t>教員がアンケートを集計する必要がある</a:t>
             </a:r>
-            <a:endParaRPr kumimoji="1" lang="en-US" altLang="ja-JP" dirty="0" smtClean="0"/>
-          </a:p>
-          <a:p>
-            <a:pPr lvl="2"/>
+          </a:p>
+          <a:p>
+            <a:pPr lvl="1"/>
             <a:endParaRPr kumimoji="1" lang="en-US" altLang="ja-JP" dirty="0" smtClean="0"/>
           </a:p>
           <a:p>
@@ -5186,26 +6508,66 @@
               <a:rPr kumimoji="1" lang="ja-JP" altLang="en-US" dirty="0" smtClean="0"/>
               <a:t>経済性</a:t>
             </a:r>
+            <a:endParaRPr kumimoji="1" lang="en-US" altLang="ja-JP" dirty="0" smtClean="0"/>
+          </a:p>
+          <a:p>
+            <a:pPr lvl="2"/>
+            <a:r>
+              <a:rPr lang="ja-JP" altLang="en-US" dirty="0" smtClean="0"/>
+              <a:t>紙資源をまったく使用していない。</a:t>
+            </a:r>
             <a:endParaRPr lang="en-US" altLang="ja-JP" dirty="0" smtClean="0"/>
           </a:p>
           <a:p>
             <a:pPr lvl="1"/>
             <a:r>
-              <a:rPr kumimoji="1" lang="ja-JP" altLang="en-US" dirty="0" smtClean="0"/>
+              <a:rPr lang="ja-JP" altLang="en-US" dirty="0" smtClean="0"/>
+              <a:t>教員</a:t>
+            </a:r>
+            <a:r>
+              <a:rPr lang="ja-JP" altLang="en-US" dirty="0"/>
+              <a:t>の労力</a:t>
+            </a:r>
+            <a:r>
+              <a:rPr lang="ja-JP" altLang="en-US" dirty="0" smtClean="0"/>
+              <a:t>削減</a:t>
+            </a:r>
+            <a:endParaRPr lang="en-US" altLang="ja-JP" dirty="0" smtClean="0"/>
+          </a:p>
+          <a:p>
+            <a:pPr lvl="2"/>
+            <a:r>
+              <a:rPr lang="ja-JP" altLang="en-US" dirty="0" smtClean="0"/>
+              <a:t>スキャン不要で自動的にアンケート結果をＰＣに取り込める。</a:t>
+            </a:r>
+            <a:endParaRPr lang="en-US" altLang="ja-JP" dirty="0" smtClean="0"/>
+          </a:p>
+          <a:p>
+            <a:pPr lvl="1"/>
+            <a:r>
+              <a:rPr lang="ja-JP" altLang="en-US" dirty="0"/>
               <a:t>ユーザ体験の</a:t>
             </a:r>
             <a:r>
-              <a:rPr kumimoji="1" lang="ja-JP" altLang="en-US" dirty="0" smtClean="0"/>
+              <a:rPr lang="ja-JP" altLang="en-US" dirty="0" smtClean="0"/>
               <a:t>向上</a:t>
             </a:r>
-            <a:endParaRPr kumimoji="1" lang="en-US" altLang="ja-JP" dirty="0" smtClean="0"/>
+            <a:endParaRPr lang="en-US" altLang="ja-JP" dirty="0" smtClean="0"/>
+          </a:p>
+          <a:p>
+            <a:pPr lvl="2"/>
+            <a:r>
+              <a:rPr lang="ja-JP" altLang="en-US" dirty="0"/>
+              <a:t>動</a:t>
+            </a:r>
+            <a:r>
+              <a:rPr lang="ja-JP" altLang="en-US" dirty="0" smtClean="0"/>
+              <a:t>きあるＵＩで快適に回答できた。</a:t>
+            </a:r>
+            <a:endParaRPr lang="en-US" altLang="ja-JP" dirty="0"/>
           </a:p>
           <a:p>
             <a:pPr lvl="1"/>
-            <a:r>
-              <a:rPr lang="ja-JP" altLang="en-US" dirty="0"/>
-              <a:t>教員の労力削減</a:t>
-            </a:r>
             <a:endParaRPr lang="en-US" altLang="ja-JP" dirty="0"/>
           </a:p>
           <a:p>
@@ -5296,36 +6658,8 @@
           <a:lstStyle/>
           <a:p>
             <a:r>
-              <a:rPr lang="ja-JP" altLang="en-US" dirty="0"/>
-              <a:t>新機能</a:t>
-            </a:r>
-            <a:r>
-              <a:rPr lang="ja-JP" altLang="en-US" dirty="0" smtClean="0"/>
-              <a:t>の実装</a:t>
-            </a:r>
-            <a:endParaRPr lang="en-US" altLang="ja-JP" dirty="0" smtClean="0"/>
-          </a:p>
-          <a:p>
-            <a:pPr lvl="1"/>
-            <a:r>
-              <a:rPr lang="ja-JP" altLang="en-US" dirty="0"/>
-              <a:t>結果の自動</a:t>
-            </a:r>
-            <a:r>
-              <a:rPr lang="ja-JP" altLang="en-US" dirty="0" smtClean="0"/>
-              <a:t>集計機能</a:t>
-            </a:r>
-            <a:endParaRPr lang="en-US" altLang="ja-JP" dirty="0" smtClean="0"/>
-          </a:p>
-          <a:p>
-            <a:pPr lvl="1"/>
-            <a:r>
-              <a:rPr kumimoji="1" lang="ja-JP" altLang="en-US" dirty="0"/>
-              <a:t>結果</a:t>
-            </a:r>
-            <a:r>
               <a:rPr kumimoji="1" lang="ja-JP" altLang="en-US" dirty="0" smtClean="0"/>
-              <a:t>の自動配信機能</a:t>
+              <a:t>授業の品質向上に貢献するアプリケーションに成長させたい</a:t>
             </a:r>
             <a:endParaRPr kumimoji="1" lang="en-US" altLang="ja-JP" dirty="0" smtClean="0"/>
           </a:p>
@@ -5341,6 +6675,13 @@
   <p:clrMapOvr>
     <a:masterClrMapping/>
   </p:clrMapOvr>
+  <p:timing>
+    <p:tnLst>
+      <p:par>
+        <p:cTn id="1" dur="indefinite" restart="never" nodeType="tmRoot"/>
+      </p:par>
+    </p:tnLst>
+  </p:timing>
 </p:sld>
 </file>
 
@@ -5401,46 +6742,45 @@
           <a:p>
             <a:r>
               <a:rPr lang="ja-JP" altLang="en-US" dirty="0" smtClean="0"/>
-              <a:t>今回作成した</a:t>
+              <a:t>追加したい新機能</a:t>
             </a:r>
             <a:endParaRPr lang="en-US" altLang="ja-JP" dirty="0" smtClean="0"/>
           </a:p>
           <a:p>
             <a:pPr lvl="1"/>
             <a:r>
+              <a:rPr lang="ja-JP" altLang="en-US" dirty="0" smtClean="0"/>
+              <a:t>アンケート結果</a:t>
+            </a:r>
+            <a:r>
               <a:rPr lang="ja-JP" altLang="en-US" dirty="0"/>
-              <a:t>結果の自動</a:t>
-            </a:r>
-            <a:r>
-              <a:rPr lang="ja-JP" altLang="en-US" dirty="0" smtClean="0"/>
-              <a:t>集計機能</a:t>
+              <a:t>の自動</a:t>
+            </a:r>
+            <a:r>
+              <a:rPr lang="ja-JP" altLang="en-US" dirty="0" smtClean="0"/>
+              <a:t>集計、配信機能</a:t>
             </a:r>
             <a:endParaRPr lang="en-US" altLang="ja-JP" dirty="0" smtClean="0"/>
-          </a:p>
-          <a:p>
-            <a:pPr lvl="1"/>
-            <a:r>
-              <a:rPr kumimoji="1" lang="ja-JP" altLang="en-US" dirty="0"/>
-              <a:t>結果</a:t>
-            </a:r>
-            <a:r>
-              <a:rPr kumimoji="1" lang="ja-JP" altLang="en-US" dirty="0" smtClean="0"/>
-              <a:t>の自動配信機能</a:t>
-            </a:r>
-            <a:endParaRPr kumimoji="1" lang="en-US" altLang="ja-JP" dirty="0" smtClean="0"/>
           </a:p>
         </p:txBody>
       </p:sp>
     </p:spTree>
     <p:extLst>
       <p:ext uri="{BB962C8B-B14F-4D97-AF65-F5344CB8AC3E}">
-        <p14:creationId xmlns:p14="http://schemas.microsoft.com/office/powerpoint/2010/main" val="3755367451"/>
+        <p14:creationId xmlns:p14="http://schemas.microsoft.com/office/powerpoint/2010/main" val="2916584370"/>
       </p:ext>
     </p:extLst>
   </p:cSld>
   <p:clrMapOvr>
     <a:masterClrMapping/>
   </p:clrMapOvr>
+  <p:timing>
+    <p:tnLst>
+      <p:par>
+        <p:cTn id="1" dur="indefinite" restart="never" nodeType="tmRoot"/>
+      </p:par>
+    </p:tnLst>
+  </p:timing>
 </p:sld>
 </file>
 
@@ -5476,7 +6816,11 @@
           <a:bodyPr/>
           <a:lstStyle/>
           <a:p>
-            <a:endParaRPr kumimoji="1" lang="ja-JP" altLang="en-US"/>
+            <a:r>
+              <a:rPr lang="ja-JP" altLang="en-US" dirty="0"/>
+              <a:t>今後の展望</a:t>
+            </a:r>
+            <a:endParaRPr kumimoji="1" lang="ja-JP" altLang="en-US" dirty="0"/>
           </a:p>
         </p:txBody>
       </p:sp>
@@ -5495,20 +6839,42 @@
           <a:bodyPr/>
           <a:lstStyle/>
           <a:p>
-            <a:endParaRPr kumimoji="1" lang="ja-JP" altLang="en-US"/>
+            <a:r>
+              <a:rPr lang="ja-JP" altLang="en-US" dirty="0"/>
+              <a:t>これらの新機能を実装することで</a:t>
+            </a:r>
+            <a:r>
+              <a:rPr lang="ja-JP" altLang="en-US" dirty="0" smtClean="0"/>
+              <a:t>、授業終了後に学生がすぐに今回の授業を評価することができ、より正確な意見が収集できます。</a:t>
+            </a:r>
+            <a:endParaRPr lang="en-US" altLang="ja-JP" dirty="0" smtClean="0"/>
+          </a:p>
+          <a:p>
+            <a:r>
+              <a:rPr lang="ja-JP" altLang="en-US" dirty="0" smtClean="0"/>
+              <a:t>また、教員も授業の内容を覚えているうちに学生からのフィードバックを得られるので今までよりもさらに授業の品質が向上します。</a:t>
+            </a:r>
+            <a:endParaRPr kumimoji="1" lang="en-US" altLang="ja-JP" dirty="0" smtClean="0"/>
           </a:p>
         </p:txBody>
       </p:sp>
     </p:spTree>
     <p:extLst>
       <p:ext uri="{BB962C8B-B14F-4D97-AF65-F5344CB8AC3E}">
-        <p14:creationId xmlns:p14="http://schemas.microsoft.com/office/powerpoint/2010/main" val="2117521921"/>
+        <p14:creationId xmlns:p14="http://schemas.microsoft.com/office/powerpoint/2010/main" val="3755367451"/>
       </p:ext>
     </p:extLst>
   </p:cSld>
   <p:clrMapOvr>
     <a:masterClrMapping/>
   </p:clrMapOvr>
+  <p:timing>
+    <p:tnLst>
+      <p:par>
+        <p:cTn id="1" dur="indefinite" restart="never" nodeType="tmRoot"/>
+      </p:par>
+    </p:tnLst>
+  </p:timing>
 </p:sld>
 </file>
 

</xml_diff>

<commit_message>
1st completion of presentation slide
</commit_message>
<xml_diff>
--- a/卒業研究発表スライド.pptx
+++ b/卒業研究発表スライド.pptx
@@ -5,7 +5,7 @@
     <p:sldMasterId id="2147483660" r:id="rId1"/>
   </p:sldMasterIdLst>
   <p:notesMasterIdLst>
-    <p:notesMasterId r:id="rId18"/>
+    <p:notesMasterId r:id="rId19"/>
   </p:notesMasterIdLst>
   <p:sldIdLst>
     <p:sldId id="256" r:id="rId2"/>
@@ -14,16 +14,17 @@
     <p:sldId id="262" r:id="rId5"/>
     <p:sldId id="263" r:id="rId6"/>
     <p:sldId id="264" r:id="rId7"/>
-    <p:sldId id="267" r:id="rId8"/>
-    <p:sldId id="270" r:id="rId9"/>
-    <p:sldId id="269" r:id="rId10"/>
-    <p:sldId id="271" r:id="rId11"/>
-    <p:sldId id="268" r:id="rId12"/>
-    <p:sldId id="265" r:id="rId13"/>
-    <p:sldId id="266" r:id="rId14"/>
-    <p:sldId id="257" r:id="rId15"/>
-    <p:sldId id="258" r:id="rId16"/>
-    <p:sldId id="259" r:id="rId17"/>
+    <p:sldId id="274" r:id="rId8"/>
+    <p:sldId id="271" r:id="rId9"/>
+    <p:sldId id="268" r:id="rId10"/>
+    <p:sldId id="267" r:id="rId11"/>
+    <p:sldId id="269" r:id="rId12"/>
+    <p:sldId id="272" r:id="rId13"/>
+    <p:sldId id="265" r:id="rId14"/>
+    <p:sldId id="266" r:id="rId15"/>
+    <p:sldId id="257" r:id="rId16"/>
+    <p:sldId id="258" r:id="rId17"/>
+    <p:sldId id="259" r:id="rId18"/>
   </p:sldIdLst>
   <p:sldSz cx="9144000" cy="6858000" type="screen4x3"/>
   <p:notesSz cx="6858000" cy="9144000"/>
@@ -133,6 +134,2051 @@
 </p:presentation>
 </file>
 
+<file path=ppt/diagrams/colors1.xml><?xml version="1.0" encoding="utf-8"?>
+<dgm:colorsDef xmlns:dgm="http://schemas.openxmlformats.org/drawingml/2006/diagram" xmlns:a="http://schemas.openxmlformats.org/drawingml/2006/main" uniqueId="urn:microsoft.com/office/officeart/2005/8/colors/accent1_2">
+  <dgm:title val=""/>
+  <dgm:desc val=""/>
+  <dgm:catLst>
+    <dgm:cat type="accent1" pri="11200"/>
+  </dgm:catLst>
+  <dgm:styleLbl name="node0">
+    <dgm:fillClrLst meth="repeat">
+      <a:schemeClr val="accent1"/>
+    </dgm:fillClrLst>
+    <dgm:linClrLst meth="repeat">
+      <a:schemeClr val="lt1"/>
+    </dgm:linClrLst>
+    <dgm:effectClrLst/>
+    <dgm:txLinClrLst/>
+    <dgm:txFillClrLst/>
+    <dgm:txEffectClrLst/>
+  </dgm:styleLbl>
+  <dgm:styleLbl name="alignNode1">
+    <dgm:fillClrLst meth="repeat">
+      <a:schemeClr val="accent1"/>
+    </dgm:fillClrLst>
+    <dgm:linClrLst meth="repeat">
+      <a:schemeClr val="accent1"/>
+    </dgm:linClrLst>
+    <dgm:effectClrLst/>
+    <dgm:txLinClrLst/>
+    <dgm:txFillClrLst/>
+    <dgm:txEffectClrLst/>
+  </dgm:styleLbl>
+  <dgm:styleLbl name="node1">
+    <dgm:fillClrLst meth="repeat">
+      <a:schemeClr val="accent1"/>
+    </dgm:fillClrLst>
+    <dgm:linClrLst meth="repeat">
+      <a:schemeClr val="lt1"/>
+    </dgm:linClrLst>
+    <dgm:effectClrLst/>
+    <dgm:txLinClrLst/>
+    <dgm:txFillClrLst/>
+    <dgm:txEffectClrLst/>
+  </dgm:styleLbl>
+  <dgm:styleLbl name="lnNode1">
+    <dgm:fillClrLst meth="repeat">
+      <a:schemeClr val="accent1"/>
+    </dgm:fillClrLst>
+    <dgm:linClrLst meth="repeat">
+      <a:schemeClr val="lt1"/>
+    </dgm:linClrLst>
+    <dgm:effectClrLst/>
+    <dgm:txLinClrLst/>
+    <dgm:txFillClrLst/>
+    <dgm:txEffectClrLst/>
+  </dgm:styleLbl>
+  <dgm:styleLbl name="vennNode1">
+    <dgm:fillClrLst meth="repeat">
+      <a:schemeClr val="accent1">
+        <a:alpha val="50000"/>
+      </a:schemeClr>
+    </dgm:fillClrLst>
+    <dgm:linClrLst meth="repeat">
+      <a:schemeClr val="lt1"/>
+    </dgm:linClrLst>
+    <dgm:effectClrLst/>
+    <dgm:txLinClrLst/>
+    <dgm:txFillClrLst/>
+    <dgm:txEffectClrLst/>
+  </dgm:styleLbl>
+  <dgm:styleLbl name="node2">
+    <dgm:fillClrLst meth="repeat">
+      <a:schemeClr val="accent1"/>
+    </dgm:fillClrLst>
+    <dgm:linClrLst meth="repeat">
+      <a:schemeClr val="lt1"/>
+    </dgm:linClrLst>
+    <dgm:effectClrLst/>
+    <dgm:txLinClrLst/>
+    <dgm:txFillClrLst/>
+    <dgm:txEffectClrLst/>
+  </dgm:styleLbl>
+  <dgm:styleLbl name="node3">
+    <dgm:fillClrLst meth="repeat">
+      <a:schemeClr val="accent1"/>
+    </dgm:fillClrLst>
+    <dgm:linClrLst meth="repeat">
+      <a:schemeClr val="lt1"/>
+    </dgm:linClrLst>
+    <dgm:effectClrLst/>
+    <dgm:txLinClrLst/>
+    <dgm:txFillClrLst/>
+    <dgm:txEffectClrLst/>
+  </dgm:styleLbl>
+  <dgm:styleLbl name="node4">
+    <dgm:fillClrLst meth="repeat">
+      <a:schemeClr val="accent1"/>
+    </dgm:fillClrLst>
+    <dgm:linClrLst meth="repeat">
+      <a:schemeClr val="lt1"/>
+    </dgm:linClrLst>
+    <dgm:effectClrLst/>
+    <dgm:txLinClrLst/>
+    <dgm:txFillClrLst/>
+    <dgm:txEffectClrLst/>
+  </dgm:styleLbl>
+  <dgm:styleLbl name="fgImgPlace1">
+    <dgm:fillClrLst meth="repeat">
+      <a:schemeClr val="accent1">
+        <a:tint val="50000"/>
+      </a:schemeClr>
+    </dgm:fillClrLst>
+    <dgm:linClrLst meth="repeat">
+      <a:schemeClr val="lt1"/>
+    </dgm:linClrLst>
+    <dgm:effectClrLst/>
+    <dgm:txLinClrLst/>
+    <dgm:txFillClrLst meth="repeat">
+      <a:schemeClr val="lt1"/>
+    </dgm:txFillClrLst>
+    <dgm:txEffectClrLst/>
+  </dgm:styleLbl>
+  <dgm:styleLbl name="alignImgPlace1">
+    <dgm:fillClrLst meth="repeat">
+      <a:schemeClr val="accent1">
+        <a:tint val="50000"/>
+      </a:schemeClr>
+    </dgm:fillClrLst>
+    <dgm:linClrLst meth="repeat">
+      <a:schemeClr val="lt1"/>
+    </dgm:linClrLst>
+    <dgm:effectClrLst/>
+    <dgm:txLinClrLst/>
+    <dgm:txFillClrLst meth="repeat">
+      <a:schemeClr val="lt1"/>
+    </dgm:txFillClrLst>
+    <dgm:txEffectClrLst/>
+  </dgm:styleLbl>
+  <dgm:styleLbl name="bgImgPlace1">
+    <dgm:fillClrLst meth="repeat">
+      <a:schemeClr val="accent1">
+        <a:tint val="50000"/>
+      </a:schemeClr>
+    </dgm:fillClrLst>
+    <dgm:linClrLst meth="repeat">
+      <a:schemeClr val="lt1"/>
+    </dgm:linClrLst>
+    <dgm:effectClrLst/>
+    <dgm:txLinClrLst/>
+    <dgm:txFillClrLst meth="repeat">
+      <a:schemeClr val="lt1"/>
+    </dgm:txFillClrLst>
+    <dgm:txEffectClrLst/>
+  </dgm:styleLbl>
+  <dgm:styleLbl name="sibTrans2D1">
+    <dgm:fillClrLst meth="repeat">
+      <a:schemeClr val="accent1">
+        <a:tint val="60000"/>
+      </a:schemeClr>
+    </dgm:fillClrLst>
+    <dgm:linClrLst meth="repeat">
+      <a:schemeClr val="accent1">
+        <a:tint val="60000"/>
+      </a:schemeClr>
+    </dgm:linClrLst>
+    <dgm:effectClrLst/>
+    <dgm:txLinClrLst/>
+    <dgm:txFillClrLst/>
+    <dgm:txEffectClrLst/>
+  </dgm:styleLbl>
+  <dgm:styleLbl name="fgSibTrans2D1">
+    <dgm:fillClrLst meth="repeat">
+      <a:schemeClr val="accent1">
+        <a:tint val="60000"/>
+      </a:schemeClr>
+    </dgm:fillClrLst>
+    <dgm:linClrLst meth="repeat">
+      <a:schemeClr val="accent1">
+        <a:tint val="60000"/>
+      </a:schemeClr>
+    </dgm:linClrLst>
+    <dgm:effectClrLst/>
+    <dgm:txLinClrLst/>
+    <dgm:txFillClrLst/>
+    <dgm:txEffectClrLst/>
+  </dgm:styleLbl>
+  <dgm:styleLbl name="bgSibTrans2D1">
+    <dgm:fillClrLst meth="repeat">
+      <a:schemeClr val="accent1">
+        <a:tint val="60000"/>
+      </a:schemeClr>
+    </dgm:fillClrLst>
+    <dgm:linClrLst meth="repeat">
+      <a:schemeClr val="accent1">
+        <a:tint val="60000"/>
+      </a:schemeClr>
+    </dgm:linClrLst>
+    <dgm:effectClrLst/>
+    <dgm:txLinClrLst/>
+    <dgm:txFillClrLst/>
+    <dgm:txEffectClrLst/>
+  </dgm:styleLbl>
+  <dgm:styleLbl name="sibTrans1D1">
+    <dgm:fillClrLst meth="repeat">
+      <a:schemeClr val="accent1"/>
+    </dgm:fillClrLst>
+    <dgm:linClrLst meth="repeat">
+      <a:schemeClr val="accent1"/>
+    </dgm:linClrLst>
+    <dgm:effectClrLst/>
+    <dgm:txLinClrLst/>
+    <dgm:txFillClrLst meth="repeat">
+      <a:schemeClr val="tx1"/>
+    </dgm:txFillClrLst>
+    <dgm:txEffectClrLst/>
+  </dgm:styleLbl>
+  <dgm:styleLbl name="callout">
+    <dgm:fillClrLst meth="repeat">
+      <a:schemeClr val="accent1"/>
+    </dgm:fillClrLst>
+    <dgm:linClrLst meth="repeat">
+      <a:schemeClr val="accent1">
+        <a:tint val="50000"/>
+      </a:schemeClr>
+    </dgm:linClrLst>
+    <dgm:effectClrLst/>
+    <dgm:txLinClrLst/>
+    <dgm:txFillClrLst meth="repeat">
+      <a:schemeClr val="tx1"/>
+    </dgm:txFillClrLst>
+    <dgm:txEffectClrLst/>
+  </dgm:styleLbl>
+  <dgm:styleLbl name="asst0">
+    <dgm:fillClrLst meth="repeat">
+      <a:schemeClr val="accent1"/>
+    </dgm:fillClrLst>
+    <dgm:linClrLst meth="repeat">
+      <a:schemeClr val="lt1"/>
+    </dgm:linClrLst>
+    <dgm:effectClrLst/>
+    <dgm:txLinClrLst/>
+    <dgm:txFillClrLst/>
+    <dgm:txEffectClrLst/>
+  </dgm:styleLbl>
+  <dgm:styleLbl name="asst1">
+    <dgm:fillClrLst meth="repeat">
+      <a:schemeClr val="accent1"/>
+    </dgm:fillClrLst>
+    <dgm:linClrLst meth="repeat">
+      <a:schemeClr val="lt1"/>
+    </dgm:linClrLst>
+    <dgm:effectClrLst/>
+    <dgm:txLinClrLst/>
+    <dgm:txFillClrLst/>
+    <dgm:txEffectClrLst/>
+  </dgm:styleLbl>
+  <dgm:styleLbl name="asst2">
+    <dgm:fillClrLst meth="repeat">
+      <a:schemeClr val="accent1"/>
+    </dgm:fillClrLst>
+    <dgm:linClrLst meth="repeat">
+      <a:schemeClr val="lt1"/>
+    </dgm:linClrLst>
+    <dgm:effectClrLst/>
+    <dgm:txLinClrLst/>
+    <dgm:txFillClrLst/>
+    <dgm:txEffectClrLst/>
+  </dgm:styleLbl>
+  <dgm:styleLbl name="asst3">
+    <dgm:fillClrLst meth="repeat">
+      <a:schemeClr val="accent1"/>
+    </dgm:fillClrLst>
+    <dgm:linClrLst meth="repeat">
+      <a:schemeClr val="lt1"/>
+    </dgm:linClrLst>
+    <dgm:effectClrLst/>
+    <dgm:txLinClrLst/>
+    <dgm:txFillClrLst/>
+    <dgm:txEffectClrLst/>
+  </dgm:styleLbl>
+  <dgm:styleLbl name="asst4">
+    <dgm:fillClrLst meth="repeat">
+      <a:schemeClr val="accent1"/>
+    </dgm:fillClrLst>
+    <dgm:linClrLst meth="repeat">
+      <a:schemeClr val="lt1"/>
+    </dgm:linClrLst>
+    <dgm:effectClrLst/>
+    <dgm:txLinClrLst/>
+    <dgm:txFillClrLst/>
+    <dgm:txEffectClrLst/>
+  </dgm:styleLbl>
+  <dgm:styleLbl name="parChTrans2D1">
+    <dgm:fillClrLst meth="repeat">
+      <a:schemeClr val="accent1">
+        <a:tint val="60000"/>
+      </a:schemeClr>
+    </dgm:fillClrLst>
+    <dgm:linClrLst meth="repeat">
+      <a:schemeClr val="accent1">
+        <a:tint val="60000"/>
+      </a:schemeClr>
+    </dgm:linClrLst>
+    <dgm:effectClrLst/>
+    <dgm:txLinClrLst/>
+    <dgm:txFillClrLst meth="repeat">
+      <a:schemeClr val="lt1"/>
+    </dgm:txFillClrLst>
+    <dgm:txEffectClrLst/>
+  </dgm:styleLbl>
+  <dgm:styleLbl name="parChTrans2D2">
+    <dgm:fillClrLst meth="repeat">
+      <a:schemeClr val="accent1"/>
+    </dgm:fillClrLst>
+    <dgm:linClrLst meth="repeat">
+      <a:schemeClr val="accent1"/>
+    </dgm:linClrLst>
+    <dgm:effectClrLst/>
+    <dgm:txLinClrLst/>
+    <dgm:txFillClrLst meth="repeat">
+      <a:schemeClr val="lt1"/>
+    </dgm:txFillClrLst>
+    <dgm:txEffectClrLst/>
+  </dgm:styleLbl>
+  <dgm:styleLbl name="parChTrans2D3">
+    <dgm:fillClrLst meth="repeat">
+      <a:schemeClr val="accent1"/>
+    </dgm:fillClrLst>
+    <dgm:linClrLst meth="repeat">
+      <a:schemeClr val="accent1"/>
+    </dgm:linClrLst>
+    <dgm:effectClrLst/>
+    <dgm:txLinClrLst/>
+    <dgm:txFillClrLst meth="repeat">
+      <a:schemeClr val="lt1"/>
+    </dgm:txFillClrLst>
+    <dgm:txEffectClrLst/>
+  </dgm:styleLbl>
+  <dgm:styleLbl name="parChTrans2D4">
+    <dgm:fillClrLst meth="repeat">
+      <a:schemeClr val="accent1"/>
+    </dgm:fillClrLst>
+    <dgm:linClrLst meth="repeat">
+      <a:schemeClr val="accent1"/>
+    </dgm:linClrLst>
+    <dgm:effectClrLst/>
+    <dgm:txLinClrLst/>
+    <dgm:txFillClrLst meth="repeat">
+      <a:schemeClr val="lt1"/>
+    </dgm:txFillClrLst>
+    <dgm:txEffectClrLst/>
+  </dgm:styleLbl>
+  <dgm:styleLbl name="parChTrans1D1">
+    <dgm:fillClrLst meth="repeat">
+      <a:schemeClr val="accent1"/>
+    </dgm:fillClrLst>
+    <dgm:linClrLst meth="repeat">
+      <a:schemeClr val="accent1">
+        <a:shade val="60000"/>
+      </a:schemeClr>
+    </dgm:linClrLst>
+    <dgm:effectClrLst/>
+    <dgm:txLinClrLst/>
+    <dgm:txFillClrLst meth="repeat">
+      <a:schemeClr val="tx1"/>
+    </dgm:txFillClrLst>
+    <dgm:txEffectClrLst/>
+  </dgm:styleLbl>
+  <dgm:styleLbl name="parChTrans1D2">
+    <dgm:fillClrLst meth="repeat">
+      <a:schemeClr val="accent1"/>
+    </dgm:fillClrLst>
+    <dgm:linClrLst meth="repeat">
+      <a:schemeClr val="accent1">
+        <a:shade val="60000"/>
+      </a:schemeClr>
+    </dgm:linClrLst>
+    <dgm:effectClrLst/>
+    <dgm:txLinClrLst/>
+    <dgm:txFillClrLst meth="repeat">
+      <a:schemeClr val="tx1"/>
+    </dgm:txFillClrLst>
+    <dgm:txEffectClrLst/>
+  </dgm:styleLbl>
+  <dgm:styleLbl name="parChTrans1D3">
+    <dgm:fillClrLst meth="repeat">
+      <a:schemeClr val="accent1"/>
+    </dgm:fillClrLst>
+    <dgm:linClrLst meth="repeat">
+      <a:schemeClr val="accent1">
+        <a:shade val="80000"/>
+      </a:schemeClr>
+    </dgm:linClrLst>
+    <dgm:effectClrLst/>
+    <dgm:txLinClrLst/>
+    <dgm:txFillClrLst meth="repeat">
+      <a:schemeClr val="tx1"/>
+    </dgm:txFillClrLst>
+    <dgm:txEffectClrLst/>
+  </dgm:styleLbl>
+  <dgm:styleLbl name="parChTrans1D4">
+    <dgm:fillClrLst meth="repeat">
+      <a:schemeClr val="accent1"/>
+    </dgm:fillClrLst>
+    <dgm:linClrLst meth="repeat">
+      <a:schemeClr val="accent1">
+        <a:shade val="80000"/>
+      </a:schemeClr>
+    </dgm:linClrLst>
+    <dgm:effectClrLst/>
+    <dgm:txLinClrLst/>
+    <dgm:txFillClrLst meth="repeat">
+      <a:schemeClr val="tx1"/>
+    </dgm:txFillClrLst>
+    <dgm:txEffectClrLst/>
+  </dgm:styleLbl>
+  <dgm:styleLbl name="fgAcc1">
+    <dgm:fillClrLst meth="repeat">
+      <a:schemeClr val="lt1">
+        <a:alpha val="90000"/>
+      </a:schemeClr>
+    </dgm:fillClrLst>
+    <dgm:linClrLst meth="repeat">
+      <a:schemeClr val="accent1"/>
+    </dgm:linClrLst>
+    <dgm:effectClrLst/>
+    <dgm:txLinClrLst/>
+    <dgm:txFillClrLst meth="repeat">
+      <a:schemeClr val="dk1"/>
+    </dgm:txFillClrLst>
+    <dgm:txEffectClrLst/>
+  </dgm:styleLbl>
+  <dgm:styleLbl name="conFgAcc1">
+    <dgm:fillClrLst meth="repeat">
+      <a:schemeClr val="lt1">
+        <a:alpha val="90000"/>
+      </a:schemeClr>
+    </dgm:fillClrLst>
+    <dgm:linClrLst meth="repeat">
+      <a:schemeClr val="accent1"/>
+    </dgm:linClrLst>
+    <dgm:effectClrLst/>
+    <dgm:txLinClrLst/>
+    <dgm:txFillClrLst meth="repeat">
+      <a:schemeClr val="dk1"/>
+    </dgm:txFillClrLst>
+    <dgm:txEffectClrLst/>
+  </dgm:styleLbl>
+  <dgm:styleLbl name="alignAcc1">
+    <dgm:fillClrLst meth="repeat">
+      <a:schemeClr val="lt1">
+        <a:alpha val="90000"/>
+      </a:schemeClr>
+    </dgm:fillClrLst>
+    <dgm:linClrLst meth="repeat">
+      <a:schemeClr val="accent1"/>
+    </dgm:linClrLst>
+    <dgm:effectClrLst/>
+    <dgm:txLinClrLst/>
+    <dgm:txFillClrLst meth="repeat">
+      <a:schemeClr val="dk1"/>
+    </dgm:txFillClrLst>
+    <dgm:txEffectClrLst/>
+  </dgm:styleLbl>
+  <dgm:styleLbl name="trAlignAcc1">
+    <dgm:fillClrLst meth="repeat">
+      <a:schemeClr val="lt1">
+        <a:alpha val="40000"/>
+      </a:schemeClr>
+    </dgm:fillClrLst>
+    <dgm:linClrLst meth="repeat">
+      <a:schemeClr val="accent1"/>
+    </dgm:linClrLst>
+    <dgm:effectClrLst/>
+    <dgm:txLinClrLst/>
+    <dgm:txFillClrLst meth="repeat">
+      <a:schemeClr val="dk1"/>
+    </dgm:txFillClrLst>
+    <dgm:txEffectClrLst/>
+  </dgm:styleLbl>
+  <dgm:styleLbl name="bgAcc1">
+    <dgm:fillClrLst meth="repeat">
+      <a:schemeClr val="lt1">
+        <a:alpha val="90000"/>
+      </a:schemeClr>
+    </dgm:fillClrLst>
+    <dgm:linClrLst meth="repeat">
+      <a:schemeClr val="accent1"/>
+    </dgm:linClrLst>
+    <dgm:effectClrLst/>
+    <dgm:txLinClrLst/>
+    <dgm:txFillClrLst meth="repeat">
+      <a:schemeClr val="dk1"/>
+    </dgm:txFillClrLst>
+    <dgm:txEffectClrLst/>
+  </dgm:styleLbl>
+  <dgm:styleLbl name="solidFgAcc1">
+    <dgm:fillClrLst meth="repeat">
+      <a:schemeClr val="lt1"/>
+    </dgm:fillClrLst>
+    <dgm:linClrLst meth="repeat">
+      <a:schemeClr val="accent1"/>
+    </dgm:linClrLst>
+    <dgm:effectClrLst/>
+    <dgm:txLinClrLst/>
+    <dgm:txFillClrLst meth="repeat">
+      <a:schemeClr val="dk1"/>
+    </dgm:txFillClrLst>
+    <dgm:txEffectClrLst/>
+  </dgm:styleLbl>
+  <dgm:styleLbl name="solidAlignAcc1">
+    <dgm:fillClrLst meth="repeat">
+      <a:schemeClr val="lt1"/>
+    </dgm:fillClrLst>
+    <dgm:linClrLst meth="repeat">
+      <a:schemeClr val="accent1"/>
+    </dgm:linClrLst>
+    <dgm:effectClrLst/>
+    <dgm:txLinClrLst/>
+    <dgm:txFillClrLst meth="repeat">
+      <a:schemeClr val="dk1"/>
+    </dgm:txFillClrLst>
+    <dgm:txEffectClrLst/>
+  </dgm:styleLbl>
+  <dgm:styleLbl name="solidBgAcc1">
+    <dgm:fillClrLst meth="repeat">
+      <a:schemeClr val="lt1"/>
+    </dgm:fillClrLst>
+    <dgm:linClrLst meth="repeat">
+      <a:schemeClr val="accent1"/>
+    </dgm:linClrLst>
+    <dgm:effectClrLst/>
+    <dgm:txLinClrLst/>
+    <dgm:txFillClrLst meth="repeat">
+      <a:schemeClr val="dk1"/>
+    </dgm:txFillClrLst>
+    <dgm:txEffectClrLst/>
+  </dgm:styleLbl>
+  <dgm:styleLbl name="fgAccFollowNode1">
+    <dgm:fillClrLst meth="repeat">
+      <a:schemeClr val="accent1">
+        <a:alpha val="90000"/>
+        <a:tint val="40000"/>
+      </a:schemeClr>
+    </dgm:fillClrLst>
+    <dgm:linClrLst meth="repeat">
+      <a:schemeClr val="accent1">
+        <a:alpha val="90000"/>
+        <a:tint val="40000"/>
+      </a:schemeClr>
+    </dgm:linClrLst>
+    <dgm:effectClrLst/>
+    <dgm:txLinClrLst/>
+    <dgm:txFillClrLst meth="repeat">
+      <a:schemeClr val="dk1"/>
+    </dgm:txFillClrLst>
+    <dgm:txEffectClrLst/>
+  </dgm:styleLbl>
+  <dgm:styleLbl name="alignAccFollowNode1">
+    <dgm:fillClrLst meth="repeat">
+      <a:schemeClr val="accent1">
+        <a:alpha val="90000"/>
+        <a:tint val="40000"/>
+      </a:schemeClr>
+    </dgm:fillClrLst>
+    <dgm:linClrLst meth="repeat">
+      <a:schemeClr val="accent1">
+        <a:alpha val="90000"/>
+        <a:tint val="40000"/>
+      </a:schemeClr>
+    </dgm:linClrLst>
+    <dgm:effectClrLst/>
+    <dgm:txLinClrLst/>
+    <dgm:txFillClrLst meth="repeat">
+      <a:schemeClr val="dk1"/>
+    </dgm:txFillClrLst>
+    <dgm:txEffectClrLst/>
+  </dgm:styleLbl>
+  <dgm:styleLbl name="bgAccFollowNode1">
+    <dgm:fillClrLst meth="repeat">
+      <a:schemeClr val="accent1">
+        <a:alpha val="90000"/>
+        <a:tint val="40000"/>
+      </a:schemeClr>
+    </dgm:fillClrLst>
+    <dgm:linClrLst meth="repeat">
+      <a:schemeClr val="accent1">
+        <a:alpha val="90000"/>
+        <a:tint val="40000"/>
+      </a:schemeClr>
+    </dgm:linClrLst>
+    <dgm:effectClrLst/>
+    <dgm:txLinClrLst/>
+    <dgm:txFillClrLst meth="repeat">
+      <a:schemeClr val="dk1"/>
+    </dgm:txFillClrLst>
+    <dgm:txEffectClrLst/>
+  </dgm:styleLbl>
+  <dgm:styleLbl name="fgAcc0">
+    <dgm:fillClrLst meth="repeat">
+      <a:schemeClr val="lt1">
+        <a:alpha val="90000"/>
+      </a:schemeClr>
+    </dgm:fillClrLst>
+    <dgm:linClrLst meth="repeat">
+      <a:schemeClr val="accent1"/>
+    </dgm:linClrLst>
+    <dgm:effectClrLst/>
+    <dgm:txLinClrLst/>
+    <dgm:txFillClrLst meth="repeat">
+      <a:schemeClr val="dk1"/>
+    </dgm:txFillClrLst>
+    <dgm:txEffectClrLst/>
+  </dgm:styleLbl>
+  <dgm:styleLbl name="fgAcc2">
+    <dgm:fillClrLst meth="repeat">
+      <a:schemeClr val="lt1">
+        <a:alpha val="90000"/>
+      </a:schemeClr>
+    </dgm:fillClrLst>
+    <dgm:linClrLst meth="repeat">
+      <a:schemeClr val="accent1"/>
+    </dgm:linClrLst>
+    <dgm:effectClrLst/>
+    <dgm:txLinClrLst/>
+    <dgm:txFillClrLst meth="repeat">
+      <a:schemeClr val="dk1"/>
+    </dgm:txFillClrLst>
+    <dgm:txEffectClrLst/>
+  </dgm:styleLbl>
+  <dgm:styleLbl name="fgAcc3">
+    <dgm:fillClrLst meth="repeat">
+      <a:schemeClr val="lt1">
+        <a:alpha val="90000"/>
+      </a:schemeClr>
+    </dgm:fillClrLst>
+    <dgm:linClrLst meth="repeat">
+      <a:schemeClr val="accent1"/>
+    </dgm:linClrLst>
+    <dgm:effectClrLst/>
+    <dgm:txLinClrLst/>
+    <dgm:txFillClrLst meth="repeat">
+      <a:schemeClr val="dk1"/>
+    </dgm:txFillClrLst>
+    <dgm:txEffectClrLst/>
+  </dgm:styleLbl>
+  <dgm:styleLbl name="fgAcc4">
+    <dgm:fillClrLst meth="repeat">
+      <a:schemeClr val="lt1">
+        <a:alpha val="90000"/>
+      </a:schemeClr>
+    </dgm:fillClrLst>
+    <dgm:linClrLst meth="repeat">
+      <a:schemeClr val="accent1"/>
+    </dgm:linClrLst>
+    <dgm:effectClrLst/>
+    <dgm:txLinClrLst/>
+    <dgm:txFillClrLst meth="repeat">
+      <a:schemeClr val="dk1"/>
+    </dgm:txFillClrLst>
+    <dgm:txEffectClrLst/>
+  </dgm:styleLbl>
+  <dgm:styleLbl name="bgShp">
+    <dgm:fillClrLst meth="repeat">
+      <a:schemeClr val="accent1">
+        <a:tint val="40000"/>
+      </a:schemeClr>
+    </dgm:fillClrLst>
+    <dgm:linClrLst meth="repeat">
+      <a:schemeClr val="accent1"/>
+    </dgm:linClrLst>
+    <dgm:effectClrLst/>
+    <dgm:txLinClrLst/>
+    <dgm:txFillClrLst meth="repeat">
+      <a:schemeClr val="dk1"/>
+    </dgm:txFillClrLst>
+    <dgm:txEffectClrLst/>
+  </dgm:styleLbl>
+  <dgm:styleLbl name="dkBgShp">
+    <dgm:fillClrLst meth="repeat">
+      <a:schemeClr val="accent1">
+        <a:shade val="80000"/>
+      </a:schemeClr>
+    </dgm:fillClrLst>
+    <dgm:linClrLst meth="repeat">
+      <a:schemeClr val="accent1"/>
+    </dgm:linClrLst>
+    <dgm:effectClrLst/>
+    <dgm:txLinClrLst/>
+    <dgm:txFillClrLst meth="repeat">
+      <a:schemeClr val="lt1"/>
+    </dgm:txFillClrLst>
+    <dgm:txEffectClrLst/>
+  </dgm:styleLbl>
+  <dgm:styleLbl name="trBgShp">
+    <dgm:fillClrLst meth="repeat">
+      <a:schemeClr val="accent1">
+        <a:tint val="50000"/>
+        <a:alpha val="40000"/>
+      </a:schemeClr>
+    </dgm:fillClrLst>
+    <dgm:linClrLst meth="repeat">
+      <a:schemeClr val="accent1"/>
+    </dgm:linClrLst>
+    <dgm:effectClrLst/>
+    <dgm:txLinClrLst/>
+    <dgm:txFillClrLst meth="repeat">
+      <a:schemeClr val="lt1"/>
+    </dgm:txFillClrLst>
+    <dgm:txEffectClrLst/>
+  </dgm:styleLbl>
+  <dgm:styleLbl name="fgShp">
+    <dgm:fillClrLst meth="repeat">
+      <a:schemeClr val="accent1">
+        <a:tint val="60000"/>
+      </a:schemeClr>
+    </dgm:fillClrLst>
+    <dgm:linClrLst meth="repeat">
+      <a:schemeClr val="lt1"/>
+    </dgm:linClrLst>
+    <dgm:effectClrLst/>
+    <dgm:txLinClrLst/>
+    <dgm:txFillClrLst meth="repeat">
+      <a:schemeClr val="dk1"/>
+    </dgm:txFillClrLst>
+    <dgm:txEffectClrLst/>
+  </dgm:styleLbl>
+  <dgm:styleLbl name="revTx">
+    <dgm:fillClrLst meth="repeat">
+      <a:schemeClr val="lt1">
+        <a:alpha val="0"/>
+      </a:schemeClr>
+    </dgm:fillClrLst>
+    <dgm:linClrLst meth="repeat">
+      <a:schemeClr val="dk1">
+        <a:alpha val="0"/>
+      </a:schemeClr>
+    </dgm:linClrLst>
+    <dgm:effectClrLst/>
+    <dgm:txLinClrLst/>
+    <dgm:txFillClrLst meth="repeat">
+      <a:schemeClr val="tx1"/>
+    </dgm:txFillClrLst>
+    <dgm:txEffectClrLst/>
+  </dgm:styleLbl>
+</dgm:colorsDef>
+</file>
+
+<file path=ppt/diagrams/data1.xml><?xml version="1.0" encoding="utf-8"?>
+<dgm:dataModel xmlns:dgm="http://schemas.openxmlformats.org/drawingml/2006/diagram" xmlns:a="http://schemas.openxmlformats.org/drawingml/2006/main">
+  <dgm:ptLst>
+    <dgm:pt modelId="{4F50AEF4-0D2F-4E0B-B47A-FA9A319BFBDA}" type="doc">
+      <dgm:prSet loTypeId="urn:microsoft.com/office/officeart/2005/8/layout/cycle5" loCatId="cycle" qsTypeId="urn:microsoft.com/office/officeart/2005/8/quickstyle/simple1" qsCatId="simple" csTypeId="urn:microsoft.com/office/officeart/2005/8/colors/accent1_2" csCatId="accent1" phldr="1"/>
+      <dgm:spPr/>
+      <dgm:t>
+        <a:bodyPr/>
+        <a:lstStyle/>
+        <a:p>
+          <a:endParaRPr kumimoji="1" lang="ja-JP" altLang="en-US"/>
+        </a:p>
+      </dgm:t>
+    </dgm:pt>
+    <dgm:pt modelId="{EAD49FEB-CA8C-4306-8711-F3E9D6FC6699}" type="pres">
+      <dgm:prSet presAssocID="{4F50AEF4-0D2F-4E0B-B47A-FA9A319BFBDA}" presName="cycle" presStyleCnt="0">
+        <dgm:presLayoutVars>
+          <dgm:dir/>
+          <dgm:resizeHandles val="exact"/>
+        </dgm:presLayoutVars>
+      </dgm:prSet>
+      <dgm:spPr/>
+      <dgm:t>
+        <a:bodyPr/>
+        <a:lstStyle/>
+        <a:p>
+          <a:endParaRPr kumimoji="1" lang="ja-JP" altLang="en-US"/>
+        </a:p>
+      </dgm:t>
+    </dgm:pt>
+  </dgm:ptLst>
+  <dgm:cxnLst>
+    <dgm:cxn modelId="{F0D11056-8743-4CF0-97ED-E1AB3B96678B}" type="presOf" srcId="{4F50AEF4-0D2F-4E0B-B47A-FA9A319BFBDA}" destId="{EAD49FEB-CA8C-4306-8711-F3E9D6FC6699}" srcOrd="0" destOrd="0" presId="urn:microsoft.com/office/officeart/2005/8/layout/cycle5"/>
+  </dgm:cxnLst>
+  <dgm:bg/>
+  <dgm:whole/>
+  <dgm:extLst>
+    <a:ext uri="http://schemas.microsoft.com/office/drawing/2008/diagram">
+      <dsp:dataModelExt xmlns:dsp="http://schemas.microsoft.com/office/drawing/2008/diagram" relId="rId6" minVer="http://schemas.openxmlformats.org/drawingml/2006/diagram"/>
+    </a:ext>
+  </dgm:extLst>
+</dgm:dataModel>
+</file>
+
+<file path=ppt/diagrams/drawing1.xml><?xml version="1.0" encoding="utf-8"?>
+<dsp:drawing xmlns:dgm="http://schemas.openxmlformats.org/drawingml/2006/diagram" xmlns:dsp="http://schemas.microsoft.com/office/drawing/2008/diagram" xmlns:a="http://schemas.openxmlformats.org/drawingml/2006/main">
+  <dsp:spTree>
+    <dsp:nvGrpSpPr>
+      <dsp:cNvPr id="0" name=""/>
+      <dsp:cNvGrpSpPr/>
+    </dsp:nvGrpSpPr>
+    <dsp:grpSpPr/>
+  </dsp:spTree>
+</dsp:drawing>
+</file>
+
+<file path=ppt/diagrams/layout1.xml><?xml version="1.0" encoding="utf-8"?>
+<dgm:layoutDef xmlns:dgm="http://schemas.openxmlformats.org/drawingml/2006/diagram" xmlns:a="http://schemas.openxmlformats.org/drawingml/2006/main" uniqueId="urn:microsoft.com/office/officeart/2005/8/layout/cycle5">
+  <dgm:title val=""/>
+  <dgm:desc val=""/>
+  <dgm:catLst>
+    <dgm:cat type="cycle" pri="3000"/>
+  </dgm:catLst>
+  <dgm:sampData>
+    <dgm:dataModel>
+      <dgm:ptLst>
+        <dgm:pt modelId="0" type="doc"/>
+        <dgm:pt modelId="1">
+          <dgm:prSet phldr="1"/>
+        </dgm:pt>
+        <dgm:pt modelId="2">
+          <dgm:prSet phldr="1"/>
+        </dgm:pt>
+        <dgm:pt modelId="3">
+          <dgm:prSet phldr="1"/>
+        </dgm:pt>
+        <dgm:pt modelId="4">
+          <dgm:prSet phldr="1"/>
+        </dgm:pt>
+        <dgm:pt modelId="5">
+          <dgm:prSet phldr="1"/>
+        </dgm:pt>
+      </dgm:ptLst>
+      <dgm:cxnLst>
+        <dgm:cxn modelId="6" srcId="0" destId="1" srcOrd="0" destOrd="0"/>
+        <dgm:cxn modelId="7" srcId="0" destId="2" srcOrd="1" destOrd="0"/>
+        <dgm:cxn modelId="8" srcId="0" destId="3" srcOrd="2" destOrd="0"/>
+        <dgm:cxn modelId="9" srcId="0" destId="4" srcOrd="3" destOrd="0"/>
+        <dgm:cxn modelId="10" srcId="0" destId="5" srcOrd="4" destOrd="0"/>
+      </dgm:cxnLst>
+      <dgm:bg/>
+      <dgm:whole/>
+    </dgm:dataModel>
+  </dgm:sampData>
+  <dgm:styleData>
+    <dgm:dataModel>
+      <dgm:ptLst>
+        <dgm:pt modelId="0" type="doc"/>
+        <dgm:pt modelId="1"/>
+        <dgm:pt modelId="2"/>
+        <dgm:pt modelId="3"/>
+      </dgm:ptLst>
+      <dgm:cxnLst>
+        <dgm:cxn modelId="4" srcId="0" destId="1" srcOrd="0" destOrd="0"/>
+        <dgm:cxn modelId="5" srcId="0" destId="2" srcOrd="1" destOrd="0"/>
+        <dgm:cxn modelId="6" srcId="0" destId="3" srcOrd="2" destOrd="0"/>
+      </dgm:cxnLst>
+      <dgm:bg/>
+      <dgm:whole/>
+    </dgm:dataModel>
+  </dgm:styleData>
+  <dgm:clrData>
+    <dgm:dataModel>
+      <dgm:ptLst>
+        <dgm:pt modelId="0" type="doc"/>
+        <dgm:pt modelId="1"/>
+        <dgm:pt modelId="2"/>
+        <dgm:pt modelId="3"/>
+        <dgm:pt modelId="4"/>
+        <dgm:pt modelId="5"/>
+        <dgm:pt modelId="6"/>
+      </dgm:ptLst>
+      <dgm:cxnLst>
+        <dgm:cxn modelId="7" srcId="0" destId="1" srcOrd="0" destOrd="0"/>
+        <dgm:cxn modelId="8" srcId="0" destId="2" srcOrd="1" destOrd="0"/>
+        <dgm:cxn modelId="9" srcId="0" destId="3" srcOrd="2" destOrd="0"/>
+        <dgm:cxn modelId="10" srcId="0" destId="4" srcOrd="3" destOrd="0"/>
+        <dgm:cxn modelId="11" srcId="0" destId="5" srcOrd="4" destOrd="0"/>
+        <dgm:cxn modelId="12" srcId="0" destId="6" srcOrd="5" destOrd="0"/>
+      </dgm:cxnLst>
+      <dgm:bg/>
+      <dgm:whole/>
+    </dgm:dataModel>
+  </dgm:clrData>
+  <dgm:layoutNode name="cycle">
+    <dgm:varLst>
+      <dgm:dir/>
+      <dgm:resizeHandles val="exact"/>
+    </dgm:varLst>
+    <dgm:choose name="Name0">
+      <dgm:if name="Name1" func="var" arg="dir" op="equ" val="norm">
+        <dgm:choose name="Name2">
+          <dgm:if name="Name3" axis="ch" ptType="node" func="cnt" op="gt" val="2">
+            <dgm:alg type="cycle">
+              <dgm:param type="stAng" val="0"/>
+              <dgm:param type="spanAng" val="360"/>
+            </dgm:alg>
+          </dgm:if>
+          <dgm:else name="Name4">
+            <dgm:alg type="cycle">
+              <dgm:param type="stAng" val="-90"/>
+              <dgm:param type="spanAng" val="360"/>
+            </dgm:alg>
+          </dgm:else>
+        </dgm:choose>
+      </dgm:if>
+      <dgm:else name="Name5">
+        <dgm:choose name="Name6">
+          <dgm:if name="Name7" axis="ch" ptType="node" func="cnt" op="gt" val="2">
+            <dgm:alg type="cycle">
+              <dgm:param type="stAng" val="0"/>
+              <dgm:param type="spanAng" val="-360"/>
+            </dgm:alg>
+          </dgm:if>
+          <dgm:else name="Name8">
+            <dgm:alg type="cycle">
+              <dgm:param type="stAng" val="90"/>
+              <dgm:param type="spanAng" val="-360"/>
+            </dgm:alg>
+          </dgm:else>
+        </dgm:choose>
+      </dgm:else>
+    </dgm:choose>
+    <dgm:shape xmlns:r="http://schemas.openxmlformats.org/officeDocument/2006/relationships" r:blip="">
+      <dgm:adjLst/>
+    </dgm:shape>
+    <dgm:presOf/>
+    <dgm:choose name="Name9">
+      <dgm:if name="Name10" func="var" arg="dir" op="equ" val="norm">
+        <dgm:constrLst>
+          <dgm:constr type="w" for="ch" forName="node" refType="w"/>
+          <dgm:constr type="w" for="ch" ptType="sibTrans" refType="w" refFor="ch" refForName="node" op="equ" fact="0.3"/>
+          <dgm:constr type="diam" for="ch" ptType="sibTrans" refType="diam" op="equ"/>
+          <dgm:constr type="sibSp" refType="w" refFor="ch" refForName="node" op="equ" fact="0.15"/>
+          <dgm:constr type="w" for="ch" forName="spNode" refType="sibSp" fact="1.6"/>
+          <dgm:constr type="primFontSz" for="ch" forName="node" op="equ" val="65"/>
+        </dgm:constrLst>
+      </dgm:if>
+      <dgm:else name="Name11">
+        <dgm:constrLst>
+          <dgm:constr type="w" for="ch" forName="node" refType="w"/>
+          <dgm:constr type="w" for="ch" ptType="sibTrans" refType="w" refFor="ch" refForName="node" op="equ" fact="0.3"/>
+          <dgm:constr type="diam" for="ch" ptType="sibTrans" refType="diam" fact="-1"/>
+          <dgm:constr type="diam" for="ch" refType="diam" op="equ" fact="-1"/>
+          <dgm:constr type="sibSp" refType="w" refFor="ch" refForName="node" op="equ" fact="0.15"/>
+          <dgm:constr type="w" for="ch" forName="spNode" refType="sibSp" fact="1.6"/>
+          <dgm:constr type="primFontSz" for="ch" forName="node" op="equ" val="65"/>
+        </dgm:constrLst>
+      </dgm:else>
+    </dgm:choose>
+    <dgm:ruleLst/>
+    <dgm:forEach name="Name12" axis="ch" ptType="node">
+      <dgm:layoutNode name="node">
+        <dgm:varLst>
+          <dgm:bulletEnabled val="1"/>
+        </dgm:varLst>
+        <dgm:alg type="tx"/>
+        <dgm:shape xmlns:r="http://schemas.openxmlformats.org/officeDocument/2006/relationships" type="roundRect" r:blip="">
+          <dgm:adjLst/>
+        </dgm:shape>
+        <dgm:presOf axis="desOrSelf" ptType="node"/>
+        <dgm:constrLst>
+          <dgm:constr type="h" refType="w" fact="0.65"/>
+          <dgm:constr type="tMarg" refType="primFontSz" fact="0.3"/>
+          <dgm:constr type="bMarg" refType="primFontSz" fact="0.3"/>
+          <dgm:constr type="lMarg" refType="primFontSz" fact="0.3"/>
+          <dgm:constr type="rMarg" refType="primFontSz" fact="0.3"/>
+        </dgm:constrLst>
+        <dgm:ruleLst>
+          <dgm:rule type="primFontSz" val="5" fact="NaN" max="NaN"/>
+        </dgm:ruleLst>
+      </dgm:layoutNode>
+      <dgm:choose name="Name13">
+        <dgm:if name="Name14" axis="par ch" ptType="doc node" func="cnt" op="gt" val="1">
+          <dgm:layoutNode name="spNode">
+            <dgm:alg type="sp"/>
+            <dgm:shape xmlns:r="http://schemas.openxmlformats.org/officeDocument/2006/relationships" r:blip="">
+              <dgm:adjLst/>
+            </dgm:shape>
+            <dgm:presOf/>
+            <dgm:constrLst>
+              <dgm:constr type="h" refType="w"/>
+            </dgm:constrLst>
+            <dgm:ruleLst/>
+          </dgm:layoutNode>
+          <dgm:forEach name="Name15" axis="followSib" ptType="sibTrans" hideLastTrans="0" cnt="1">
+            <dgm:layoutNode name="sibTrans">
+              <dgm:alg type="conn">
+                <dgm:param type="dim" val="1D"/>
+                <dgm:param type="connRout" val="curve"/>
+                <dgm:param type="begPts" val="radial"/>
+                <dgm:param type="endPts" val="radial"/>
+              </dgm:alg>
+              <dgm:shape xmlns:r="http://schemas.openxmlformats.org/officeDocument/2006/relationships" type="conn" r:blip="">
+                <dgm:adjLst/>
+              </dgm:shape>
+              <dgm:presOf axis="self"/>
+              <dgm:constrLst>
+                <dgm:constr type="h" refType="w" fact="0.65"/>
+                <dgm:constr type="connDist"/>
+                <dgm:constr type="begPad" refType="connDist" fact="0.2"/>
+                <dgm:constr type="endPad" refType="connDist" fact="0.2"/>
+              </dgm:constrLst>
+              <dgm:ruleLst/>
+            </dgm:layoutNode>
+          </dgm:forEach>
+        </dgm:if>
+        <dgm:else name="Name16"/>
+      </dgm:choose>
+    </dgm:forEach>
+  </dgm:layoutNode>
+</dgm:layoutDef>
+</file>
+
+<file path=ppt/diagrams/quickStyle1.xml><?xml version="1.0" encoding="utf-8"?>
+<dgm:styleDef xmlns:dgm="http://schemas.openxmlformats.org/drawingml/2006/diagram" xmlns:a="http://schemas.openxmlformats.org/drawingml/2006/main" uniqueId="urn:microsoft.com/office/officeart/2005/8/quickstyle/simple1">
+  <dgm:title val=""/>
+  <dgm:desc val=""/>
+  <dgm:catLst>
+    <dgm:cat type="simple" pri="10100"/>
+  </dgm:catLst>
+  <dgm:scene3d>
+    <a:camera prst="orthographicFront"/>
+    <a:lightRig rig="threePt" dir="t"/>
+  </dgm:scene3d>
+  <dgm:styleLbl name="node0">
+    <dgm:scene3d>
+      <a:camera prst="orthographicFront"/>
+      <a:lightRig rig="threePt" dir="t"/>
+    </dgm:scene3d>
+    <dgm:sp3d/>
+    <dgm:txPr/>
+    <dgm:style>
+      <a:lnRef idx="2">
+        <a:scrgbClr r="0" g="0" b="0"/>
+      </a:lnRef>
+      <a:fillRef idx="1">
+        <a:scrgbClr r="0" g="0" b="0"/>
+      </a:fillRef>
+      <a:effectRef idx="0">
+        <a:scrgbClr r="0" g="0" b="0"/>
+      </a:effectRef>
+      <a:fontRef idx="minor">
+        <a:schemeClr val="lt1"/>
+      </a:fontRef>
+    </dgm:style>
+  </dgm:styleLbl>
+  <dgm:styleLbl name="lnNode1">
+    <dgm:scene3d>
+      <a:camera prst="orthographicFront"/>
+      <a:lightRig rig="threePt" dir="t"/>
+    </dgm:scene3d>
+    <dgm:sp3d/>
+    <dgm:txPr/>
+    <dgm:style>
+      <a:lnRef idx="2">
+        <a:scrgbClr r="0" g="0" b="0"/>
+      </a:lnRef>
+      <a:fillRef idx="1">
+        <a:scrgbClr r="0" g="0" b="0"/>
+      </a:fillRef>
+      <a:effectRef idx="0">
+        <a:scrgbClr r="0" g="0" b="0"/>
+      </a:effectRef>
+      <a:fontRef idx="minor">
+        <a:schemeClr val="lt1"/>
+      </a:fontRef>
+    </dgm:style>
+  </dgm:styleLbl>
+  <dgm:styleLbl name="vennNode1">
+    <dgm:scene3d>
+      <a:camera prst="orthographicFront"/>
+      <a:lightRig rig="threePt" dir="t"/>
+    </dgm:scene3d>
+    <dgm:sp3d/>
+    <dgm:txPr/>
+    <dgm:style>
+      <a:lnRef idx="2">
+        <a:scrgbClr r="0" g="0" b="0"/>
+      </a:lnRef>
+      <a:fillRef idx="1">
+        <a:scrgbClr r="0" g="0" b="0"/>
+      </a:fillRef>
+      <a:effectRef idx="0">
+        <a:scrgbClr r="0" g="0" b="0"/>
+      </a:effectRef>
+      <a:fontRef idx="minor">
+        <a:schemeClr val="tx1"/>
+      </a:fontRef>
+    </dgm:style>
+  </dgm:styleLbl>
+  <dgm:styleLbl name="alignNode1">
+    <dgm:scene3d>
+      <a:camera prst="orthographicFront"/>
+      <a:lightRig rig="threePt" dir="t"/>
+    </dgm:scene3d>
+    <dgm:sp3d/>
+    <dgm:txPr/>
+    <dgm:style>
+      <a:lnRef idx="2">
+        <a:scrgbClr r="0" g="0" b="0"/>
+      </a:lnRef>
+      <a:fillRef idx="1">
+        <a:scrgbClr r="0" g="0" b="0"/>
+      </a:fillRef>
+      <a:effectRef idx="0">
+        <a:scrgbClr r="0" g="0" b="0"/>
+      </a:effectRef>
+      <a:fontRef idx="minor">
+        <a:schemeClr val="lt1"/>
+      </a:fontRef>
+    </dgm:style>
+  </dgm:styleLbl>
+  <dgm:styleLbl name="node1">
+    <dgm:scene3d>
+      <a:camera prst="orthographicFront"/>
+      <a:lightRig rig="threePt" dir="t"/>
+    </dgm:scene3d>
+    <dgm:sp3d/>
+    <dgm:txPr/>
+    <dgm:style>
+      <a:lnRef idx="2">
+        <a:scrgbClr r="0" g="0" b="0"/>
+      </a:lnRef>
+      <a:fillRef idx="1">
+        <a:scrgbClr r="0" g="0" b="0"/>
+      </a:fillRef>
+      <a:effectRef idx="0">
+        <a:scrgbClr r="0" g="0" b="0"/>
+      </a:effectRef>
+      <a:fontRef idx="minor">
+        <a:schemeClr val="lt1"/>
+      </a:fontRef>
+    </dgm:style>
+  </dgm:styleLbl>
+  <dgm:styleLbl name="node2">
+    <dgm:scene3d>
+      <a:camera prst="orthographicFront"/>
+      <a:lightRig rig="threePt" dir="t"/>
+    </dgm:scene3d>
+    <dgm:sp3d/>
+    <dgm:txPr/>
+    <dgm:style>
+      <a:lnRef idx="2">
+        <a:scrgbClr r="0" g="0" b="0"/>
+      </a:lnRef>
+      <a:fillRef idx="1">
+        <a:scrgbClr r="0" g="0" b="0"/>
+      </a:fillRef>
+      <a:effectRef idx="0">
+        <a:scrgbClr r="0" g="0" b="0"/>
+      </a:effectRef>
+      <a:fontRef idx="minor">
+        <a:schemeClr val="lt1"/>
+      </a:fontRef>
+    </dgm:style>
+  </dgm:styleLbl>
+  <dgm:styleLbl name="node3">
+    <dgm:scene3d>
+      <a:camera prst="orthographicFront"/>
+      <a:lightRig rig="threePt" dir="t"/>
+    </dgm:scene3d>
+    <dgm:sp3d/>
+    <dgm:txPr/>
+    <dgm:style>
+      <a:lnRef idx="2">
+        <a:scrgbClr r="0" g="0" b="0"/>
+      </a:lnRef>
+      <a:fillRef idx="1">
+        <a:scrgbClr r="0" g="0" b="0"/>
+      </a:fillRef>
+      <a:effectRef idx="0">
+        <a:scrgbClr r="0" g="0" b="0"/>
+      </a:effectRef>
+      <a:fontRef idx="minor">
+        <a:schemeClr val="lt1"/>
+      </a:fontRef>
+    </dgm:style>
+  </dgm:styleLbl>
+  <dgm:styleLbl name="node4">
+    <dgm:scene3d>
+      <a:camera prst="orthographicFront"/>
+      <a:lightRig rig="threePt" dir="t"/>
+    </dgm:scene3d>
+    <dgm:sp3d/>
+    <dgm:txPr/>
+    <dgm:style>
+      <a:lnRef idx="2">
+        <a:scrgbClr r="0" g="0" b="0"/>
+      </a:lnRef>
+      <a:fillRef idx="1">
+        <a:scrgbClr r="0" g="0" b="0"/>
+      </a:fillRef>
+      <a:effectRef idx="0">
+        <a:scrgbClr r="0" g="0" b="0"/>
+      </a:effectRef>
+      <a:fontRef idx="minor">
+        <a:schemeClr val="lt1"/>
+      </a:fontRef>
+    </dgm:style>
+  </dgm:styleLbl>
+  <dgm:styleLbl name="fgImgPlace1">
+    <dgm:scene3d>
+      <a:camera prst="orthographicFront"/>
+      <a:lightRig rig="threePt" dir="t"/>
+    </dgm:scene3d>
+    <dgm:sp3d/>
+    <dgm:txPr/>
+    <dgm:style>
+      <a:lnRef idx="2">
+        <a:scrgbClr r="0" g="0" b="0"/>
+      </a:lnRef>
+      <a:fillRef idx="1">
+        <a:scrgbClr r="0" g="0" b="0"/>
+      </a:fillRef>
+      <a:effectRef idx="0">
+        <a:scrgbClr r="0" g="0" b="0"/>
+      </a:effectRef>
+      <a:fontRef idx="minor"/>
+    </dgm:style>
+  </dgm:styleLbl>
+  <dgm:styleLbl name="alignImgPlace1">
+    <dgm:scene3d>
+      <a:camera prst="orthographicFront"/>
+      <a:lightRig rig="threePt" dir="t"/>
+    </dgm:scene3d>
+    <dgm:sp3d/>
+    <dgm:txPr/>
+    <dgm:style>
+      <a:lnRef idx="2">
+        <a:scrgbClr r="0" g="0" b="0"/>
+      </a:lnRef>
+      <a:fillRef idx="1">
+        <a:scrgbClr r="0" g="0" b="0"/>
+      </a:fillRef>
+      <a:effectRef idx="0">
+        <a:scrgbClr r="0" g="0" b="0"/>
+      </a:effectRef>
+      <a:fontRef idx="minor"/>
+    </dgm:style>
+  </dgm:styleLbl>
+  <dgm:styleLbl name="bgImgPlace1">
+    <dgm:scene3d>
+      <a:camera prst="orthographicFront"/>
+      <a:lightRig rig="threePt" dir="t"/>
+    </dgm:scene3d>
+    <dgm:sp3d/>
+    <dgm:txPr/>
+    <dgm:style>
+      <a:lnRef idx="2">
+        <a:scrgbClr r="0" g="0" b="0"/>
+      </a:lnRef>
+      <a:fillRef idx="1">
+        <a:scrgbClr r="0" g="0" b="0"/>
+      </a:fillRef>
+      <a:effectRef idx="0">
+        <a:scrgbClr r="0" g="0" b="0"/>
+      </a:effectRef>
+      <a:fontRef idx="minor"/>
+    </dgm:style>
+  </dgm:styleLbl>
+  <dgm:styleLbl name="sibTrans2D1">
+    <dgm:scene3d>
+      <a:camera prst="orthographicFront"/>
+      <a:lightRig rig="threePt" dir="t"/>
+    </dgm:scene3d>
+    <dgm:sp3d/>
+    <dgm:txPr/>
+    <dgm:style>
+      <a:lnRef idx="0">
+        <a:scrgbClr r="0" g="0" b="0"/>
+      </a:lnRef>
+      <a:fillRef idx="1">
+        <a:scrgbClr r="0" g="0" b="0"/>
+      </a:fillRef>
+      <a:effectRef idx="0">
+        <a:scrgbClr r="0" g="0" b="0"/>
+      </a:effectRef>
+      <a:fontRef idx="minor">
+        <a:schemeClr val="lt1"/>
+      </a:fontRef>
+    </dgm:style>
+  </dgm:styleLbl>
+  <dgm:styleLbl name="fgSibTrans2D1">
+    <dgm:scene3d>
+      <a:camera prst="orthographicFront"/>
+      <a:lightRig rig="threePt" dir="t"/>
+    </dgm:scene3d>
+    <dgm:sp3d/>
+    <dgm:txPr/>
+    <dgm:style>
+      <a:lnRef idx="0">
+        <a:scrgbClr r="0" g="0" b="0"/>
+      </a:lnRef>
+      <a:fillRef idx="1">
+        <a:scrgbClr r="0" g="0" b="0"/>
+      </a:fillRef>
+      <a:effectRef idx="0">
+        <a:scrgbClr r="0" g="0" b="0"/>
+      </a:effectRef>
+      <a:fontRef idx="minor">
+        <a:schemeClr val="lt1"/>
+      </a:fontRef>
+    </dgm:style>
+  </dgm:styleLbl>
+  <dgm:styleLbl name="bgSibTrans2D1">
+    <dgm:scene3d>
+      <a:camera prst="orthographicFront"/>
+      <a:lightRig rig="threePt" dir="t"/>
+    </dgm:scene3d>
+    <dgm:sp3d/>
+    <dgm:txPr/>
+    <dgm:style>
+      <a:lnRef idx="0">
+        <a:scrgbClr r="0" g="0" b="0"/>
+      </a:lnRef>
+      <a:fillRef idx="1">
+        <a:scrgbClr r="0" g="0" b="0"/>
+      </a:fillRef>
+      <a:effectRef idx="0">
+        <a:scrgbClr r="0" g="0" b="0"/>
+      </a:effectRef>
+      <a:fontRef idx="minor">
+        <a:schemeClr val="lt1"/>
+      </a:fontRef>
+    </dgm:style>
+  </dgm:styleLbl>
+  <dgm:styleLbl name="sibTrans1D1">
+    <dgm:scene3d>
+      <a:camera prst="orthographicFront"/>
+      <a:lightRig rig="threePt" dir="t"/>
+    </dgm:scene3d>
+    <dgm:sp3d/>
+    <dgm:txPr/>
+    <dgm:style>
+      <a:lnRef idx="1">
+        <a:scrgbClr r="0" g="0" b="0"/>
+      </a:lnRef>
+      <a:fillRef idx="0">
+        <a:scrgbClr r="0" g="0" b="0"/>
+      </a:fillRef>
+      <a:effectRef idx="0">
+        <a:scrgbClr r="0" g="0" b="0"/>
+      </a:effectRef>
+      <a:fontRef idx="minor"/>
+    </dgm:style>
+  </dgm:styleLbl>
+  <dgm:styleLbl name="callout">
+    <dgm:scene3d>
+      <a:camera prst="orthographicFront"/>
+      <a:lightRig rig="threePt" dir="t"/>
+    </dgm:scene3d>
+    <dgm:sp3d/>
+    <dgm:txPr/>
+    <dgm:style>
+      <a:lnRef idx="2">
+        <a:scrgbClr r="0" g="0" b="0"/>
+      </a:lnRef>
+      <a:fillRef idx="1">
+        <a:scrgbClr r="0" g="0" b="0"/>
+      </a:fillRef>
+      <a:effectRef idx="0">
+        <a:scrgbClr r="0" g="0" b="0"/>
+      </a:effectRef>
+      <a:fontRef idx="minor"/>
+    </dgm:style>
+  </dgm:styleLbl>
+  <dgm:styleLbl name="asst0">
+    <dgm:scene3d>
+      <a:camera prst="orthographicFront"/>
+      <a:lightRig rig="threePt" dir="t"/>
+    </dgm:scene3d>
+    <dgm:sp3d/>
+    <dgm:txPr/>
+    <dgm:style>
+      <a:lnRef idx="2">
+        <a:scrgbClr r="0" g="0" b="0"/>
+      </a:lnRef>
+      <a:fillRef idx="1">
+        <a:scrgbClr r="0" g="0" b="0"/>
+      </a:fillRef>
+      <a:effectRef idx="0">
+        <a:scrgbClr r="0" g="0" b="0"/>
+      </a:effectRef>
+      <a:fontRef idx="minor">
+        <a:schemeClr val="lt1"/>
+      </a:fontRef>
+    </dgm:style>
+  </dgm:styleLbl>
+  <dgm:styleLbl name="asst1">
+    <dgm:scene3d>
+      <a:camera prst="orthographicFront"/>
+      <a:lightRig rig="threePt" dir="t"/>
+    </dgm:scene3d>
+    <dgm:sp3d/>
+    <dgm:txPr/>
+    <dgm:style>
+      <a:lnRef idx="2">
+        <a:scrgbClr r="0" g="0" b="0"/>
+      </a:lnRef>
+      <a:fillRef idx="1">
+        <a:scrgbClr r="0" g="0" b="0"/>
+      </a:fillRef>
+      <a:effectRef idx="0">
+        <a:scrgbClr r="0" g="0" b="0"/>
+      </a:effectRef>
+      <a:fontRef idx="minor">
+        <a:schemeClr val="lt1"/>
+      </a:fontRef>
+    </dgm:style>
+  </dgm:styleLbl>
+  <dgm:styleLbl name="asst2">
+    <dgm:scene3d>
+      <a:camera prst="orthographicFront"/>
+      <a:lightRig rig="threePt" dir="t"/>
+    </dgm:scene3d>
+    <dgm:sp3d/>
+    <dgm:txPr/>
+    <dgm:style>
+      <a:lnRef idx="2">
+        <a:scrgbClr r="0" g="0" b="0"/>
+      </a:lnRef>
+      <a:fillRef idx="1">
+        <a:scrgbClr r="0" g="0" b="0"/>
+      </a:fillRef>
+      <a:effectRef idx="0">
+        <a:scrgbClr r="0" g="0" b="0"/>
+      </a:effectRef>
+      <a:fontRef idx="minor">
+        <a:schemeClr val="lt1"/>
+      </a:fontRef>
+    </dgm:style>
+  </dgm:styleLbl>
+  <dgm:styleLbl name="asst3">
+    <dgm:scene3d>
+      <a:camera prst="orthographicFront"/>
+      <a:lightRig rig="threePt" dir="t"/>
+    </dgm:scene3d>
+    <dgm:sp3d/>
+    <dgm:txPr/>
+    <dgm:style>
+      <a:lnRef idx="2">
+        <a:scrgbClr r="0" g="0" b="0"/>
+      </a:lnRef>
+      <a:fillRef idx="1">
+        <a:scrgbClr r="0" g="0" b="0"/>
+      </a:fillRef>
+      <a:effectRef idx="0">
+        <a:scrgbClr r="0" g="0" b="0"/>
+      </a:effectRef>
+      <a:fontRef idx="minor">
+        <a:schemeClr val="lt1"/>
+      </a:fontRef>
+    </dgm:style>
+  </dgm:styleLbl>
+  <dgm:styleLbl name="asst4">
+    <dgm:scene3d>
+      <a:camera prst="orthographicFront"/>
+      <a:lightRig rig="threePt" dir="t"/>
+    </dgm:scene3d>
+    <dgm:sp3d/>
+    <dgm:txPr/>
+    <dgm:style>
+      <a:lnRef idx="2">
+        <a:scrgbClr r="0" g="0" b="0"/>
+      </a:lnRef>
+      <a:fillRef idx="1">
+        <a:scrgbClr r="0" g="0" b="0"/>
+      </a:fillRef>
+      <a:effectRef idx="0">
+        <a:scrgbClr r="0" g="0" b="0"/>
+      </a:effectRef>
+      <a:fontRef idx="minor">
+        <a:schemeClr val="lt1"/>
+      </a:fontRef>
+    </dgm:style>
+  </dgm:styleLbl>
+  <dgm:styleLbl name="parChTrans2D1">
+    <dgm:scene3d>
+      <a:camera prst="orthographicFront"/>
+      <a:lightRig rig="threePt" dir="t"/>
+    </dgm:scene3d>
+    <dgm:sp3d/>
+    <dgm:txPr/>
+    <dgm:style>
+      <a:lnRef idx="2">
+        <a:scrgbClr r="0" g="0" b="0"/>
+      </a:lnRef>
+      <a:fillRef idx="1">
+        <a:scrgbClr r="0" g="0" b="0"/>
+      </a:fillRef>
+      <a:effectRef idx="0">
+        <a:scrgbClr r="0" g="0" b="0"/>
+      </a:effectRef>
+      <a:fontRef idx="minor">
+        <a:schemeClr val="lt1"/>
+      </a:fontRef>
+    </dgm:style>
+  </dgm:styleLbl>
+  <dgm:styleLbl name="parChTrans2D2">
+    <dgm:scene3d>
+      <a:camera prst="orthographicFront"/>
+      <a:lightRig rig="threePt" dir="t"/>
+    </dgm:scene3d>
+    <dgm:sp3d/>
+    <dgm:txPr/>
+    <dgm:style>
+      <a:lnRef idx="2">
+        <a:scrgbClr r="0" g="0" b="0"/>
+      </a:lnRef>
+      <a:fillRef idx="1">
+        <a:scrgbClr r="0" g="0" b="0"/>
+      </a:fillRef>
+      <a:effectRef idx="0">
+        <a:scrgbClr r="0" g="0" b="0"/>
+      </a:effectRef>
+      <a:fontRef idx="minor">
+        <a:schemeClr val="lt1"/>
+      </a:fontRef>
+    </dgm:style>
+  </dgm:styleLbl>
+  <dgm:styleLbl name="parChTrans2D3">
+    <dgm:scene3d>
+      <a:camera prst="orthographicFront"/>
+      <a:lightRig rig="threePt" dir="t"/>
+    </dgm:scene3d>
+    <dgm:sp3d/>
+    <dgm:txPr/>
+    <dgm:style>
+      <a:lnRef idx="2">
+        <a:scrgbClr r="0" g="0" b="0"/>
+      </a:lnRef>
+      <a:fillRef idx="1">
+        <a:scrgbClr r="0" g="0" b="0"/>
+      </a:fillRef>
+      <a:effectRef idx="0">
+        <a:scrgbClr r="0" g="0" b="0"/>
+      </a:effectRef>
+      <a:fontRef idx="minor">
+        <a:schemeClr val="lt1"/>
+      </a:fontRef>
+    </dgm:style>
+  </dgm:styleLbl>
+  <dgm:styleLbl name="parChTrans2D4">
+    <dgm:scene3d>
+      <a:camera prst="orthographicFront"/>
+      <a:lightRig rig="threePt" dir="t"/>
+    </dgm:scene3d>
+    <dgm:sp3d/>
+    <dgm:txPr/>
+    <dgm:style>
+      <a:lnRef idx="2">
+        <a:scrgbClr r="0" g="0" b="0"/>
+      </a:lnRef>
+      <a:fillRef idx="1">
+        <a:scrgbClr r="0" g="0" b="0"/>
+      </a:fillRef>
+      <a:effectRef idx="0">
+        <a:scrgbClr r="0" g="0" b="0"/>
+      </a:effectRef>
+      <a:fontRef idx="minor">
+        <a:schemeClr val="lt1"/>
+      </a:fontRef>
+    </dgm:style>
+  </dgm:styleLbl>
+  <dgm:styleLbl name="parChTrans1D1">
+    <dgm:scene3d>
+      <a:camera prst="orthographicFront"/>
+      <a:lightRig rig="threePt" dir="t"/>
+    </dgm:scene3d>
+    <dgm:sp3d/>
+    <dgm:txPr/>
+    <dgm:style>
+      <a:lnRef idx="2">
+        <a:scrgbClr r="0" g="0" b="0"/>
+      </a:lnRef>
+      <a:fillRef idx="0">
+        <a:scrgbClr r="0" g="0" b="0"/>
+      </a:fillRef>
+      <a:effectRef idx="0">
+        <a:scrgbClr r="0" g="0" b="0"/>
+      </a:effectRef>
+      <a:fontRef idx="minor"/>
+    </dgm:style>
+  </dgm:styleLbl>
+  <dgm:styleLbl name="parChTrans1D2">
+    <dgm:scene3d>
+      <a:camera prst="orthographicFront"/>
+      <a:lightRig rig="threePt" dir="t"/>
+    </dgm:scene3d>
+    <dgm:sp3d/>
+    <dgm:txPr/>
+    <dgm:style>
+      <a:lnRef idx="2">
+        <a:scrgbClr r="0" g="0" b="0"/>
+      </a:lnRef>
+      <a:fillRef idx="0">
+        <a:scrgbClr r="0" g="0" b="0"/>
+      </a:fillRef>
+      <a:effectRef idx="0">
+        <a:scrgbClr r="0" g="0" b="0"/>
+      </a:effectRef>
+      <a:fontRef idx="minor"/>
+    </dgm:style>
+  </dgm:styleLbl>
+  <dgm:styleLbl name="parChTrans1D3">
+    <dgm:scene3d>
+      <a:camera prst="orthographicFront"/>
+      <a:lightRig rig="threePt" dir="t"/>
+    </dgm:scene3d>
+    <dgm:sp3d/>
+    <dgm:txPr/>
+    <dgm:style>
+      <a:lnRef idx="2">
+        <a:scrgbClr r="0" g="0" b="0"/>
+      </a:lnRef>
+      <a:fillRef idx="0">
+        <a:scrgbClr r="0" g="0" b="0"/>
+      </a:fillRef>
+      <a:effectRef idx="0">
+        <a:scrgbClr r="0" g="0" b="0"/>
+      </a:effectRef>
+      <a:fontRef idx="minor"/>
+    </dgm:style>
+  </dgm:styleLbl>
+  <dgm:styleLbl name="parChTrans1D4">
+    <dgm:scene3d>
+      <a:camera prst="orthographicFront"/>
+      <a:lightRig rig="threePt" dir="t"/>
+    </dgm:scene3d>
+    <dgm:sp3d/>
+    <dgm:txPr/>
+    <dgm:style>
+      <a:lnRef idx="2">
+        <a:scrgbClr r="0" g="0" b="0"/>
+      </a:lnRef>
+      <a:fillRef idx="0">
+        <a:scrgbClr r="0" g="0" b="0"/>
+      </a:fillRef>
+      <a:effectRef idx="0">
+        <a:scrgbClr r="0" g="0" b="0"/>
+      </a:effectRef>
+      <a:fontRef idx="minor"/>
+    </dgm:style>
+  </dgm:styleLbl>
+  <dgm:styleLbl name="fgAcc1">
+    <dgm:scene3d>
+      <a:camera prst="orthographicFront"/>
+      <a:lightRig rig="threePt" dir="t"/>
+    </dgm:scene3d>
+    <dgm:sp3d/>
+    <dgm:txPr/>
+    <dgm:style>
+      <a:lnRef idx="2">
+        <a:scrgbClr r="0" g="0" b="0"/>
+      </a:lnRef>
+      <a:fillRef idx="1">
+        <a:scrgbClr r="0" g="0" b="0"/>
+      </a:fillRef>
+      <a:effectRef idx="0">
+        <a:scrgbClr r="0" g="0" b="0"/>
+      </a:effectRef>
+      <a:fontRef idx="minor"/>
+    </dgm:style>
+  </dgm:styleLbl>
+  <dgm:styleLbl name="conFgAcc1">
+    <dgm:scene3d>
+      <a:camera prst="orthographicFront"/>
+      <a:lightRig rig="threePt" dir="t"/>
+    </dgm:scene3d>
+    <dgm:sp3d/>
+    <dgm:txPr/>
+    <dgm:style>
+      <a:lnRef idx="2">
+        <a:scrgbClr r="0" g="0" b="0"/>
+      </a:lnRef>
+      <a:fillRef idx="1">
+        <a:scrgbClr r="0" g="0" b="0"/>
+      </a:fillRef>
+      <a:effectRef idx="0">
+        <a:scrgbClr r="0" g="0" b="0"/>
+      </a:effectRef>
+      <a:fontRef idx="minor"/>
+    </dgm:style>
+  </dgm:styleLbl>
+  <dgm:styleLbl name="alignAcc1">
+    <dgm:scene3d>
+      <a:camera prst="orthographicFront"/>
+      <a:lightRig rig="threePt" dir="t"/>
+    </dgm:scene3d>
+    <dgm:sp3d/>
+    <dgm:txPr/>
+    <dgm:style>
+      <a:lnRef idx="2">
+        <a:scrgbClr r="0" g="0" b="0"/>
+      </a:lnRef>
+      <a:fillRef idx="1">
+        <a:scrgbClr r="0" g="0" b="0"/>
+      </a:fillRef>
+      <a:effectRef idx="0">
+        <a:scrgbClr r="0" g="0" b="0"/>
+      </a:effectRef>
+      <a:fontRef idx="minor"/>
+    </dgm:style>
+  </dgm:styleLbl>
+  <dgm:styleLbl name="trAlignAcc1">
+    <dgm:scene3d>
+      <a:camera prst="orthographicFront"/>
+      <a:lightRig rig="threePt" dir="t"/>
+    </dgm:scene3d>
+    <dgm:sp3d/>
+    <dgm:txPr/>
+    <dgm:style>
+      <a:lnRef idx="1">
+        <a:scrgbClr r="0" g="0" b="0"/>
+      </a:lnRef>
+      <a:fillRef idx="1">
+        <a:scrgbClr r="0" g="0" b="0"/>
+      </a:fillRef>
+      <a:effectRef idx="0">
+        <a:scrgbClr r="0" g="0" b="0"/>
+      </a:effectRef>
+      <a:fontRef idx="minor"/>
+    </dgm:style>
+  </dgm:styleLbl>
+  <dgm:styleLbl name="bgAcc1">
+    <dgm:scene3d>
+      <a:camera prst="orthographicFront"/>
+      <a:lightRig rig="threePt" dir="t"/>
+    </dgm:scene3d>
+    <dgm:sp3d/>
+    <dgm:txPr/>
+    <dgm:style>
+      <a:lnRef idx="2">
+        <a:scrgbClr r="0" g="0" b="0"/>
+      </a:lnRef>
+      <a:fillRef idx="1">
+        <a:scrgbClr r="0" g="0" b="0"/>
+      </a:fillRef>
+      <a:effectRef idx="0">
+        <a:scrgbClr r="0" g="0" b="0"/>
+      </a:effectRef>
+      <a:fontRef idx="minor"/>
+    </dgm:style>
+  </dgm:styleLbl>
+  <dgm:styleLbl name="solidFgAcc1">
+    <dgm:scene3d>
+      <a:camera prst="orthographicFront"/>
+      <a:lightRig rig="threePt" dir="t"/>
+    </dgm:scene3d>
+    <dgm:sp3d/>
+    <dgm:txPr/>
+    <dgm:style>
+      <a:lnRef idx="2">
+        <a:scrgbClr r="0" g="0" b="0"/>
+      </a:lnRef>
+      <a:fillRef idx="1">
+        <a:scrgbClr r="0" g="0" b="0"/>
+      </a:fillRef>
+      <a:effectRef idx="0">
+        <a:scrgbClr r="0" g="0" b="0"/>
+      </a:effectRef>
+      <a:fontRef idx="minor"/>
+    </dgm:style>
+  </dgm:styleLbl>
+  <dgm:styleLbl name="solidAlignAcc1">
+    <dgm:scene3d>
+      <a:camera prst="orthographicFront"/>
+      <a:lightRig rig="threePt" dir="t"/>
+    </dgm:scene3d>
+    <dgm:sp3d/>
+    <dgm:txPr/>
+    <dgm:style>
+      <a:lnRef idx="2">
+        <a:scrgbClr r="0" g="0" b="0"/>
+      </a:lnRef>
+      <a:fillRef idx="1">
+        <a:scrgbClr r="0" g="0" b="0"/>
+      </a:fillRef>
+      <a:effectRef idx="0">
+        <a:scrgbClr r="0" g="0" b="0"/>
+      </a:effectRef>
+      <a:fontRef idx="minor"/>
+    </dgm:style>
+  </dgm:styleLbl>
+  <dgm:styleLbl name="solidBgAcc1">
+    <dgm:scene3d>
+      <a:camera prst="orthographicFront"/>
+      <a:lightRig rig="threePt" dir="t"/>
+    </dgm:scene3d>
+    <dgm:sp3d/>
+    <dgm:txPr/>
+    <dgm:style>
+      <a:lnRef idx="2">
+        <a:scrgbClr r="0" g="0" b="0"/>
+      </a:lnRef>
+      <a:fillRef idx="1">
+        <a:scrgbClr r="0" g="0" b="0"/>
+      </a:fillRef>
+      <a:effectRef idx="0">
+        <a:scrgbClr r="0" g="0" b="0"/>
+      </a:effectRef>
+      <a:fontRef idx="minor"/>
+    </dgm:style>
+  </dgm:styleLbl>
+  <dgm:styleLbl name="fgAccFollowNode1">
+    <dgm:scene3d>
+      <a:camera prst="orthographicFront"/>
+      <a:lightRig rig="threePt" dir="t"/>
+    </dgm:scene3d>
+    <dgm:sp3d/>
+    <dgm:txPr/>
+    <dgm:style>
+      <a:lnRef idx="2">
+        <a:scrgbClr r="0" g="0" b="0"/>
+      </a:lnRef>
+      <a:fillRef idx="1">
+        <a:scrgbClr r="0" g="0" b="0"/>
+      </a:fillRef>
+      <a:effectRef idx="0">
+        <a:scrgbClr r="0" g="0" b="0"/>
+      </a:effectRef>
+      <a:fontRef idx="minor"/>
+    </dgm:style>
+  </dgm:styleLbl>
+  <dgm:styleLbl name="alignAccFollowNode1">
+    <dgm:scene3d>
+      <a:camera prst="orthographicFront"/>
+      <a:lightRig rig="threePt" dir="t"/>
+    </dgm:scene3d>
+    <dgm:sp3d/>
+    <dgm:txPr/>
+    <dgm:style>
+      <a:lnRef idx="2">
+        <a:scrgbClr r="0" g="0" b="0"/>
+      </a:lnRef>
+      <a:fillRef idx="1">
+        <a:scrgbClr r="0" g="0" b="0"/>
+      </a:fillRef>
+      <a:effectRef idx="0">
+        <a:scrgbClr r="0" g="0" b="0"/>
+      </a:effectRef>
+      <a:fontRef idx="minor"/>
+    </dgm:style>
+  </dgm:styleLbl>
+  <dgm:styleLbl name="bgAccFollowNode1">
+    <dgm:scene3d>
+      <a:camera prst="orthographicFront"/>
+      <a:lightRig rig="threePt" dir="t"/>
+    </dgm:scene3d>
+    <dgm:sp3d/>
+    <dgm:txPr/>
+    <dgm:style>
+      <a:lnRef idx="2">
+        <a:scrgbClr r="0" g="0" b="0"/>
+      </a:lnRef>
+      <a:fillRef idx="1">
+        <a:scrgbClr r="0" g="0" b="0"/>
+      </a:fillRef>
+      <a:effectRef idx="0">
+        <a:scrgbClr r="0" g="0" b="0"/>
+      </a:effectRef>
+      <a:fontRef idx="minor"/>
+    </dgm:style>
+  </dgm:styleLbl>
+  <dgm:styleLbl name="fgAcc0">
+    <dgm:scene3d>
+      <a:camera prst="orthographicFront"/>
+      <a:lightRig rig="threePt" dir="t"/>
+    </dgm:scene3d>
+    <dgm:sp3d/>
+    <dgm:txPr/>
+    <dgm:style>
+      <a:lnRef idx="2">
+        <a:scrgbClr r="0" g="0" b="0"/>
+      </a:lnRef>
+      <a:fillRef idx="1">
+        <a:scrgbClr r="0" g="0" b="0"/>
+      </a:fillRef>
+      <a:effectRef idx="0">
+        <a:scrgbClr r="0" g="0" b="0"/>
+      </a:effectRef>
+      <a:fontRef idx="minor"/>
+    </dgm:style>
+  </dgm:styleLbl>
+  <dgm:styleLbl name="fgAcc2">
+    <dgm:scene3d>
+      <a:camera prst="orthographicFront"/>
+      <a:lightRig rig="threePt" dir="t"/>
+    </dgm:scene3d>
+    <dgm:sp3d/>
+    <dgm:txPr/>
+    <dgm:style>
+      <a:lnRef idx="2">
+        <a:scrgbClr r="0" g="0" b="0"/>
+      </a:lnRef>
+      <a:fillRef idx="1">
+        <a:scrgbClr r="0" g="0" b="0"/>
+      </a:fillRef>
+      <a:effectRef idx="0">
+        <a:scrgbClr r="0" g="0" b="0"/>
+      </a:effectRef>
+      <a:fontRef idx="minor"/>
+    </dgm:style>
+  </dgm:styleLbl>
+  <dgm:styleLbl name="fgAcc3">
+    <dgm:scene3d>
+      <a:camera prst="orthographicFront"/>
+      <a:lightRig rig="threePt" dir="t"/>
+    </dgm:scene3d>
+    <dgm:sp3d/>
+    <dgm:txPr/>
+    <dgm:style>
+      <a:lnRef idx="2">
+        <a:scrgbClr r="0" g="0" b="0"/>
+      </a:lnRef>
+      <a:fillRef idx="1">
+        <a:scrgbClr r="0" g="0" b="0"/>
+      </a:fillRef>
+      <a:effectRef idx="0">
+        <a:scrgbClr r="0" g="0" b="0"/>
+      </a:effectRef>
+      <a:fontRef idx="minor"/>
+    </dgm:style>
+  </dgm:styleLbl>
+  <dgm:styleLbl name="fgAcc4">
+    <dgm:scene3d>
+      <a:camera prst="orthographicFront"/>
+      <a:lightRig rig="threePt" dir="t"/>
+    </dgm:scene3d>
+    <dgm:sp3d/>
+    <dgm:txPr/>
+    <dgm:style>
+      <a:lnRef idx="2">
+        <a:scrgbClr r="0" g="0" b="0"/>
+      </a:lnRef>
+      <a:fillRef idx="1">
+        <a:scrgbClr r="0" g="0" b="0"/>
+      </a:fillRef>
+      <a:effectRef idx="0">
+        <a:scrgbClr r="0" g="0" b="0"/>
+      </a:effectRef>
+      <a:fontRef idx="minor"/>
+    </dgm:style>
+  </dgm:styleLbl>
+  <dgm:styleLbl name="bgShp">
+    <dgm:scene3d>
+      <a:camera prst="orthographicFront"/>
+      <a:lightRig rig="threePt" dir="t"/>
+    </dgm:scene3d>
+    <dgm:sp3d/>
+    <dgm:txPr/>
+    <dgm:style>
+      <a:lnRef idx="0">
+        <a:scrgbClr r="0" g="0" b="0"/>
+      </a:lnRef>
+      <a:fillRef idx="1">
+        <a:scrgbClr r="0" g="0" b="0"/>
+      </a:fillRef>
+      <a:effectRef idx="0">
+        <a:scrgbClr r="0" g="0" b="0"/>
+      </a:effectRef>
+      <a:fontRef idx="minor"/>
+    </dgm:style>
+  </dgm:styleLbl>
+  <dgm:styleLbl name="dkBgShp">
+    <dgm:scene3d>
+      <a:camera prst="orthographicFront"/>
+      <a:lightRig rig="threePt" dir="t"/>
+    </dgm:scene3d>
+    <dgm:sp3d/>
+    <dgm:txPr/>
+    <dgm:style>
+      <a:lnRef idx="0">
+        <a:scrgbClr r="0" g="0" b="0"/>
+      </a:lnRef>
+      <a:fillRef idx="1">
+        <a:scrgbClr r="0" g="0" b="0"/>
+      </a:fillRef>
+      <a:effectRef idx="0">
+        <a:scrgbClr r="0" g="0" b="0"/>
+      </a:effectRef>
+      <a:fontRef idx="minor"/>
+    </dgm:style>
+  </dgm:styleLbl>
+  <dgm:styleLbl name="trBgShp">
+    <dgm:scene3d>
+      <a:camera prst="orthographicFront"/>
+      <a:lightRig rig="threePt" dir="t"/>
+    </dgm:scene3d>
+    <dgm:sp3d/>
+    <dgm:txPr/>
+    <dgm:style>
+      <a:lnRef idx="0">
+        <a:scrgbClr r="0" g="0" b="0"/>
+      </a:lnRef>
+      <a:fillRef idx="1">
+        <a:scrgbClr r="0" g="0" b="0"/>
+      </a:fillRef>
+      <a:effectRef idx="0">
+        <a:scrgbClr r="0" g="0" b="0"/>
+      </a:effectRef>
+      <a:fontRef idx="minor"/>
+    </dgm:style>
+  </dgm:styleLbl>
+  <dgm:styleLbl name="fgShp">
+    <dgm:scene3d>
+      <a:camera prst="orthographicFront"/>
+      <a:lightRig rig="threePt" dir="t"/>
+    </dgm:scene3d>
+    <dgm:sp3d/>
+    <dgm:txPr/>
+    <dgm:style>
+      <a:lnRef idx="2">
+        <a:scrgbClr r="0" g="0" b="0"/>
+      </a:lnRef>
+      <a:fillRef idx="1">
+        <a:scrgbClr r="0" g="0" b="0"/>
+      </a:fillRef>
+      <a:effectRef idx="0">
+        <a:scrgbClr r="0" g="0" b="0"/>
+      </a:effectRef>
+      <a:fontRef idx="minor"/>
+    </dgm:style>
+  </dgm:styleLbl>
+  <dgm:styleLbl name="revTx">
+    <dgm:scene3d>
+      <a:camera prst="orthographicFront"/>
+      <a:lightRig rig="threePt" dir="t"/>
+    </dgm:scene3d>
+    <dgm:sp3d/>
+    <dgm:txPr/>
+    <dgm:style>
+      <a:lnRef idx="0">
+        <a:scrgbClr r="0" g="0" b="0"/>
+      </a:lnRef>
+      <a:fillRef idx="0">
+        <a:scrgbClr r="0" g="0" b="0"/>
+      </a:fillRef>
+      <a:effectRef idx="0">
+        <a:scrgbClr r="0" g="0" b="0"/>
+      </a:effectRef>
+      <a:fontRef idx="minor"/>
+    </dgm:style>
+  </dgm:styleLbl>
+</dgm:styleDef>
+</file>
+
 <file path=ppt/notesMasters/notesMaster1.xml><?xml version="1.0" encoding="utf-8"?>
 <p:notesMaster xmlns:a="http://schemas.openxmlformats.org/drawingml/2006/main" xmlns:r="http://schemas.openxmlformats.org/officeDocument/2006/relationships" xmlns:p="http://schemas.openxmlformats.org/presentationml/2006/main">
   <p:cSld>
@@ -215,7 +2261,7 @@
           <a:p>
             <a:fld id="{286CCB56-B95E-44AB-BB6B-03EE6A18465C}" type="datetimeFigureOut">
               <a:rPr kumimoji="1" lang="ja-JP" altLang="en-US" smtClean="0"/>
-              <a:t>2017/2/15</a:t>
+              <a:t>2017/2/16</a:t>
             </a:fld>
             <a:endParaRPr kumimoji="1" lang="ja-JP" altLang="en-US"/>
           </a:p>
@@ -663,25 +2709,20 @@
           <a:p>
             <a:r>
               <a:rPr kumimoji="1" lang="ja-JP" altLang="en-US" dirty="0"/>
-              <a:t>では、まとめを述べたいと思います。</a:t>
-            </a:r>
-            <a:r>
-              <a:rPr lang="ja-JP" altLang="en-US" dirty="0"/>
-              <a:t>本研究では</a:t>
-            </a:r>
-            <a:r>
-              <a:rPr lang="en-US" altLang="ja-JP" dirty="0"/>
-              <a:t>web</a:t>
-            </a:r>
-            <a:r>
-              <a:rPr lang="ja-JP" altLang="en-US" dirty="0"/>
-              <a:t>プログラミングを用いて授業評価アンケートを作成しました。このアンケートは従来のマークシート方式に比べて経済性の改善、教員の労力削減、ユーザ体験の</a:t>
-            </a:r>
-            <a:r>
-              <a:rPr lang="ja-JP" altLang="en-US"/>
-              <a:t>向上が実現できました。今後の展望として、このプログラムに新機能を追加し、高専の授業のさらなる品質向上に貢献していきたいと考えています。</a:t>
-            </a:r>
-            <a:endParaRPr lang="en-US" altLang="ja-JP" dirty="0"/>
+              <a:t>これらの新機能を実装することで、授業終了後に学生がすぐに今回の授業を評価することができ、より正確な意見が収集できます。</a:t>
+            </a:r>
+          </a:p>
+          <a:p>
+            <a:r>
+              <a:rPr kumimoji="1" lang="ja-JP" altLang="en-US" dirty="0"/>
+              <a:t>また、教員も授業の内容を覚えているうちに学生からのフィードバックを得られるので今までよりもさらに授業の品質が向上します。</a:t>
+            </a:r>
+          </a:p>
+          <a:p>
+            <a:endParaRPr kumimoji="1" lang="ja-JP" altLang="en-US" dirty="0"/>
+          </a:p>
+          <a:p>
+            <a:endParaRPr kumimoji="1" lang="ja-JP" altLang="en-US" dirty="0"/>
           </a:p>
         </p:txBody>
       </p:sp>
@@ -702,7 +2743,7 @@
           <a:p>
             <a:fld id="{DE4497FE-1A65-4799-B01D-44564FDEC19E}" type="slidenum">
               <a:rPr kumimoji="1" lang="ja-JP" altLang="en-US" smtClean="0"/>
-              <a:t>10</a:t>
+              <a:t>11</a:t>
             </a:fld>
             <a:endParaRPr kumimoji="1" lang="ja-JP" altLang="en-US"/>
           </a:p>
@@ -711,7 +2752,7 @@
     </p:spTree>
     <p:extLst>
       <p:ext uri="{BB962C8B-B14F-4D97-AF65-F5344CB8AC3E}">
-        <p14:creationId xmlns:p14="http://schemas.microsoft.com/office/powerpoint/2010/main" val="752795588"/>
+        <p14:creationId xmlns:p14="http://schemas.microsoft.com/office/powerpoint/2010/main" val="254944331"/>
       </p:ext>
     </p:extLst>
   </p:cSld>
@@ -789,7 +2830,7 @@
           <a:p>
             <a:fld id="{DE4497FE-1A65-4799-B01D-44564FDEC19E}" type="slidenum">
               <a:rPr kumimoji="1" lang="ja-JP" altLang="en-US" smtClean="0"/>
-              <a:t>15</a:t>
+              <a:t>16</a:t>
             </a:fld>
             <a:endParaRPr kumimoji="1" lang="ja-JP" altLang="en-US"/>
           </a:p>
@@ -866,15 +2907,19 @@
             </a:r>
             <a:r>
               <a:rPr lang="ja-JP" altLang="en-US" dirty="0"/>
-              <a:t>上で授業評価アンケートを実施することです。従来はマークシート方式で授業評価アンケートを実施していたものを</a:t>
-            </a:r>
-            <a:r>
-              <a:rPr lang="en-US" altLang="ja-JP" dirty="0"/>
+              <a:t>上で授業評価アンケートを実施することです</a:t>
+            </a:r>
+            <a:r>
+              <a:rPr lang="ja-JP" altLang="en-US" dirty="0" smtClean="0"/>
+              <a:t>。鹿児島高専ではこれまでマークシート方式で授業評価アンケートを実施してきました。本研究ではそのアンケートを</a:t>
+            </a:r>
+            <a:r>
+              <a:rPr lang="en-US" altLang="ja-JP" dirty="0" smtClean="0"/>
               <a:t>web</a:t>
             </a:r>
             <a:r>
-              <a:rPr lang="ja-JP" altLang="en-US" dirty="0"/>
-              <a:t>上で行います。</a:t>
+              <a:rPr lang="ja-JP" altLang="en-US" dirty="0" smtClean="0"/>
+              <a:t>上で実施するための仕組みづくりを行います。</a:t>
             </a:r>
             <a:endParaRPr kumimoji="1" lang="ja-JP" altLang="en-US" dirty="0"/>
           </a:p>
@@ -978,45 +3023,43 @@
               <a:defRPr/>
             </a:pPr>
             <a:r>
-              <a:rPr lang="ja-JP" altLang="en-US" dirty="0"/>
-              <a:t>次に、研究背景としてマークシート方式の欠点を述べます。マークシート方式の欠点は</a:t>
-            </a:r>
-            <a:r>
-              <a:rPr lang="en-US" altLang="ja-JP" dirty="0"/>
+              <a:rPr lang="ja-JP" altLang="en-US" dirty="0" smtClean="0"/>
+              <a:t>次に、研究背景を説明します。これまで行われてきたマークシート方式のアンケートには</a:t>
+            </a:r>
+            <a:r>
+              <a:rPr lang="en-US" altLang="ja-JP" dirty="0" smtClean="0"/>
               <a:t>2</a:t>
             </a:r>
             <a:r>
-              <a:rPr lang="ja-JP" altLang="en-US" dirty="0"/>
-              <a:t>つあります。</a:t>
-            </a:r>
-            <a:r>
-              <a:rPr lang="en-US" altLang="ja-JP" dirty="0"/>
+              <a:rPr lang="ja-JP" altLang="en-US" dirty="0" err="1" smtClean="0"/>
+              <a:t>つの</a:t>
+            </a:r>
+            <a:r>
+              <a:rPr lang="ja-JP" altLang="en-US" dirty="0" smtClean="0"/>
+              <a:t>欠点があります。</a:t>
+            </a:r>
+            <a:r>
+              <a:rPr lang="en-US" altLang="ja-JP" dirty="0" smtClean="0"/>
               <a:t>1</a:t>
             </a:r>
             <a:r>
-              <a:rPr lang="ja-JP" altLang="en-US" dirty="0"/>
-              <a:t>つめはマークシート方式は多くの紙資源を消費してしまうということです．</a:t>
-            </a:r>
-            <a:r>
-              <a:rPr lang="en-US" altLang="ja-JP" dirty="0"/>
+              <a:rPr lang="ja-JP" altLang="en-US" dirty="0" smtClean="0"/>
+              <a:t>つめは多くの紙資源を消費してしまうということです．</a:t>
+            </a:r>
+            <a:r>
+              <a:rPr lang="en-US" altLang="ja-JP" dirty="0" smtClean="0"/>
               <a:t>2</a:t>
             </a:r>
             <a:r>
-              <a:rPr lang="ja-JP" altLang="en-US" dirty="0"/>
-              <a:t>つ目は、教員がアンケートを集計する必要がある</a:t>
-            </a:r>
-          </a:p>
-          <a:p>
-            <a:r>
-              <a:rPr lang="ja-JP" altLang="en-US" dirty="0"/>
-              <a:t>事です。マークシート方式ではアンケート終了後に教員が回答用紙をスキャンしてパソコンに取り込む作業などの無駄な労力を必要とします．しかし、</a:t>
-            </a:r>
-            <a:r>
-              <a:rPr lang="en-US" altLang="ja-JP" dirty="0"/>
+              <a:rPr lang="ja-JP" altLang="en-US" dirty="0" smtClean="0"/>
+              <a:t>つ目は、教員に大きな負担がかかる点です。たとえば、マークシート方式ではアンケート終了後に教員が回答用紙をスキャンしてパソコンに取り込む必要があります。この作業以外にもデータ集計や結果をまとめる作業など多くの労力を必要とします．しかし、</a:t>
+            </a:r>
+            <a:r>
+              <a:rPr lang="en-US" altLang="ja-JP" dirty="0" smtClean="0"/>
               <a:t>web</a:t>
             </a:r>
             <a:r>
-              <a:rPr lang="ja-JP" altLang="en-US" dirty="0"/>
+              <a:rPr lang="ja-JP" altLang="en-US" dirty="0" smtClean="0"/>
               <a:t>上でアンケートを実施することでこれらの欠点を克服できます。</a:t>
             </a:r>
             <a:endParaRPr kumimoji="1" lang="ja-JP" altLang="en-US" dirty="0"/>
@@ -1104,42 +3147,46 @@
           <a:lstStyle/>
           <a:p>
             <a:r>
+              <a:rPr kumimoji="1" lang="ja-JP" altLang="en-US" dirty="0" smtClean="0"/>
+              <a:t>それでは</a:t>
+            </a:r>
+            <a:r>
+              <a:rPr kumimoji="1" lang="en-US" altLang="ja-JP" dirty="0" smtClean="0"/>
+              <a:t>web</a:t>
+            </a:r>
+            <a:r>
+              <a:rPr kumimoji="1" lang="ja-JP" altLang="en-US" dirty="0" smtClean="0"/>
+              <a:t>上で授業評価アンケートを実施する利点を説明します。</a:t>
+            </a:r>
+            <a:endParaRPr kumimoji="1" lang="en-US" altLang="ja-JP" dirty="0" smtClean="0"/>
+          </a:p>
+          <a:p>
+            <a:endParaRPr kumimoji="1" lang="en-US" altLang="ja-JP" dirty="0" smtClean="0"/>
+          </a:p>
+          <a:p>
+            <a:r>
+              <a:rPr kumimoji="1" lang="en-US" altLang="ja-JP" dirty="0" smtClean="0"/>
+              <a:t>1</a:t>
+            </a:r>
+            <a:r>
+              <a:rPr kumimoji="1" lang="ja-JP" altLang="en-US" dirty="0"/>
+              <a:t>つめは経済性です。</a:t>
+            </a:r>
+            <a:r>
               <a:rPr kumimoji="1" lang="en-US" altLang="ja-JP" dirty="0"/>
               <a:t>Web</a:t>
             </a:r>
             <a:r>
               <a:rPr kumimoji="1" lang="ja-JP" altLang="en-US" dirty="0"/>
-              <a:t>上で実施する利点として次の</a:t>
-            </a:r>
-            <a:r>
-              <a:rPr kumimoji="1" lang="en-US" altLang="ja-JP" dirty="0"/>
-              <a:t>3</a:t>
+              <a:t>上でアンケートを実施することで紙資源を</a:t>
+            </a:r>
+            <a:r>
+              <a:rPr kumimoji="1" lang="ja-JP" altLang="en-US" dirty="0" smtClean="0"/>
+              <a:t>消費せずに回答を取集することができるため経済的</a:t>
             </a:r>
             <a:r>
               <a:rPr kumimoji="1" lang="ja-JP" altLang="en-US" dirty="0"/>
-              <a:t>つが挙げられます。</a:t>
-            </a:r>
-            <a:endParaRPr kumimoji="1" lang="en-US" altLang="ja-JP" dirty="0"/>
-          </a:p>
-          <a:p>
-            <a:endParaRPr lang="en-US" altLang="ja-JP" dirty="0"/>
-          </a:p>
-          <a:p>
-            <a:r>
-              <a:rPr kumimoji="1" lang="en-US" altLang="ja-JP" dirty="0"/>
-              <a:t>1</a:t>
-            </a:r>
-            <a:r>
-              <a:rPr kumimoji="1" lang="ja-JP" altLang="en-US" dirty="0"/>
-              <a:t>つめは経済性です。</a:t>
-            </a:r>
-            <a:r>
-              <a:rPr kumimoji="1" lang="en-US" altLang="ja-JP" dirty="0"/>
-              <a:t>Web</a:t>
-            </a:r>
-            <a:r>
-              <a:rPr kumimoji="1" lang="ja-JP" altLang="en-US" dirty="0"/>
-              <a:t>上でアンケートを実施することで紙資源を消費しないため経済的です。</a:t>
+              <a:t>です。</a:t>
             </a:r>
             <a:endParaRPr kumimoji="1" lang="en-US" altLang="ja-JP" dirty="0"/>
           </a:p>
@@ -1161,11 +3208,15 @@
             </a:r>
             <a:r>
               <a:rPr lang="ja-JP" altLang="en-US" dirty="0"/>
-              <a:t>上でアンケートを実施すると学生が回答したデータは直接コンピュータに送信されるため、マークシート方式のように回答用紙をスキャンする必要がありません。また、回答データの自動集計機能を実装することで教員が</a:t>
-            </a:r>
-            <a:r>
-              <a:rPr lang="en-US" altLang="ja-JP" dirty="0"/>
-              <a:t>excel</a:t>
+              <a:t>上でアンケートを実施すると学生が回答したデータは直接コンピュータに送信されるため、マークシート方式のように回答用紙をスキャンする必要がありません。また、回答データの自動集計機能を実装することで教員</a:t>
+            </a:r>
+            <a:r>
+              <a:rPr lang="ja-JP" altLang="en-US" dirty="0" smtClean="0"/>
+              <a:t>が</a:t>
+            </a:r>
+            <a:r>
+              <a:rPr lang="en-US" altLang="ja-JP" dirty="0" smtClean="0"/>
+              <a:t>Excel</a:t>
             </a:r>
             <a:r>
               <a:rPr lang="ja-JP" altLang="en-US" dirty="0"/>
@@ -1183,7 +3234,15 @@
             </a:r>
             <a:r>
               <a:rPr lang="ja-JP" altLang="en-US" dirty="0"/>
-              <a:t>つ目はユーザ体験の向上です。マークシート方式のアンケートに回答するには鉛筆を持ち、回答欄を塗りつぶす作業をしなければなりません。このような単純作業は回答者の集中力の低下を招き冷静な判断を鈍らせます。しかし、</a:t>
+              <a:t>つ目はユーザ体験の向上です。マークシート方式のアンケートに回答するには鉛筆を持ち、回答欄を</a:t>
+            </a:r>
+            <a:r>
+              <a:rPr lang="ja-JP" altLang="en-US" dirty="0" smtClean="0"/>
+              <a:t>塗りつぶす作業を繰り返し行わなければなりません</a:t>
+            </a:r>
+            <a:r>
+              <a:rPr lang="ja-JP" altLang="en-US" dirty="0"/>
+              <a:t>。このような単純作業は回答者の集中力の低下を招き冷静な判断を鈍らせます。しかし、</a:t>
             </a:r>
             <a:r>
               <a:rPr lang="en-US" altLang="ja-JP" dirty="0"/>
@@ -1191,7 +3250,11 @@
             </a:r>
             <a:r>
               <a:rPr lang="ja-JP" altLang="en-US" dirty="0"/>
-              <a:t>上でアンケートを実施することで動きのあるユーザインターフェースで楽しくアンケートに回答できます。</a:t>
+              <a:t>上でアンケートを実施することで動きのあるユーザインターフェースで楽しくアンケートに回答できます</a:t>
+            </a:r>
+            <a:r>
+              <a:rPr lang="ja-JP" altLang="en-US" dirty="0" smtClean="0"/>
+              <a:t>。そのため、より正確なデータが得られると考えられます。</a:t>
             </a:r>
             <a:endParaRPr lang="en-US" altLang="ja-JP" dirty="0"/>
           </a:p>
@@ -1460,18 +3523,35 @@
             </a:r>
             <a:r>
               <a:rPr lang="ja-JP" altLang="en-US" dirty="0"/>
-              <a:t>本アプリケーションでは、紙資源を使わないことによる経済性が向上しました。また、スキャン不要でデータが取り込めることによって教員の労力を削減しました。さらに、動きあるユーザインターフェースによってユーザ体験を向上させました。</a:t>
+              <a:t>本アプリケーションでは、紙資源</a:t>
+            </a:r>
+            <a:r>
+              <a:rPr lang="ja-JP" altLang="en-US" dirty="0" smtClean="0"/>
+              <a:t>を一切消費せずにアンケートを実施することができました。</a:t>
+            </a:r>
+            <a:r>
+              <a:rPr lang="ja-JP" altLang="en-US" dirty="0"/>
+              <a:t>また</a:t>
+            </a:r>
+            <a:r>
+              <a:rPr lang="ja-JP" altLang="en-US" dirty="0" smtClean="0"/>
+              <a:t>、学生の回答データをコンピュータに直接転送することにより教員</a:t>
+            </a:r>
+            <a:r>
+              <a:rPr lang="ja-JP" altLang="en-US" dirty="0"/>
+              <a:t>の</a:t>
+            </a:r>
+            <a:r>
+              <a:rPr lang="ja-JP" altLang="en-US" dirty="0" smtClean="0"/>
+              <a:t>労力削減に成功しました。</a:t>
+            </a:r>
+            <a:r>
+              <a:rPr lang="ja-JP" altLang="en-US" dirty="0"/>
+              <a:t>さらに、動きあるユーザインターフェースによってユーザ体験を向上させました。</a:t>
             </a:r>
             <a:endParaRPr lang="en-US" altLang="ja-JP" dirty="0"/>
           </a:p>
           <a:p>
-            <a:endParaRPr lang="en-US" altLang="ja-JP" dirty="0"/>
-          </a:p>
-          <a:p>
-            <a:r>
-              <a:rPr lang="ja-JP" altLang="en-US" dirty="0"/>
-              <a:t>動画を見ていただいてわかるように、本アプリケーションでは、経済的で教員と学生の両方にメリットのある授業評価アンケートを実現できました。</a:t>
-            </a:r>
             <a:endParaRPr lang="en-US" altLang="ja-JP" dirty="0"/>
           </a:p>
         </p:txBody>
@@ -1557,9 +3637,10 @@
           <a:lstStyle/>
           <a:p>
             <a:r>
-              <a:rPr kumimoji="1" lang="ja-JP" altLang="en-US" dirty="0"/>
-              <a:t>今後の展望として、鹿児島高専の授業のさらなる品質向上に貢献できるアプリケーションに成長させたいと考えています。</a:t>
-            </a:r>
+              <a:rPr kumimoji="1" lang="ja-JP" altLang="en-US" dirty="0" smtClean="0"/>
+              <a:t>今後の展望として、アンケート結果の自動集計および自動配信機能を実装していきたいと考えています。それにより、より少ないコストで授業評価アンケートを実施することができます。</a:t>
+            </a:r>
+            <a:endParaRPr kumimoji="1" lang="ja-JP" altLang="en-US" dirty="0"/>
           </a:p>
         </p:txBody>
       </p:sp>
@@ -1589,7 +3670,7 @@
     </p:spTree>
     <p:extLst>
       <p:ext uri="{BB962C8B-B14F-4D97-AF65-F5344CB8AC3E}">
-        <p14:creationId xmlns:p14="http://schemas.microsoft.com/office/powerpoint/2010/main" val="2573633034"/>
+        <p14:creationId xmlns:p14="http://schemas.microsoft.com/office/powerpoint/2010/main" val="1304763948"/>
       </p:ext>
     </p:extLst>
   </p:cSld>
@@ -1645,8 +3726,25 @@
           <a:p>
             <a:r>
               <a:rPr kumimoji="1" lang="ja-JP" altLang="en-US" dirty="0"/>
-              <a:t>その具体的な方法として、アンケート結果の自動集計および自動配信機能を追加したいと考えています。</a:t>
-            </a:r>
+              <a:t>では、まとめを述べたいと思います。</a:t>
+            </a:r>
+            <a:r>
+              <a:rPr lang="ja-JP" altLang="en-US" dirty="0"/>
+              <a:t>本研究では</a:t>
+            </a:r>
+            <a:r>
+              <a:rPr lang="en-US" altLang="ja-JP" dirty="0"/>
+              <a:t>web</a:t>
+            </a:r>
+            <a:r>
+              <a:rPr lang="ja-JP" altLang="en-US" dirty="0"/>
+              <a:t>プログラミングを用いて授業評価アンケートを作成しました。このアンケートは従来のマークシート方式に比べて経済性の改善、教員の労力削減、ユーザ体験の</a:t>
+            </a:r>
+            <a:r>
+              <a:rPr lang="ja-JP" altLang="en-US"/>
+              <a:t>向上が実現できました。今後の展望として、このプログラムに新機能を追加し、高専の授業のさらなる品質向上に貢献していきたいと考えています。</a:t>
+            </a:r>
+            <a:endParaRPr lang="en-US" altLang="ja-JP" dirty="0"/>
           </a:p>
         </p:txBody>
       </p:sp>
@@ -1676,7 +3774,7 @@
     </p:spTree>
     <p:extLst>
       <p:ext uri="{BB962C8B-B14F-4D97-AF65-F5344CB8AC3E}">
-        <p14:creationId xmlns:p14="http://schemas.microsoft.com/office/powerpoint/2010/main" val="962527338"/>
+        <p14:creationId xmlns:p14="http://schemas.microsoft.com/office/powerpoint/2010/main" val="752795588"/>
       </p:ext>
     </p:extLst>
   </p:cSld>
@@ -1730,19 +3828,31 @@
           <a:bodyPr/>
           <a:lstStyle/>
           <a:p>
+            <a:pPr marL="0" marR="0" lvl="0" indent="0" algn="l" defTabSz="914400" rtl="0" eaLnBrk="1" fontAlgn="auto" latinLnBrk="0" hangingPunct="1">
+              <a:lnSpc>
+                <a:spcPct val="100000"/>
+              </a:lnSpc>
+              <a:spcBef>
+                <a:spcPts val="0"/>
+              </a:spcBef>
+              <a:spcAft>
+                <a:spcPts val="0"/>
+              </a:spcAft>
+              <a:buClrTx/>
+              <a:buSzTx/>
+              <a:buFontTx/>
+              <a:buNone/>
+              <a:tabLst/>
+              <a:defRPr/>
+            </a:pPr>
             <a:r>
               <a:rPr kumimoji="1" lang="ja-JP" altLang="en-US" dirty="0"/>
-              <a:t>これらの新機能を実装することで、授業終了後に学生がすぐに今回の授業を評価することができ、より正確な意見が収集できます。</a:t>
-            </a:r>
-          </a:p>
-          <a:p>
-            <a:r>
-              <a:rPr kumimoji="1" lang="ja-JP" altLang="en-US" dirty="0"/>
-              <a:t>また、教員も授業の内容を覚えているうちに学生からのフィードバックを得られるので今までよりもさらに授業の品質が向上します。</a:t>
-            </a:r>
-          </a:p>
-          <a:p>
-            <a:endParaRPr kumimoji="1" lang="ja-JP" altLang="en-US" dirty="0"/>
+              <a:t>今後の展望として、鹿児島高専の授業のさらなる品質向上に貢献できるアプリケーションに成長させたいと考えています</a:t>
+            </a:r>
+            <a:r>
+              <a:rPr kumimoji="1" lang="ja-JP" altLang="en-US" dirty="0" smtClean="0"/>
+              <a:t>。その具体的な方法として、アンケート結果の自動集計および自動配信機能を追加したいと考えています。</a:t>
+            </a:r>
           </a:p>
           <a:p>
             <a:endParaRPr kumimoji="1" lang="ja-JP" altLang="en-US" dirty="0"/>
@@ -1766,7 +3876,7 @@
           <a:p>
             <a:fld id="{DE4497FE-1A65-4799-B01D-44564FDEC19E}" type="slidenum">
               <a:rPr kumimoji="1" lang="ja-JP" altLang="en-US" smtClean="0"/>
-              <a:t>9</a:t>
+              <a:t>10</a:t>
             </a:fld>
             <a:endParaRPr kumimoji="1" lang="ja-JP" altLang="en-US"/>
           </a:p>
@@ -1775,7 +3885,7 @@
     </p:spTree>
     <p:extLst>
       <p:ext uri="{BB962C8B-B14F-4D97-AF65-F5344CB8AC3E}">
-        <p14:creationId xmlns:p14="http://schemas.microsoft.com/office/powerpoint/2010/main" val="254944331"/>
+        <p14:creationId xmlns:p14="http://schemas.microsoft.com/office/powerpoint/2010/main" val="2573633034"/>
       </p:ext>
     </p:extLst>
   </p:cSld>
@@ -1916,7 +4026,7 @@
           <a:p>
             <a:fld id="{CAF814FA-2675-4DF3-B0FA-C3E73A75B004}" type="datetimeFigureOut">
               <a:rPr kumimoji="1" lang="ja-JP" altLang="en-US" smtClean="0"/>
-              <a:t>2017/2/15</a:t>
+              <a:t>2017/2/16</a:t>
             </a:fld>
             <a:endParaRPr kumimoji="1" lang="ja-JP" altLang="en-US"/>
           </a:p>
@@ -2118,7 +4228,7 @@
           <a:p>
             <a:fld id="{CAF814FA-2675-4DF3-B0FA-C3E73A75B004}" type="datetimeFigureOut">
               <a:rPr kumimoji="1" lang="ja-JP" altLang="en-US" smtClean="0"/>
-              <a:t>2017/2/15</a:t>
+              <a:t>2017/2/16</a:t>
             </a:fld>
             <a:endParaRPr kumimoji="1" lang="ja-JP" altLang="en-US"/>
           </a:p>
@@ -2330,7 +4440,7 @@
           <a:p>
             <a:fld id="{CAF814FA-2675-4DF3-B0FA-C3E73A75B004}" type="datetimeFigureOut">
               <a:rPr kumimoji="1" lang="ja-JP" altLang="en-US" smtClean="0"/>
-              <a:t>2017/2/15</a:t>
+              <a:t>2017/2/16</a:t>
             </a:fld>
             <a:endParaRPr kumimoji="1" lang="ja-JP" altLang="en-US"/>
           </a:p>
@@ -2465,6 +4575,9 @@
           <a:bodyPr/>
           <a:lstStyle>
             <a:lvl1pPr marL="228600" indent="-228600">
+              <a:lnSpc>
+                <a:spcPct val="150000"/>
+              </a:lnSpc>
               <a:buClr>
                 <a:schemeClr val="accent5"/>
               </a:buClr>
@@ -2476,6 +4589,9 @@
               </a:defRPr>
             </a:lvl1pPr>
             <a:lvl2pPr marL="914400" indent="-457200">
+              <a:lnSpc>
+                <a:spcPct val="150000"/>
+              </a:lnSpc>
               <a:buClr>
                 <a:schemeClr val="accent5"/>
               </a:buClr>
@@ -2487,15 +4603,21 @@
               </a:defRPr>
             </a:lvl2pPr>
             <a:lvl3pPr>
+              <a:lnSpc>
+                <a:spcPct val="150000"/>
+              </a:lnSpc>
               <a:buClr>
                 <a:schemeClr val="accent5"/>
               </a:buClr>
-              <a:defRPr sz="2000">
+              <a:defRPr sz="2400">
                 <a:latin typeface="HGPｺﾞｼｯｸM" panose="020B0600000000000000" pitchFamily="50" charset="-128"/>
                 <a:ea typeface="HGPｺﾞｼｯｸM" panose="020B0600000000000000" pitchFamily="50" charset="-128"/>
               </a:defRPr>
             </a:lvl3pPr>
             <a:lvl4pPr>
+              <a:lnSpc>
+                <a:spcPct val="150000"/>
+              </a:lnSpc>
               <a:buClr>
                 <a:schemeClr val="accent5"/>
               </a:buClr>
@@ -2505,6 +4627,9 @@
               </a:defRPr>
             </a:lvl4pPr>
             <a:lvl5pPr>
+              <a:lnSpc>
+                <a:spcPct val="150000"/>
+              </a:lnSpc>
               <a:buClr>
                 <a:schemeClr val="accent5"/>
               </a:buClr>
@@ -2601,7 +4726,7 @@
           <a:p>
             <a:fld id="{CAF814FA-2675-4DF3-B0FA-C3E73A75B004}" type="datetimeFigureOut">
               <a:rPr kumimoji="1" lang="ja-JP" altLang="en-US" smtClean="0"/>
-              <a:t>2017/2/15</a:t>
+              <a:t>2017/2/16</a:t>
             </a:fld>
             <a:endParaRPr kumimoji="1" lang="ja-JP" altLang="en-US"/>
           </a:p>
@@ -2845,7 +4970,7 @@
           <a:p>
             <a:fld id="{CAF814FA-2675-4DF3-B0FA-C3E73A75B004}" type="datetimeFigureOut">
               <a:rPr kumimoji="1" lang="ja-JP" altLang="en-US" smtClean="0"/>
-              <a:t>2017/2/15</a:t>
+              <a:t>2017/2/16</a:t>
             </a:fld>
             <a:endParaRPr kumimoji="1" lang="ja-JP" altLang="en-US"/>
           </a:p>
@@ -3141,7 +5266,7 @@
           <a:p>
             <a:fld id="{CAF814FA-2675-4DF3-B0FA-C3E73A75B004}" type="datetimeFigureOut">
               <a:rPr kumimoji="1" lang="ja-JP" altLang="en-US" smtClean="0"/>
-              <a:t>2017/2/15</a:t>
+              <a:t>2017/2/16</a:t>
             </a:fld>
             <a:endParaRPr kumimoji="1" lang="ja-JP" altLang="en-US"/>
           </a:p>
@@ -3572,7 +5697,7 @@
           <a:p>
             <a:fld id="{CAF814FA-2675-4DF3-B0FA-C3E73A75B004}" type="datetimeFigureOut">
               <a:rPr kumimoji="1" lang="ja-JP" altLang="en-US" smtClean="0"/>
-              <a:t>2017/2/15</a:t>
+              <a:t>2017/2/16</a:t>
             </a:fld>
             <a:endParaRPr kumimoji="1" lang="ja-JP" altLang="en-US"/>
           </a:p>
@@ -3690,7 +5815,7 @@
           <a:p>
             <a:fld id="{CAF814FA-2675-4DF3-B0FA-C3E73A75B004}" type="datetimeFigureOut">
               <a:rPr kumimoji="1" lang="ja-JP" altLang="en-US" smtClean="0"/>
-              <a:t>2017/2/15</a:t>
+              <a:t>2017/2/16</a:t>
             </a:fld>
             <a:endParaRPr kumimoji="1" lang="ja-JP" altLang="en-US"/>
           </a:p>
@@ -3785,7 +5910,7 @@
           <a:p>
             <a:fld id="{CAF814FA-2675-4DF3-B0FA-C3E73A75B004}" type="datetimeFigureOut">
               <a:rPr kumimoji="1" lang="ja-JP" altLang="en-US" smtClean="0"/>
-              <a:t>2017/2/15</a:t>
+              <a:t>2017/2/16</a:t>
             </a:fld>
             <a:endParaRPr kumimoji="1" lang="ja-JP" altLang="en-US"/>
           </a:p>
@@ -4094,7 +6219,7 @@
           <a:p>
             <a:fld id="{CAF814FA-2675-4DF3-B0FA-C3E73A75B004}" type="datetimeFigureOut">
               <a:rPr kumimoji="1" lang="ja-JP" altLang="en-US" smtClean="0"/>
-              <a:t>2017/2/15</a:t>
+              <a:t>2017/2/16</a:t>
             </a:fld>
             <a:endParaRPr kumimoji="1" lang="ja-JP" altLang="en-US"/>
           </a:p>
@@ -4351,7 +6476,7 @@
           <a:p>
             <a:fld id="{CAF814FA-2675-4DF3-B0FA-C3E73A75B004}" type="datetimeFigureOut">
               <a:rPr kumimoji="1" lang="ja-JP" altLang="en-US" smtClean="0"/>
-              <a:t>2017/2/15</a:t>
+              <a:t>2017/2/16</a:t>
             </a:fld>
             <a:endParaRPr kumimoji="1" lang="ja-JP" altLang="en-US"/>
           </a:p>
@@ -4596,7 +6721,7 @@
           <a:p>
             <a:fld id="{CAF814FA-2675-4DF3-B0FA-C3E73A75B004}" type="datetimeFigureOut">
               <a:rPr kumimoji="1" lang="ja-JP" altLang="en-US" smtClean="0"/>
-              <a:t>2017/2/15</a:t>
+              <a:t>2017/2/16</a:t>
             </a:fld>
             <a:endParaRPr kumimoji="1" lang="ja-JP" altLang="en-US"/>
           </a:p>
@@ -5033,6 +7158,10 @@
               <a:rPr lang="ja-JP" altLang="ja-JP" dirty="0"/>
               <a:t>プログラミングを用いた</a:t>
             </a:r>
+            <a:r>
+              <a:rPr lang="en-US" altLang="ja-JP" dirty="0"/>
+              <a:t/>
+            </a:r>
             <a:br>
               <a:rPr lang="en-US" altLang="ja-JP" dirty="0"/>
             </a:br>
@@ -5128,9 +7257,10 @@
           <a:lstStyle/>
           <a:p>
             <a:r>
-              <a:rPr kumimoji="1" lang="ja-JP" altLang="en-US" dirty="0"/>
-              <a:t>まとめ</a:t>
-            </a:r>
+              <a:rPr lang="ja-JP" altLang="en-US" dirty="0"/>
+              <a:t>今後の展望</a:t>
+            </a:r>
+            <a:endParaRPr kumimoji="1" lang="ja-JP" altLang="en-US" dirty="0"/>
           </a:p>
         </p:txBody>
       </p:sp>
@@ -5146,45 +7276,56 @@
         </p:nvSpPr>
         <p:spPr/>
         <p:txBody>
-          <a:bodyPr/>
-          <a:lstStyle/>
-          <a:p>
-            <a:r>
-              <a:rPr kumimoji="1" lang="en-US" altLang="ja-JP" dirty="0"/>
-              <a:t>Web</a:t>
-            </a:r>
+          <a:bodyPr>
+            <a:normAutofit/>
+          </a:bodyPr>
+          <a:lstStyle/>
+          <a:p>
+            <a:pPr>
+              <a:lnSpc>
+                <a:spcPct val="100000"/>
+              </a:lnSpc>
+            </a:pPr>
             <a:r>
               <a:rPr lang="ja-JP" altLang="en-US" dirty="0"/>
-              <a:t>プログラミングで授業評価アンケートを作成した</a:t>
-            </a:r>
-            <a:endParaRPr lang="en-US" altLang="ja-JP" dirty="0"/>
-          </a:p>
-          <a:p>
+              <a:t>授業</a:t>
+            </a:r>
+            <a:r>
+              <a:rPr lang="ja-JP" altLang="en-US" dirty="0" smtClean="0"/>
+              <a:t>が終了するごとにアンケートを実施できるシステムを作成する</a:t>
+            </a:r>
+            <a:endParaRPr lang="en-US" altLang="ja-JP" dirty="0" smtClean="0"/>
+          </a:p>
+          <a:p>
+            <a:pPr lvl="1"/>
+            <a:r>
+              <a:rPr kumimoji="1" lang="ja-JP" altLang="en-US" dirty="0" smtClean="0"/>
+              <a:t>追加する新機能</a:t>
+            </a:r>
+            <a:endParaRPr kumimoji="1" lang="en-US" altLang="ja-JP" dirty="0" smtClean="0"/>
+          </a:p>
+          <a:p>
+            <a:pPr lvl="2"/>
+            <a:r>
+              <a:rPr lang="ja-JP" altLang="en-US" dirty="0" smtClean="0"/>
+              <a:t>アンケート結果の自動集計機能</a:t>
+            </a:r>
+            <a:endParaRPr lang="en-US" altLang="ja-JP" dirty="0" smtClean="0"/>
+          </a:p>
+          <a:p>
+            <a:pPr lvl="2"/>
+            <a:r>
+              <a:rPr kumimoji="1" lang="ja-JP" altLang="en-US" dirty="0" smtClean="0"/>
+              <a:t>アンケート結果の自動配信機能</a:t>
+            </a:r>
             <a:endParaRPr kumimoji="1" lang="en-US" altLang="ja-JP" dirty="0"/>
-          </a:p>
-          <a:p>
-            <a:r>
-              <a:rPr lang="ja-JP" altLang="en-US" dirty="0"/>
-              <a:t>経済性の改善、教員の労力削減、ユーザ体験の向上が実現した</a:t>
-            </a:r>
-            <a:endParaRPr lang="en-US" altLang="ja-JP" dirty="0"/>
-          </a:p>
-          <a:p>
-            <a:endParaRPr kumimoji="1" lang="en-US" altLang="ja-JP" dirty="0"/>
-          </a:p>
-          <a:p>
-            <a:r>
-              <a:rPr lang="ja-JP" altLang="en-US" dirty="0"/>
-              <a:t>新機能を実装することで高専の授業のさらなる品質向上に貢献できる。</a:t>
-            </a:r>
-            <a:endParaRPr kumimoji="1" lang="ja-JP" altLang="en-US" dirty="0"/>
           </a:p>
         </p:txBody>
       </p:sp>
     </p:spTree>
     <p:extLst>
       <p:ext uri="{BB962C8B-B14F-4D97-AF65-F5344CB8AC3E}">
-        <p14:creationId xmlns:p14="http://schemas.microsoft.com/office/powerpoint/2010/main" val="1114868748"/>
+        <p14:creationId xmlns:p14="http://schemas.microsoft.com/office/powerpoint/2010/main" val="4066048542"/>
       </p:ext>
     </p:extLst>
   </p:cSld>
@@ -5226,7 +7367,11 @@
           <a:bodyPr/>
           <a:lstStyle/>
           <a:p>
-            <a:endParaRPr kumimoji="1" lang="ja-JP" altLang="en-US"/>
+            <a:r>
+              <a:rPr lang="ja-JP" altLang="en-US" dirty="0"/>
+              <a:t>今後の展望</a:t>
+            </a:r>
+            <a:endParaRPr kumimoji="1" lang="ja-JP" altLang="en-US" dirty="0"/>
           </a:p>
         </p:txBody>
       </p:sp>
@@ -5242,17 +7387,30 @@
         </p:nvSpPr>
         <p:spPr/>
         <p:txBody>
-          <a:bodyPr/>
-          <a:lstStyle/>
-          <a:p>
-            <a:endParaRPr kumimoji="1" lang="ja-JP" altLang="en-US"/>
+          <a:bodyPr>
+            <a:normAutofit fontScale="92500" lnSpcReduction="10000"/>
+          </a:bodyPr>
+          <a:lstStyle/>
+          <a:p>
+            <a:r>
+              <a:rPr lang="ja-JP" altLang="en-US" dirty="0"/>
+              <a:t>これらの新機能を実装することで、授業終了後に学生がすぐに今回の授業を評価することができ、より正確な意見が収集できます。</a:t>
+            </a:r>
+            <a:endParaRPr lang="en-US" altLang="ja-JP" dirty="0"/>
+          </a:p>
+          <a:p>
+            <a:r>
+              <a:rPr lang="ja-JP" altLang="en-US" dirty="0"/>
+              <a:t>また、教員も授業の内容を覚えているうちに学生からのフィードバックを得られるので今までよりもさらに授業の品質が向上します。</a:t>
+            </a:r>
+            <a:endParaRPr kumimoji="1" lang="en-US" altLang="ja-JP" dirty="0"/>
           </a:p>
         </p:txBody>
       </p:sp>
     </p:spTree>
     <p:extLst>
       <p:ext uri="{BB962C8B-B14F-4D97-AF65-F5344CB8AC3E}">
-        <p14:creationId xmlns:p14="http://schemas.microsoft.com/office/powerpoint/2010/main" val="2117521921"/>
+        <p14:creationId xmlns:p14="http://schemas.microsoft.com/office/powerpoint/2010/main" val="3755367451"/>
       </p:ext>
     </p:extLst>
   </p:cSld>
@@ -5294,38 +7452,39 @@
           <a:bodyPr/>
           <a:lstStyle/>
           <a:p>
-            <a:endParaRPr kumimoji="1" lang="ja-JP" altLang="en-US" dirty="0"/>
-          </a:p>
-        </p:txBody>
-      </p:sp>
-      <p:sp>
-        <p:nvSpPr>
-          <p:cNvPr id="3" name="コンテンツ プレースホルダー 2"/>
-          <p:cNvSpPr>
-            <a:spLocks noGrp="1"/>
-          </p:cNvSpPr>
+            <a:endParaRPr kumimoji="1" lang="ja-JP" altLang="en-US"/>
+          </a:p>
+        </p:txBody>
+      </p:sp>
+      <p:graphicFrame>
+        <p:nvGraphicFramePr>
+          <p:cNvPr id="4" name="コンテンツ プレースホルダー 3"/>
+          <p:cNvGraphicFramePr>
+            <a:graphicFrameLocks noGrp="1"/>
+          </p:cNvGraphicFramePr>
           <p:nvPr>
             <p:ph idx="1"/>
-          </p:nvPr>
-        </p:nvSpPr>
-        <p:spPr/>
-        <p:txBody>
-          <a:bodyPr>
-            <a:normAutofit/>
-          </a:bodyPr>
-          <a:lstStyle/>
-          <a:p>
-            <a:pPr marL="457200" lvl="1" indent="0">
-              <a:buNone/>
-            </a:pPr>
-            <a:endParaRPr lang="en-US" altLang="ja-JP" sz="3600" dirty="0"/>
-          </a:p>
-        </p:txBody>
-      </p:sp>
+            <p:extLst>
+              <p:ext uri="{D42A27DB-BD31-4B8C-83A1-F6EECF244321}">
+                <p14:modId xmlns:p14="http://schemas.microsoft.com/office/powerpoint/2010/main" val="3131136743"/>
+              </p:ext>
+            </p:extLst>
+          </p:nvPr>
+        </p:nvGraphicFramePr>
+        <p:xfrm>
+          <a:off x="628650" y="1524000"/>
+          <a:ext cx="7886700" cy="4652963"/>
+        </p:xfrm>
+        <a:graphic>
+          <a:graphicData uri="http://schemas.openxmlformats.org/drawingml/2006/diagram">
+            <dgm:relIds xmlns:dgm="http://schemas.openxmlformats.org/drawingml/2006/diagram" xmlns:r="http://schemas.openxmlformats.org/officeDocument/2006/relationships" r:dm="rId2" r:lo="rId3" r:qs="rId4" r:cs="rId5"/>
+          </a:graphicData>
+        </a:graphic>
+      </p:graphicFrame>
     </p:spTree>
     <p:extLst>
       <p:ext uri="{BB962C8B-B14F-4D97-AF65-F5344CB8AC3E}">
-        <p14:creationId xmlns:p14="http://schemas.microsoft.com/office/powerpoint/2010/main" val="3591337185"/>
+        <p14:creationId xmlns:p14="http://schemas.microsoft.com/office/powerpoint/2010/main" val="2118204308"/>
       </p:ext>
     </p:extLst>
   </p:cSld>
@@ -5367,7 +7526,7 @@
           <a:bodyPr/>
           <a:lstStyle/>
           <a:p>
-            <a:endParaRPr kumimoji="1" lang="ja-JP" altLang="en-US"/>
+            <a:endParaRPr kumimoji="1" lang="ja-JP" altLang="en-US" dirty="0"/>
           </a:p>
         </p:txBody>
       </p:sp>
@@ -5383,17 +7542,22 @@
         </p:nvSpPr>
         <p:spPr/>
         <p:txBody>
-          <a:bodyPr/>
-          <a:lstStyle/>
-          <a:p>
-            <a:endParaRPr kumimoji="1" lang="ja-JP" altLang="en-US"/>
+          <a:bodyPr>
+            <a:normAutofit/>
+          </a:bodyPr>
+          <a:lstStyle/>
+          <a:p>
+            <a:pPr marL="457200" lvl="1" indent="0">
+              <a:buNone/>
+            </a:pPr>
+            <a:endParaRPr lang="en-US" altLang="ja-JP" sz="3600" dirty="0"/>
           </a:p>
         </p:txBody>
       </p:sp>
     </p:spTree>
     <p:extLst>
       <p:ext uri="{BB962C8B-B14F-4D97-AF65-F5344CB8AC3E}">
-        <p14:creationId xmlns:p14="http://schemas.microsoft.com/office/powerpoint/2010/main" val="1019220225"/>
+        <p14:creationId xmlns:p14="http://schemas.microsoft.com/office/powerpoint/2010/main" val="3591337185"/>
       </p:ext>
     </p:extLst>
   </p:cSld>
@@ -5435,14 +7599,7 @@
           <a:bodyPr/>
           <a:lstStyle/>
           <a:p>
-            <a:r>
-              <a:rPr kumimoji="1" lang="en-US" altLang="ja-JP" dirty="0"/>
-              <a:t>WEB</a:t>
-            </a:r>
-            <a:r>
-              <a:rPr kumimoji="1" lang="ja-JP" altLang="en-US" dirty="0"/>
-              <a:t>プログラミングの現状</a:t>
-            </a:r>
+            <a:endParaRPr kumimoji="1" lang="ja-JP" altLang="en-US"/>
           </a:p>
         </p:txBody>
       </p:sp>
@@ -5458,110 +7615,17 @@
         </p:nvSpPr>
         <p:spPr/>
         <p:txBody>
-          <a:bodyPr>
-            <a:normAutofit/>
-          </a:bodyPr>
-          <a:lstStyle/>
-          <a:p>
-            <a:r>
-              <a:rPr kumimoji="1" lang="ja-JP" altLang="en-US" dirty="0"/>
-              <a:t>無料の学習環境</a:t>
-            </a:r>
-            <a:endParaRPr lang="en-US" altLang="ja-JP" dirty="0"/>
-          </a:p>
-          <a:p>
-            <a:pPr lvl="1"/>
-            <a:r>
-              <a:rPr lang="ja-JP" altLang="en-US" dirty="0"/>
-              <a:t>ドットインストール</a:t>
-            </a:r>
-            <a:endParaRPr lang="en-US" altLang="ja-JP" dirty="0"/>
-          </a:p>
-          <a:p>
-            <a:pPr lvl="1"/>
-            <a:r>
-              <a:rPr lang="en-US" altLang="ja-JP" dirty="0" err="1"/>
-              <a:t>Qiita</a:t>
-            </a:r>
-            <a:endParaRPr lang="en-US" altLang="ja-JP" dirty="0"/>
-          </a:p>
-          <a:p>
-            <a:endParaRPr lang="en-US" altLang="ja-JP" dirty="0"/>
-          </a:p>
-          <a:p>
-            <a:r>
-              <a:rPr lang="ja-JP" altLang="en-US" dirty="0"/>
-              <a:t>外部ライブラリの充実</a:t>
-            </a:r>
-            <a:endParaRPr lang="en-US" altLang="ja-JP" dirty="0"/>
-          </a:p>
-          <a:p>
-            <a:pPr lvl="1"/>
-            <a:r>
-              <a:rPr lang="ja-JP" altLang="en-US" dirty="0"/>
-              <a:t>各種フレームワークなど</a:t>
-            </a:r>
-            <a:endParaRPr lang="en-US" altLang="ja-JP" dirty="0"/>
-          </a:p>
-          <a:p>
-            <a:endParaRPr lang="en-US" altLang="ja-JP" dirty="0"/>
-          </a:p>
-          <a:p>
-            <a:endParaRPr kumimoji="1" lang="ja-JP" altLang="en-US" dirty="0"/>
-          </a:p>
-        </p:txBody>
-      </p:sp>
-      <p:sp>
-        <p:nvSpPr>
-          <p:cNvPr id="4" name="正方形/長方形 3"/>
-          <p:cNvSpPr/>
-          <p:nvPr/>
-        </p:nvSpPr>
-        <p:spPr>
-          <a:xfrm>
-            <a:off x="551792" y="5333507"/>
-            <a:ext cx="8261132" cy="756745"/>
-          </a:xfrm>
-          <a:prstGeom prst="rect">
-            <a:avLst/>
-          </a:prstGeom>
-        </p:spPr>
-        <p:style>
-          <a:lnRef idx="2">
-            <a:schemeClr val="accent1">
-              <a:shade val="50000"/>
-            </a:schemeClr>
-          </a:lnRef>
-          <a:fillRef idx="1">
-            <a:schemeClr val="accent1"/>
-          </a:fillRef>
-          <a:effectRef idx="0">
-            <a:schemeClr val="accent1"/>
-          </a:effectRef>
-          <a:fontRef idx="minor">
-            <a:schemeClr val="lt1"/>
-          </a:fontRef>
-        </p:style>
-        <p:txBody>
-          <a:bodyPr rtlCol="0" anchor="ctr"/>
-          <a:lstStyle/>
-          <a:p>
-            <a:r>
-              <a:rPr lang="en-US" altLang="ja-JP" sz="3600" dirty="0"/>
-              <a:t>WEB</a:t>
-            </a:r>
-            <a:r>
-              <a:rPr lang="ja-JP" altLang="en-US" sz="3600" dirty="0"/>
-              <a:t>プログラミングの敷居が下がっている</a:t>
-            </a:r>
-            <a:endParaRPr lang="en-US" altLang="ja-JP" sz="3600" dirty="0"/>
+          <a:bodyPr/>
+          <a:lstStyle/>
+          <a:p>
+            <a:endParaRPr kumimoji="1" lang="ja-JP" altLang="en-US"/>
           </a:p>
         </p:txBody>
       </p:sp>
     </p:spTree>
     <p:extLst>
       <p:ext uri="{BB962C8B-B14F-4D97-AF65-F5344CB8AC3E}">
-        <p14:creationId xmlns:p14="http://schemas.microsoft.com/office/powerpoint/2010/main" val="3565592007"/>
+        <p14:creationId xmlns:p14="http://schemas.microsoft.com/office/powerpoint/2010/main" val="1019220225"/>
       </p:ext>
     </p:extLst>
   </p:cSld>
@@ -5604,18 +7668,13 @@
           <a:lstStyle/>
           <a:p>
             <a:r>
-              <a:rPr lang="ja-JP" altLang="en-US" dirty="0"/>
-              <a:t>シングルページ</a:t>
-            </a:r>
-            <a:r>
-              <a:rPr lang="en-US" altLang="ja-JP" dirty="0"/>
+              <a:rPr kumimoji="1" lang="en-US" altLang="ja-JP" dirty="0"/>
               <a:t>WEB</a:t>
             </a:r>
             <a:r>
-              <a:rPr lang="ja-JP" altLang="en-US" dirty="0"/>
-              <a:t>アプリケーション</a:t>
-            </a:r>
-            <a:endParaRPr kumimoji="1" lang="ja-JP" altLang="en-US" dirty="0"/>
+              <a:rPr kumimoji="1" lang="ja-JP" altLang="en-US" dirty="0"/>
+              <a:t>プログラミングの現状</a:t>
+            </a:r>
           </a:p>
         </p:txBody>
       </p:sp>
@@ -5637,93 +7696,104 @@
           <a:lstStyle/>
           <a:p>
             <a:r>
+              <a:rPr kumimoji="1" lang="ja-JP" altLang="en-US" dirty="0"/>
+              <a:t>無料の学習環境</a:t>
+            </a:r>
+            <a:endParaRPr lang="en-US" altLang="ja-JP" dirty="0"/>
+          </a:p>
+          <a:p>
+            <a:pPr lvl="1"/>
+            <a:r>
               <a:rPr lang="ja-JP" altLang="en-US" dirty="0"/>
-              <a:t>概要</a:t>
+              <a:t>ドットインストール</a:t>
             </a:r>
             <a:endParaRPr lang="en-US" altLang="ja-JP" dirty="0"/>
           </a:p>
           <a:p>
             <a:pPr lvl="1"/>
             <a:r>
+              <a:rPr lang="en-US" altLang="ja-JP" dirty="0" err="1"/>
+              <a:t>Qiita</a:t>
+            </a:r>
+            <a:endParaRPr lang="en-US" altLang="ja-JP" dirty="0"/>
+          </a:p>
+          <a:p>
+            <a:endParaRPr lang="en-US" altLang="ja-JP" dirty="0"/>
+          </a:p>
+          <a:p>
+            <a:r>
               <a:rPr lang="ja-JP" altLang="en-US" dirty="0"/>
-              <a:t>近年注目を集めている</a:t>
-            </a:r>
-            <a:r>
-              <a:rPr lang="en-US" altLang="ja-JP" dirty="0"/>
+              <a:t>外部ライブラリの充実</a:t>
+            </a:r>
+            <a:endParaRPr lang="en-US" altLang="ja-JP" dirty="0"/>
+          </a:p>
+          <a:p>
+            <a:pPr lvl="1"/>
+            <a:r>
+              <a:rPr lang="ja-JP" altLang="en-US" dirty="0"/>
+              <a:t>各種フレームワークなど</a:t>
+            </a:r>
+            <a:endParaRPr lang="en-US" altLang="ja-JP" dirty="0"/>
+          </a:p>
+          <a:p>
+            <a:endParaRPr lang="en-US" altLang="ja-JP" dirty="0"/>
+          </a:p>
+          <a:p>
+            <a:endParaRPr kumimoji="1" lang="ja-JP" altLang="en-US" dirty="0"/>
+          </a:p>
+        </p:txBody>
+      </p:sp>
+      <p:sp>
+        <p:nvSpPr>
+          <p:cNvPr id="4" name="正方形/長方形 3"/>
+          <p:cNvSpPr/>
+          <p:nvPr/>
+        </p:nvSpPr>
+        <p:spPr>
+          <a:xfrm>
+            <a:off x="551792" y="5333507"/>
+            <a:ext cx="8261132" cy="756745"/>
+          </a:xfrm>
+          <a:prstGeom prst="rect">
+            <a:avLst/>
+          </a:prstGeom>
+        </p:spPr>
+        <p:style>
+          <a:lnRef idx="2">
+            <a:schemeClr val="accent1">
+              <a:shade val="50000"/>
+            </a:schemeClr>
+          </a:lnRef>
+          <a:fillRef idx="1">
+            <a:schemeClr val="accent1"/>
+          </a:fillRef>
+          <a:effectRef idx="0">
+            <a:schemeClr val="accent1"/>
+          </a:effectRef>
+          <a:fontRef idx="minor">
+            <a:schemeClr val="lt1"/>
+          </a:fontRef>
+        </p:style>
+        <p:txBody>
+          <a:bodyPr rtlCol="0" anchor="ctr"/>
+          <a:lstStyle/>
+          <a:p>
+            <a:r>
+              <a:rPr lang="en-US" altLang="ja-JP" sz="3600" dirty="0"/>
               <a:t>WEB</a:t>
             </a:r>
             <a:r>
-              <a:rPr lang="ja-JP" altLang="en-US" dirty="0"/>
-              <a:t>アプリの仕様</a:t>
-            </a:r>
-            <a:endParaRPr lang="en-US" altLang="ja-JP" dirty="0"/>
-          </a:p>
-          <a:p>
-            <a:endParaRPr lang="en-US" altLang="ja-JP" dirty="0"/>
-          </a:p>
-          <a:p>
-            <a:r>
-              <a:rPr lang="ja-JP" altLang="en-US" dirty="0"/>
-              <a:t>特徴</a:t>
-            </a:r>
-            <a:endParaRPr kumimoji="1" lang="en-US" altLang="ja-JP" dirty="0"/>
-          </a:p>
-          <a:p>
-            <a:pPr lvl="1"/>
-            <a:r>
-              <a:rPr lang="ja-JP" altLang="en-US" dirty="0"/>
-              <a:t>デプロイが簡単</a:t>
-            </a:r>
-            <a:endParaRPr lang="en-US" altLang="ja-JP" dirty="0"/>
-          </a:p>
-          <a:p>
-            <a:pPr lvl="1"/>
-            <a:r>
-              <a:rPr kumimoji="1" lang="ja-JP" altLang="en-US" dirty="0"/>
-              <a:t>クロスプラットフォームである</a:t>
-            </a:r>
-            <a:endParaRPr kumimoji="1" lang="en-US" altLang="ja-JP" dirty="0"/>
-          </a:p>
-          <a:p>
-            <a:pPr lvl="1"/>
-            <a:endParaRPr kumimoji="1" lang="en-US" altLang="ja-JP" dirty="0"/>
-          </a:p>
-          <a:p>
-            <a:r>
-              <a:rPr kumimoji="1" lang="ja-JP" altLang="en-US" dirty="0"/>
-              <a:t>例</a:t>
-            </a:r>
-            <a:endParaRPr kumimoji="1" lang="en-US" altLang="ja-JP" dirty="0"/>
-          </a:p>
-          <a:p>
-            <a:pPr lvl="1"/>
-            <a:r>
-              <a:rPr lang="en-US" altLang="ja-JP" dirty="0"/>
-              <a:t>Twitter</a:t>
-            </a:r>
-            <a:r>
-              <a:rPr lang="ja-JP" altLang="en-US" dirty="0"/>
-              <a:t>や</a:t>
-            </a:r>
-            <a:r>
-              <a:rPr lang="en-US" altLang="ja-JP" dirty="0"/>
-              <a:t>Instagram</a:t>
-            </a:r>
-            <a:r>
-              <a:rPr lang="ja-JP" altLang="en-US" dirty="0"/>
-              <a:t>など</a:t>
-            </a:r>
-            <a:endParaRPr kumimoji="1" lang="en-US" altLang="ja-JP" dirty="0"/>
-          </a:p>
-          <a:p>
-            <a:endParaRPr kumimoji="1" lang="ja-JP" altLang="en-US" dirty="0"/>
+              <a:rPr lang="ja-JP" altLang="en-US" sz="3600" dirty="0"/>
+              <a:t>プログラミングの敷居が下がっている</a:t>
+            </a:r>
+            <a:endParaRPr lang="en-US" altLang="ja-JP" sz="3600" dirty="0"/>
           </a:p>
         </p:txBody>
       </p:sp>
     </p:spTree>
     <p:extLst>
       <p:ext uri="{BB962C8B-B14F-4D97-AF65-F5344CB8AC3E}">
-        <p14:creationId xmlns:p14="http://schemas.microsoft.com/office/powerpoint/2010/main" val="544699416"/>
+        <p14:creationId xmlns:p14="http://schemas.microsoft.com/office/powerpoint/2010/main" val="3565592007"/>
       </p:ext>
     </p:extLst>
   </p:cSld>
@@ -5766,6 +7836,168 @@
           <a:lstStyle/>
           <a:p>
             <a:r>
+              <a:rPr lang="ja-JP" altLang="en-US" dirty="0"/>
+              <a:t>シングルページ</a:t>
+            </a:r>
+            <a:r>
+              <a:rPr lang="en-US" altLang="ja-JP" dirty="0"/>
+              <a:t>WEB</a:t>
+            </a:r>
+            <a:r>
+              <a:rPr lang="ja-JP" altLang="en-US" dirty="0"/>
+              <a:t>アプリケーション</a:t>
+            </a:r>
+            <a:endParaRPr kumimoji="1" lang="ja-JP" altLang="en-US" dirty="0"/>
+          </a:p>
+        </p:txBody>
+      </p:sp>
+      <p:sp>
+        <p:nvSpPr>
+          <p:cNvPr id="3" name="コンテンツ プレースホルダー 2"/>
+          <p:cNvSpPr>
+            <a:spLocks noGrp="1"/>
+          </p:cNvSpPr>
+          <p:nvPr>
+            <p:ph idx="1"/>
+          </p:nvPr>
+        </p:nvSpPr>
+        <p:spPr/>
+        <p:txBody>
+          <a:bodyPr>
+            <a:normAutofit fontScale="62500" lnSpcReduction="20000"/>
+          </a:bodyPr>
+          <a:lstStyle/>
+          <a:p>
+            <a:r>
+              <a:rPr lang="ja-JP" altLang="en-US" dirty="0"/>
+              <a:t>概要</a:t>
+            </a:r>
+            <a:endParaRPr lang="en-US" altLang="ja-JP" dirty="0"/>
+          </a:p>
+          <a:p>
+            <a:pPr lvl="1"/>
+            <a:r>
+              <a:rPr lang="ja-JP" altLang="en-US" dirty="0"/>
+              <a:t>近年注目を集めている</a:t>
+            </a:r>
+            <a:r>
+              <a:rPr lang="en-US" altLang="ja-JP" dirty="0"/>
+              <a:t>WEB</a:t>
+            </a:r>
+            <a:r>
+              <a:rPr lang="ja-JP" altLang="en-US" dirty="0"/>
+              <a:t>アプリの仕様</a:t>
+            </a:r>
+            <a:endParaRPr lang="en-US" altLang="ja-JP" dirty="0"/>
+          </a:p>
+          <a:p>
+            <a:endParaRPr lang="en-US" altLang="ja-JP" dirty="0"/>
+          </a:p>
+          <a:p>
+            <a:r>
+              <a:rPr lang="ja-JP" altLang="en-US" dirty="0"/>
+              <a:t>特徴</a:t>
+            </a:r>
+            <a:endParaRPr kumimoji="1" lang="en-US" altLang="ja-JP" dirty="0"/>
+          </a:p>
+          <a:p>
+            <a:pPr lvl="1"/>
+            <a:r>
+              <a:rPr lang="ja-JP" altLang="en-US" dirty="0"/>
+              <a:t>デプロイが簡単</a:t>
+            </a:r>
+            <a:endParaRPr lang="en-US" altLang="ja-JP" dirty="0"/>
+          </a:p>
+          <a:p>
+            <a:pPr lvl="1"/>
+            <a:r>
+              <a:rPr kumimoji="1" lang="ja-JP" altLang="en-US" dirty="0"/>
+              <a:t>クロスプラットフォームである</a:t>
+            </a:r>
+            <a:endParaRPr kumimoji="1" lang="en-US" altLang="ja-JP" dirty="0"/>
+          </a:p>
+          <a:p>
+            <a:pPr lvl="1"/>
+            <a:endParaRPr kumimoji="1" lang="en-US" altLang="ja-JP" dirty="0"/>
+          </a:p>
+          <a:p>
+            <a:r>
+              <a:rPr kumimoji="1" lang="ja-JP" altLang="en-US" dirty="0"/>
+              <a:t>例</a:t>
+            </a:r>
+            <a:endParaRPr kumimoji="1" lang="en-US" altLang="ja-JP" dirty="0"/>
+          </a:p>
+          <a:p>
+            <a:pPr lvl="1"/>
+            <a:r>
+              <a:rPr lang="en-US" altLang="ja-JP" dirty="0"/>
+              <a:t>Twitter</a:t>
+            </a:r>
+            <a:r>
+              <a:rPr lang="ja-JP" altLang="en-US" dirty="0"/>
+              <a:t>や</a:t>
+            </a:r>
+            <a:r>
+              <a:rPr lang="en-US" altLang="ja-JP" dirty="0"/>
+              <a:t>Instagram</a:t>
+            </a:r>
+            <a:r>
+              <a:rPr lang="ja-JP" altLang="en-US" dirty="0"/>
+              <a:t>など</a:t>
+            </a:r>
+            <a:endParaRPr kumimoji="1" lang="en-US" altLang="ja-JP" dirty="0"/>
+          </a:p>
+          <a:p>
+            <a:endParaRPr kumimoji="1" lang="ja-JP" altLang="en-US" dirty="0"/>
+          </a:p>
+        </p:txBody>
+      </p:sp>
+    </p:spTree>
+    <p:extLst>
+      <p:ext uri="{BB962C8B-B14F-4D97-AF65-F5344CB8AC3E}">
+        <p14:creationId xmlns:p14="http://schemas.microsoft.com/office/powerpoint/2010/main" val="544699416"/>
+      </p:ext>
+    </p:extLst>
+  </p:cSld>
+  <p:clrMapOvr>
+    <a:masterClrMapping/>
+  </p:clrMapOvr>
+</p:sld>
+</file>
+
+<file path=ppt/slides/slide17.xml><?xml version="1.0" encoding="utf-8"?>
+<p:sld xmlns:a="http://schemas.openxmlformats.org/drawingml/2006/main" xmlns:r="http://schemas.openxmlformats.org/officeDocument/2006/relationships" xmlns:p="http://schemas.openxmlformats.org/presentationml/2006/main">
+  <p:cSld>
+    <p:spTree>
+      <p:nvGrpSpPr>
+        <p:cNvPr id="1" name=""/>
+        <p:cNvGrpSpPr/>
+        <p:nvPr/>
+      </p:nvGrpSpPr>
+      <p:grpSpPr>
+        <a:xfrm>
+          <a:off x="0" y="0"/>
+          <a:ext cx="0" cy="0"/>
+          <a:chOff x="0" y="0"/>
+          <a:chExt cx="0" cy="0"/>
+        </a:xfrm>
+      </p:grpSpPr>
+      <p:sp>
+        <p:nvSpPr>
+          <p:cNvPr id="2" name="タイトル 1"/>
+          <p:cNvSpPr>
+            <a:spLocks noGrp="1"/>
+          </p:cNvSpPr>
+          <p:nvPr>
+            <p:ph type="title"/>
+          </p:nvPr>
+        </p:nvSpPr>
+        <p:spPr/>
+        <p:txBody>
+          <a:bodyPr/>
+          <a:lstStyle/>
+          <a:p>
+            <a:r>
               <a:rPr kumimoji="1" lang="ja-JP" altLang="en-US" dirty="0"/>
               <a:t>本研究の目的</a:t>
             </a:r>
@@ -5784,7 +8016,9 @@
         </p:nvSpPr>
         <p:spPr/>
         <p:txBody>
-          <a:bodyPr/>
+          <a:bodyPr>
+            <a:normAutofit lnSpcReduction="10000"/>
+          </a:bodyPr>
           <a:lstStyle/>
           <a:p>
             <a:r>
@@ -5930,14 +8164,14 @@
       </p:sp>
       <p:sp>
         <p:nvSpPr>
-          <p:cNvPr id="4" name="正方形/長方形 3"/>
+          <p:cNvPr id="5" name="正方形/長方形 4"/>
           <p:cNvSpPr/>
           <p:nvPr/>
         </p:nvSpPr>
         <p:spPr>
           <a:xfrm>
-            <a:off x="3282462" y="3305907"/>
-            <a:ext cx="2684584" cy="762000"/>
+            <a:off x="2092569" y="5169877"/>
+            <a:ext cx="5216769" cy="1137138"/>
           </a:xfrm>
           <a:prstGeom prst="rect">
             <a:avLst/>
@@ -5965,55 +8199,16 @@
           <a:p>
             <a:pPr algn="ctr"/>
             <a:r>
-              <a:rPr kumimoji="1" lang="ja-JP" altLang="en-US" dirty="0"/>
-              <a:t>マークシート方式</a:t>
-            </a:r>
-          </a:p>
-        </p:txBody>
-      </p:sp>
-      <p:sp>
-        <p:nvSpPr>
-          <p:cNvPr id="5" name="正方形/長方形 4"/>
-          <p:cNvSpPr/>
-          <p:nvPr/>
-        </p:nvSpPr>
-        <p:spPr>
-          <a:xfrm>
-            <a:off x="2579077" y="5169877"/>
-            <a:ext cx="4337538" cy="1137138"/>
-          </a:xfrm>
-          <a:prstGeom prst="rect">
-            <a:avLst/>
-          </a:prstGeom>
-        </p:spPr>
-        <p:style>
-          <a:lnRef idx="2">
-            <a:schemeClr val="accent1">
-              <a:shade val="50000"/>
-            </a:schemeClr>
-          </a:lnRef>
-          <a:fillRef idx="1">
-            <a:schemeClr val="accent1"/>
-          </a:fillRef>
-          <a:effectRef idx="0">
-            <a:schemeClr val="accent1"/>
-          </a:effectRef>
-          <a:fontRef idx="minor">
-            <a:schemeClr val="lt1"/>
-          </a:fontRef>
-        </p:style>
-        <p:txBody>
-          <a:bodyPr rtlCol="0" anchor="ctr"/>
-          <a:lstStyle/>
-          <a:p>
-            <a:pPr algn="ctr"/>
-            <a:r>
-              <a:rPr lang="en-US" altLang="ja-JP" sz="4000" dirty="0"/>
+              <a:rPr lang="ja-JP" altLang="en-US" sz="4000" dirty="0" smtClean="0"/>
+              <a:t>本研究：</a:t>
+            </a:r>
+            <a:r>
+              <a:rPr lang="en-US" altLang="ja-JP" sz="4000" dirty="0" smtClean="0"/>
               <a:t>Web</a:t>
             </a:r>
             <a:r>
-              <a:rPr lang="ja-JP" altLang="en-US" sz="4000" dirty="0"/>
-              <a:t>上でアンケート</a:t>
+              <a:rPr lang="ja-JP" altLang="en-US" sz="4000" dirty="0" smtClean="0"/>
+              <a:t>アンケート</a:t>
             </a:r>
             <a:endParaRPr kumimoji="1" lang="ja-JP" altLang="en-US" sz="4000" dirty="0"/>
           </a:p>
@@ -6056,6 +8251,49 @@
           <a:p>
             <a:pPr algn="ctr"/>
             <a:endParaRPr kumimoji="1" lang="ja-JP" altLang="en-US"/>
+          </a:p>
+        </p:txBody>
+      </p:sp>
+      <p:sp>
+        <p:nvSpPr>
+          <p:cNvPr id="10" name="正方形/長方形 9"/>
+          <p:cNvSpPr/>
+          <p:nvPr/>
+        </p:nvSpPr>
+        <p:spPr>
+          <a:xfrm>
+            <a:off x="2092569" y="2962031"/>
+            <a:ext cx="5216769" cy="1137138"/>
+          </a:xfrm>
+          <a:prstGeom prst="rect">
+            <a:avLst/>
+          </a:prstGeom>
+        </p:spPr>
+        <p:style>
+          <a:lnRef idx="2">
+            <a:schemeClr val="accent1">
+              <a:shade val="50000"/>
+            </a:schemeClr>
+          </a:lnRef>
+          <a:fillRef idx="1">
+            <a:schemeClr val="accent1"/>
+          </a:fillRef>
+          <a:effectRef idx="0">
+            <a:schemeClr val="accent1"/>
+          </a:effectRef>
+          <a:fontRef idx="minor">
+            <a:schemeClr val="lt1"/>
+          </a:fontRef>
+        </p:style>
+        <p:txBody>
+          <a:bodyPr rtlCol="0" anchor="ctr"/>
+          <a:lstStyle/>
+          <a:p>
+            <a:pPr algn="ctr"/>
+            <a:r>
+              <a:rPr lang="ja-JP" altLang="en-US" sz="4000" dirty="0"/>
+              <a:t>従来：マークシート方式</a:t>
+            </a:r>
           </a:p>
         </p:txBody>
       </p:sp>
@@ -6166,8 +8404,8 @@
         </p:nvSpPr>
         <p:spPr>
           <a:xfrm>
-            <a:off x="1047404" y="5178829"/>
-            <a:ext cx="6666807" cy="914400"/>
+            <a:off x="1106018" y="4518696"/>
+            <a:ext cx="6666807" cy="1515048"/>
           </a:xfrm>
           <a:prstGeom prst="rect">
             <a:avLst/>
@@ -6195,8 +8433,24 @@
           <a:p>
             <a:pPr algn="ctr"/>
             <a:r>
-              <a:rPr kumimoji="1" lang="ja-JP" altLang="en-US" dirty="0"/>
-              <a:t>ＷＥＢ上で行うことでこれらの欠点を克服できる</a:t>
+              <a:rPr kumimoji="1" lang="ja-JP" altLang="en-US" sz="4000" dirty="0"/>
+              <a:t>ＷＥＢ上で行うこと</a:t>
+            </a:r>
+            <a:r>
+              <a:rPr kumimoji="1" lang="ja-JP" altLang="en-US" sz="4000" dirty="0" smtClean="0"/>
+              <a:t>で</a:t>
+            </a:r>
+            <a:endParaRPr kumimoji="1" lang="en-US" altLang="ja-JP" sz="4000" dirty="0" smtClean="0"/>
+          </a:p>
+          <a:p>
+            <a:pPr algn="ctr"/>
+            <a:r>
+              <a:rPr kumimoji="1" lang="ja-JP" altLang="en-US" sz="4000" dirty="0" smtClean="0"/>
+              <a:t>これら</a:t>
+            </a:r>
+            <a:r>
+              <a:rPr kumimoji="1" lang="ja-JP" altLang="en-US" sz="4000" dirty="0"/>
+              <a:t>の欠点を克服できる</a:t>
             </a:r>
           </a:p>
         </p:txBody>
@@ -6270,9 +8524,16 @@
         </p:nvSpPr>
         <p:spPr/>
         <p:txBody>
-          <a:bodyPr/>
-          <a:lstStyle/>
-          <a:p>
+          <a:bodyPr>
+            <a:normAutofit fontScale="85000" lnSpcReduction="20000"/>
+          </a:bodyPr>
+          <a:lstStyle/>
+          <a:p>
+            <a:pPr>
+              <a:lnSpc>
+                <a:spcPct val="120000"/>
+              </a:lnSpc>
+            </a:pPr>
             <a:r>
               <a:rPr kumimoji="1" lang="ja-JP" altLang="en-US" dirty="0"/>
               <a:t>経済性</a:t>
@@ -6280,7 +8541,11 @@
             <a:endParaRPr kumimoji="1" lang="en-US" altLang="ja-JP" dirty="0"/>
           </a:p>
           <a:p>
-            <a:pPr lvl="1"/>
+            <a:pPr lvl="1">
+              <a:lnSpc>
+                <a:spcPct val="120000"/>
+              </a:lnSpc>
+            </a:pPr>
             <a:r>
               <a:rPr lang="ja-JP" altLang="en-US" dirty="0"/>
               <a:t>紙資源を使わない</a:t>
@@ -6289,11 +8554,19 @@
           </a:p>
           <a:p>
             <a:pPr marL="457200" lvl="1" indent="0">
+              <a:lnSpc>
+                <a:spcPct val="120000"/>
+              </a:lnSpc>
               <a:buNone/>
             </a:pPr>
             <a:endParaRPr kumimoji="1" lang="en-US" altLang="ja-JP" dirty="0"/>
           </a:p>
           <a:p>
+            <a:pPr>
+              <a:lnSpc>
+                <a:spcPct val="120000"/>
+              </a:lnSpc>
+            </a:pPr>
             <a:r>
               <a:rPr lang="ja-JP" altLang="en-US" dirty="0"/>
               <a:t>教員の労力削減</a:t>
@@ -6301,7 +8574,11 @@
             <a:endParaRPr lang="en-US" altLang="ja-JP" dirty="0"/>
           </a:p>
           <a:p>
-            <a:pPr lvl="1"/>
+            <a:pPr lvl="1">
+              <a:lnSpc>
+                <a:spcPct val="120000"/>
+              </a:lnSpc>
+            </a:pPr>
             <a:r>
               <a:rPr lang="ja-JP" altLang="en-US" dirty="0"/>
               <a:t>回答用紙をスキャンする必要がない</a:t>
@@ -6309,20 +8586,38 @@
             <a:endParaRPr lang="en-US" altLang="ja-JP" dirty="0"/>
           </a:p>
           <a:p>
-            <a:pPr lvl="1"/>
+            <a:pPr lvl="1">
+              <a:lnSpc>
+                <a:spcPct val="120000"/>
+              </a:lnSpc>
+            </a:pPr>
             <a:r>
               <a:rPr lang="ja-JP" altLang="en-US" dirty="0"/>
-              <a:t>回答データの自動集計</a:t>
-            </a:r>
-            <a:endParaRPr lang="en-US" altLang="ja-JP" dirty="0"/>
-          </a:p>
-          <a:p>
-            <a:pPr lvl="1"/>
-            <a:endParaRPr lang="en-US" altLang="ja-JP" dirty="0"/>
-          </a:p>
-          <a:p>
-            <a:r>
-              <a:rPr kumimoji="1" lang="ja-JP" altLang="en-US" dirty="0"/>
+              <a:t>回答データの自動</a:t>
+            </a:r>
+            <a:r>
+              <a:rPr lang="ja-JP" altLang="en-US" dirty="0" smtClean="0"/>
+              <a:t>集計</a:t>
+            </a:r>
+            <a:endParaRPr lang="en-US" altLang="ja-JP" dirty="0" smtClean="0"/>
+          </a:p>
+          <a:p>
+            <a:pPr marL="457200" lvl="1" indent="0">
+              <a:lnSpc>
+                <a:spcPct val="120000"/>
+              </a:lnSpc>
+              <a:buNone/>
+            </a:pPr>
+            <a:endParaRPr lang="en-US" altLang="ja-JP" dirty="0" smtClean="0"/>
+          </a:p>
+          <a:p>
+            <a:pPr>
+              <a:lnSpc>
+                <a:spcPct val="120000"/>
+              </a:lnSpc>
+            </a:pPr>
+            <a:r>
+              <a:rPr kumimoji="1" lang="ja-JP" altLang="en-US" dirty="0" smtClean="0"/>
               <a:t>ユーザ</a:t>
             </a:r>
             <a:r>
@@ -6332,7 +8627,11 @@
             <a:endParaRPr lang="en-US" altLang="ja-JP" dirty="0"/>
           </a:p>
           <a:p>
-            <a:pPr lvl="1"/>
+            <a:pPr lvl="1">
+              <a:lnSpc>
+                <a:spcPct val="120000"/>
+              </a:lnSpc>
+            </a:pPr>
             <a:r>
               <a:rPr kumimoji="1" lang="ja-JP" altLang="en-US" dirty="0"/>
               <a:t>動きのあるＵＩで楽しくアンケートに回答できる</a:t>
@@ -6605,7 +8904,9 @@
         </p:nvSpPr>
         <p:spPr/>
         <p:txBody>
-          <a:bodyPr/>
+          <a:bodyPr>
+            <a:normAutofit lnSpcReduction="10000"/>
+          </a:bodyPr>
           <a:lstStyle/>
           <a:p>
             <a:r>
@@ -6642,7 +8943,15 @@
             <a:pPr lvl="2"/>
             <a:r>
               <a:rPr lang="ja-JP" altLang="en-US" dirty="0"/>
-              <a:t>スキャン不要で自動的にアンケート結果をＰＣに取り込める。</a:t>
+              <a:t>スキャン不要で自動的</a:t>
+            </a:r>
+            <a:r>
+              <a:rPr lang="ja-JP" altLang="en-US" dirty="0" smtClean="0"/>
+              <a:t>に回答を</a:t>
+            </a:r>
+            <a:r>
+              <a:rPr lang="ja-JP" altLang="en-US" dirty="0"/>
+              <a:t>ＰＣに取り込める。</a:t>
             </a:r>
             <a:endParaRPr lang="en-US" altLang="ja-JP" dirty="0"/>
           </a:p>
@@ -6724,40 +9033,98 @@
           <a:lstStyle/>
           <a:p>
             <a:r>
+              <a:rPr kumimoji="1" lang="ja-JP" altLang="en-US" dirty="0" smtClean="0"/>
+              <a:t>今後の展望</a:t>
+            </a:r>
+            <a:endParaRPr kumimoji="1" lang="ja-JP" altLang="en-US" dirty="0"/>
+          </a:p>
+        </p:txBody>
+      </p:sp>
+      <p:sp>
+        <p:nvSpPr>
+          <p:cNvPr id="3" name="コンテンツ プレースホルダー 2"/>
+          <p:cNvSpPr>
+            <a:spLocks noGrp="1"/>
+          </p:cNvSpPr>
+          <p:nvPr>
+            <p:ph idx="1"/>
+          </p:nvPr>
+        </p:nvSpPr>
+        <p:spPr/>
+        <p:txBody>
+          <a:bodyPr>
+            <a:normAutofit/>
+          </a:bodyPr>
+          <a:lstStyle/>
+          <a:p>
+            <a:r>
               <a:rPr lang="ja-JP" altLang="en-US" dirty="0"/>
-              <a:t>今後の展望</a:t>
-            </a:r>
-            <a:endParaRPr kumimoji="1" lang="ja-JP" altLang="en-US" dirty="0"/>
-          </a:p>
-        </p:txBody>
-      </p:sp>
-      <p:sp>
-        <p:nvSpPr>
-          <p:cNvPr id="3" name="コンテンツ プレースホルダー 2"/>
-          <p:cNvSpPr>
-            <a:spLocks noGrp="1"/>
-          </p:cNvSpPr>
-          <p:nvPr>
-            <p:ph idx="1"/>
-          </p:nvPr>
-        </p:nvSpPr>
-        <p:spPr/>
-        <p:txBody>
-          <a:bodyPr/>
-          <a:lstStyle/>
-          <a:p>
-            <a:r>
-              <a:rPr kumimoji="1" lang="ja-JP" altLang="en-US" dirty="0"/>
-              <a:t>授業の品質向上に貢献するアプリケーションに成長させたい</a:t>
-            </a:r>
-            <a:endParaRPr kumimoji="1" lang="en-US" altLang="ja-JP" dirty="0"/>
+              <a:t>結果</a:t>
+            </a:r>
+            <a:r>
+              <a:rPr lang="ja-JP" altLang="en-US" dirty="0" smtClean="0"/>
+              <a:t>の自動集計配信機能の実装</a:t>
+            </a:r>
+            <a:endParaRPr lang="en-US" altLang="ja-JP" dirty="0" smtClean="0"/>
+          </a:p>
+        </p:txBody>
+      </p:sp>
+      <p:sp>
+        <p:nvSpPr>
+          <p:cNvPr id="4" name="円/楕円 3"/>
+          <p:cNvSpPr/>
+          <p:nvPr/>
+        </p:nvSpPr>
+        <p:spPr>
+          <a:xfrm>
+            <a:off x="534867" y="3282461"/>
+            <a:ext cx="7886700" cy="2672862"/>
+          </a:xfrm>
+          <a:prstGeom prst="ellipse">
+            <a:avLst/>
+          </a:prstGeom>
+        </p:spPr>
+        <p:style>
+          <a:lnRef idx="2">
+            <a:schemeClr val="accent1">
+              <a:shade val="50000"/>
+            </a:schemeClr>
+          </a:lnRef>
+          <a:fillRef idx="1">
+            <a:schemeClr val="accent1"/>
+          </a:fillRef>
+          <a:effectRef idx="0">
+            <a:schemeClr val="accent1"/>
+          </a:effectRef>
+          <a:fontRef idx="minor">
+            <a:schemeClr val="lt1"/>
+          </a:fontRef>
+        </p:style>
+        <p:txBody>
+          <a:bodyPr rtlCol="0" anchor="ctr"/>
+          <a:lstStyle/>
+          <a:p>
+            <a:pPr algn="ctr"/>
+            <a:r>
+              <a:rPr lang="ja-JP" altLang="en-US" sz="3600" dirty="0"/>
+              <a:t>より少ないコスト</a:t>
+            </a:r>
+            <a:r>
+              <a:rPr lang="ja-JP" altLang="en-US" sz="3600" dirty="0" smtClean="0"/>
+              <a:t>で授業評価アンケート</a:t>
+            </a:r>
+            <a:r>
+              <a:rPr lang="ja-JP" altLang="en-US" sz="3600" dirty="0"/>
+              <a:t>を実施可能</a:t>
+            </a:r>
+            <a:endParaRPr lang="en-US" altLang="ja-JP" sz="3600" dirty="0"/>
           </a:p>
         </p:txBody>
       </p:sp>
     </p:spTree>
     <p:extLst>
       <p:ext uri="{BB962C8B-B14F-4D97-AF65-F5344CB8AC3E}">
-        <p14:creationId xmlns:p14="http://schemas.microsoft.com/office/powerpoint/2010/main" val="4066048542"/>
+        <p14:creationId xmlns:p14="http://schemas.microsoft.com/office/powerpoint/2010/main" val="231410377"/>
       </p:ext>
     </p:extLst>
   </p:cSld>
@@ -6800,48 +9167,65 @@
           <a:lstStyle/>
           <a:p>
             <a:r>
+              <a:rPr kumimoji="1" lang="ja-JP" altLang="en-US" dirty="0"/>
+              <a:t>まとめ</a:t>
+            </a:r>
+          </a:p>
+        </p:txBody>
+      </p:sp>
+      <p:sp>
+        <p:nvSpPr>
+          <p:cNvPr id="3" name="コンテンツ プレースホルダー 2"/>
+          <p:cNvSpPr>
+            <a:spLocks noGrp="1"/>
+          </p:cNvSpPr>
+          <p:nvPr>
+            <p:ph idx="1"/>
+          </p:nvPr>
+        </p:nvSpPr>
+        <p:spPr/>
+        <p:txBody>
+          <a:bodyPr>
+            <a:normAutofit fontScale="77500" lnSpcReduction="20000"/>
+          </a:bodyPr>
+          <a:lstStyle/>
+          <a:p>
+            <a:r>
+              <a:rPr kumimoji="1" lang="en-US" altLang="ja-JP" dirty="0"/>
+              <a:t>Web</a:t>
+            </a:r>
+            <a:r>
               <a:rPr lang="ja-JP" altLang="en-US" dirty="0"/>
-              <a:t>今後の展望</a:t>
+              <a:t>プログラミングで授業評価アンケートを作成した</a:t>
+            </a:r>
+            <a:endParaRPr lang="en-US" altLang="ja-JP" dirty="0"/>
+          </a:p>
+          <a:p>
+            <a:endParaRPr kumimoji="1" lang="en-US" altLang="ja-JP" dirty="0"/>
+          </a:p>
+          <a:p>
+            <a:r>
+              <a:rPr lang="ja-JP" altLang="en-US" dirty="0"/>
+              <a:t>経済性の改善、教員の労力削減、ユーザ体験の向上が実現した</a:t>
+            </a:r>
+            <a:endParaRPr lang="en-US" altLang="ja-JP" dirty="0"/>
+          </a:p>
+          <a:p>
+            <a:endParaRPr kumimoji="1" lang="en-US" altLang="ja-JP" dirty="0"/>
+          </a:p>
+          <a:p>
+            <a:r>
+              <a:rPr lang="ja-JP" altLang="en-US" dirty="0"/>
+              <a:t>新機能を実装することで高専の授業のさらなる品質向上に貢献できる。</a:t>
             </a:r>
             <a:endParaRPr kumimoji="1" lang="ja-JP" altLang="en-US" dirty="0"/>
-          </a:p>
-        </p:txBody>
-      </p:sp>
-      <p:sp>
-        <p:nvSpPr>
-          <p:cNvPr id="3" name="コンテンツ プレースホルダー 2"/>
-          <p:cNvSpPr>
-            <a:spLocks noGrp="1"/>
-          </p:cNvSpPr>
-          <p:nvPr>
-            <p:ph idx="1"/>
-          </p:nvPr>
-        </p:nvSpPr>
-        <p:spPr/>
-        <p:txBody>
-          <a:bodyPr/>
-          <a:lstStyle/>
-          <a:p>
-            <a:r>
-              <a:rPr lang="ja-JP" altLang="en-US" dirty="0"/>
-              <a:t>追加したい新機能</a:t>
-            </a:r>
-            <a:endParaRPr lang="en-US" altLang="ja-JP" dirty="0"/>
-          </a:p>
-          <a:p>
-            <a:pPr lvl="1"/>
-            <a:r>
-              <a:rPr lang="ja-JP" altLang="en-US" dirty="0"/>
-              <a:t>アンケート結果の自動集計、配信機能</a:t>
-            </a:r>
-            <a:endParaRPr lang="en-US" altLang="ja-JP" dirty="0"/>
           </a:p>
         </p:txBody>
       </p:sp>
     </p:spTree>
     <p:extLst>
       <p:ext uri="{BB962C8B-B14F-4D97-AF65-F5344CB8AC3E}">
-        <p14:creationId xmlns:p14="http://schemas.microsoft.com/office/powerpoint/2010/main" val="2916584370"/>
+        <p14:creationId xmlns:p14="http://schemas.microsoft.com/office/powerpoint/2010/main" val="1114868748"/>
       </p:ext>
     </p:extLst>
   </p:cSld>
@@ -6883,48 +9267,54 @@
           <a:bodyPr/>
           <a:lstStyle/>
           <a:p>
+            <a:endParaRPr kumimoji="1" lang="ja-JP" altLang="en-US"/>
+          </a:p>
+        </p:txBody>
+      </p:sp>
+      <p:sp>
+        <p:nvSpPr>
+          <p:cNvPr id="3" name="コンテンツ プレースホルダー 2"/>
+          <p:cNvSpPr>
+            <a:spLocks noGrp="1"/>
+          </p:cNvSpPr>
+          <p:nvPr>
+            <p:ph idx="1"/>
+          </p:nvPr>
+        </p:nvSpPr>
+        <p:spPr/>
+        <p:txBody>
+          <a:bodyPr/>
+          <a:lstStyle/>
+          <a:p>
+            <a:pPr marL="0" indent="0" algn="ctr">
+              <a:buNone/>
+            </a:pPr>
+            <a:endParaRPr lang="en-US" altLang="ja-JP" dirty="0" smtClean="0"/>
+          </a:p>
+          <a:p>
+            <a:pPr marL="0" indent="0" algn="ctr">
+              <a:buNone/>
+            </a:pPr>
+            <a:r>
+              <a:rPr lang="ja-JP" altLang="en-US" dirty="0" smtClean="0"/>
+              <a:t>ご清聴</a:t>
+            </a:r>
+            <a:r>
+              <a:rPr lang="ja-JP" altLang="en-US" dirty="0" smtClean="0"/>
+              <a:t>ありがとうございまし</a:t>
+            </a:r>
             <a:r>
               <a:rPr lang="ja-JP" altLang="en-US" dirty="0"/>
-              <a:t>今後の展望</a:t>
+              <a:t>た</a:t>
             </a:r>
             <a:endParaRPr kumimoji="1" lang="ja-JP" altLang="en-US" dirty="0"/>
-          </a:p>
-        </p:txBody>
-      </p:sp>
-      <p:sp>
-        <p:nvSpPr>
-          <p:cNvPr id="3" name="コンテンツ プレースホルダー 2"/>
-          <p:cNvSpPr>
-            <a:spLocks noGrp="1"/>
-          </p:cNvSpPr>
-          <p:nvPr>
-            <p:ph idx="1"/>
-          </p:nvPr>
-        </p:nvSpPr>
-        <p:spPr/>
-        <p:txBody>
-          <a:bodyPr/>
-          <a:lstStyle/>
-          <a:p>
-            <a:r>
-              <a:rPr lang="ja-JP" altLang="en-US" dirty="0"/>
-              <a:t>これらの新機能を実装することで、授業終了後に学生がすぐに今回の授業を評価することができ、より正確な意見が収集できます。</a:t>
-            </a:r>
-            <a:endParaRPr lang="en-US" altLang="ja-JP" dirty="0"/>
-          </a:p>
-          <a:p>
-            <a:r>
-              <a:rPr lang="ja-JP" altLang="en-US" dirty="0"/>
-              <a:t>また、教員も授業の内容を覚えているうちに学生からのフィードバックを得られるので今までよりもさらに授業の品質が向上します。</a:t>
-            </a:r>
-            <a:endParaRPr kumimoji="1" lang="en-US" altLang="ja-JP" dirty="0"/>
           </a:p>
         </p:txBody>
       </p:sp>
     </p:spTree>
     <p:extLst>
       <p:ext uri="{BB962C8B-B14F-4D97-AF65-F5344CB8AC3E}">
-        <p14:creationId xmlns:p14="http://schemas.microsoft.com/office/powerpoint/2010/main" val="3755367451"/>
+        <p14:creationId xmlns:p14="http://schemas.microsoft.com/office/powerpoint/2010/main" val="2117521921"/>
       </p:ext>
     </p:extLst>
   </p:cSld>

</xml_diff>